<commit_message>
Add test results to prezentacia.pptx
</commit_message>
<xml_diff>
--- a/docs/prezentacia.pptx
+++ b/docs/prezentacia.pptx
@@ -10,8 +10,11 @@
     <p:sldId id="258" r:id="rId4"/>
     <p:sldId id="259" r:id="rId5"/>
     <p:sldId id="260" r:id="rId6"/>
-    <p:sldId id="261" r:id="rId7"/>
-    <p:sldId id="262" r:id="rId8"/>
+    <p:sldId id="263" r:id="rId7"/>
+    <p:sldId id="264" r:id="rId8"/>
+    <p:sldId id="265" r:id="rId9"/>
+    <p:sldId id="261" r:id="rId10"/>
+    <p:sldId id="262" r:id="rId11"/>
   </p:sldIdLst>
   <p:sldSz cx="12192000" cy="6858000"/>
   <p:notesSz cx="6858000" cy="9144000"/>
@@ -269,7 +272,7 @@
           <a:p>
             <a:fld id="{907F850C-ACB2-47B0-B08E-A47B5F65801F}" type="datetimeFigureOut">
               <a:rPr lang="sk-SK" smtClean="0"/>
-              <a:t>23. 10. 2017</a:t>
+              <a:t>24. 10. 2017</a:t>
             </a:fld>
             <a:endParaRPr lang="sk-SK"/>
           </a:p>
@@ -467,7 +470,7 @@
           <a:p>
             <a:fld id="{907F850C-ACB2-47B0-B08E-A47B5F65801F}" type="datetimeFigureOut">
               <a:rPr lang="sk-SK" smtClean="0"/>
-              <a:t>23. 10. 2017</a:t>
+              <a:t>24. 10. 2017</a:t>
             </a:fld>
             <a:endParaRPr lang="sk-SK"/>
           </a:p>
@@ -675,7 +678,7 @@
           <a:p>
             <a:fld id="{907F850C-ACB2-47B0-B08E-A47B5F65801F}" type="datetimeFigureOut">
               <a:rPr lang="sk-SK" smtClean="0"/>
-              <a:t>23. 10. 2017</a:t>
+              <a:t>24. 10. 2017</a:t>
             </a:fld>
             <a:endParaRPr lang="sk-SK"/>
           </a:p>
@@ -873,7 +876,7 @@
           <a:p>
             <a:fld id="{907F850C-ACB2-47B0-B08E-A47B5F65801F}" type="datetimeFigureOut">
               <a:rPr lang="sk-SK" smtClean="0"/>
-              <a:t>23. 10. 2017</a:t>
+              <a:t>24. 10. 2017</a:t>
             </a:fld>
             <a:endParaRPr lang="sk-SK"/>
           </a:p>
@@ -1148,7 +1151,7 @@
           <a:p>
             <a:fld id="{907F850C-ACB2-47B0-B08E-A47B5F65801F}" type="datetimeFigureOut">
               <a:rPr lang="sk-SK" smtClean="0"/>
-              <a:t>23. 10. 2017</a:t>
+              <a:t>24. 10. 2017</a:t>
             </a:fld>
             <a:endParaRPr lang="sk-SK"/>
           </a:p>
@@ -1413,7 +1416,7 @@
           <a:p>
             <a:fld id="{907F850C-ACB2-47B0-B08E-A47B5F65801F}" type="datetimeFigureOut">
               <a:rPr lang="sk-SK" smtClean="0"/>
-              <a:t>23. 10. 2017</a:t>
+              <a:t>24. 10. 2017</a:t>
             </a:fld>
             <a:endParaRPr lang="sk-SK"/>
           </a:p>
@@ -1825,7 +1828,7 @@
           <a:p>
             <a:fld id="{907F850C-ACB2-47B0-B08E-A47B5F65801F}" type="datetimeFigureOut">
               <a:rPr lang="sk-SK" smtClean="0"/>
-              <a:t>23. 10. 2017</a:t>
+              <a:t>24. 10. 2017</a:t>
             </a:fld>
             <a:endParaRPr lang="sk-SK"/>
           </a:p>
@@ -1966,7 +1969,7 @@
           <a:p>
             <a:fld id="{907F850C-ACB2-47B0-B08E-A47B5F65801F}" type="datetimeFigureOut">
               <a:rPr lang="sk-SK" smtClean="0"/>
-              <a:t>23. 10. 2017</a:t>
+              <a:t>24. 10. 2017</a:t>
             </a:fld>
             <a:endParaRPr lang="sk-SK"/>
           </a:p>
@@ -2079,7 +2082,7 @@
           <a:p>
             <a:fld id="{907F850C-ACB2-47B0-B08E-A47B5F65801F}" type="datetimeFigureOut">
               <a:rPr lang="sk-SK" smtClean="0"/>
-              <a:t>23. 10. 2017</a:t>
+              <a:t>24. 10. 2017</a:t>
             </a:fld>
             <a:endParaRPr lang="sk-SK"/>
           </a:p>
@@ -2390,7 +2393,7 @@
           <a:p>
             <a:fld id="{907F850C-ACB2-47B0-B08E-A47B5F65801F}" type="datetimeFigureOut">
               <a:rPr lang="sk-SK" smtClean="0"/>
-              <a:t>23. 10. 2017</a:t>
+              <a:t>24. 10. 2017</a:t>
             </a:fld>
             <a:endParaRPr lang="sk-SK"/>
           </a:p>
@@ -2678,7 +2681,7 @@
           <a:p>
             <a:fld id="{907F850C-ACB2-47B0-B08E-A47B5F65801F}" type="datetimeFigureOut">
               <a:rPr lang="sk-SK" smtClean="0"/>
-              <a:t>23. 10. 2017</a:t>
+              <a:t>24. 10. 2017</a:t>
             </a:fld>
             <a:endParaRPr lang="sk-SK"/>
           </a:p>
@@ -2919,7 +2922,7 @@
           <a:p>
             <a:fld id="{907F850C-ACB2-47B0-B08E-A47B5F65801F}" type="datetimeFigureOut">
               <a:rPr lang="sk-SK" smtClean="0"/>
-              <a:t>23. 10. 2017</a:t>
+              <a:t>24. 10. 2017</a:t>
             </a:fld>
             <a:endParaRPr lang="sk-SK"/>
           </a:p>
@@ -3432,6 +3435,89 @@
 </p:sld>
 </file>
 
+<file path=ppt/slides/slide10.xml><?xml version="1.0" encoding="utf-8"?>
+<p:sld xmlns:a="http://schemas.openxmlformats.org/drawingml/2006/main" xmlns:r="http://schemas.openxmlformats.org/officeDocument/2006/relationships" xmlns:p="http://schemas.openxmlformats.org/presentationml/2006/main">
+  <p:cSld>
+    <p:spTree>
+      <p:nvGrpSpPr>
+        <p:cNvPr id="1" name=""/>
+        <p:cNvGrpSpPr/>
+        <p:nvPr/>
+      </p:nvGrpSpPr>
+      <p:grpSpPr>
+        <a:xfrm>
+          <a:off x="0" y="0"/>
+          <a:ext cx="0" cy="0"/>
+          <a:chOff x="0" y="0"/>
+          <a:chExt cx="0" cy="0"/>
+        </a:xfrm>
+      </p:grpSpPr>
+      <p:sp>
+        <p:nvSpPr>
+          <p:cNvPr id="2" name="Nadpis 1">
+            <a:extLst>
+              <a:ext uri="{FF2B5EF4-FFF2-40B4-BE49-F238E27FC236}">
+                <a16:creationId xmlns:a16="http://schemas.microsoft.com/office/drawing/2014/main" id="{6C0820DF-8058-4514-BE56-0824E1581EEF}"/>
+              </a:ext>
+            </a:extLst>
+          </p:cNvPr>
+          <p:cNvSpPr>
+            <a:spLocks noGrp="1"/>
+          </p:cNvSpPr>
+          <p:nvPr>
+            <p:ph type="title"/>
+          </p:nvPr>
+        </p:nvSpPr>
+        <p:spPr/>
+        <p:txBody>
+          <a:bodyPr/>
+          <a:lstStyle/>
+          <a:p>
+            <a:r>
+              <a:rPr lang="sk-SK" dirty="0"/>
+              <a:t>Literatúra</a:t>
+            </a:r>
+          </a:p>
+        </p:txBody>
+      </p:sp>
+      <p:sp>
+        <p:nvSpPr>
+          <p:cNvPr id="3" name="Zástupný objekt pre obsah 2">
+            <a:extLst>
+              <a:ext uri="{FF2B5EF4-FFF2-40B4-BE49-F238E27FC236}">
+                <a16:creationId xmlns:a16="http://schemas.microsoft.com/office/drawing/2014/main" id="{07518473-8188-482E-8ED2-F7DA1A66CFC3}"/>
+              </a:ext>
+            </a:extLst>
+          </p:cNvPr>
+          <p:cNvSpPr>
+            <a:spLocks noGrp="1"/>
+          </p:cNvSpPr>
+          <p:nvPr>
+            <p:ph idx="1"/>
+          </p:nvPr>
+        </p:nvSpPr>
+        <p:spPr/>
+        <p:txBody>
+          <a:bodyPr/>
+          <a:lstStyle/>
+          <a:p>
+            <a:endParaRPr lang="sk-SK"/>
+          </a:p>
+        </p:txBody>
+      </p:sp>
+    </p:spTree>
+    <p:extLst>
+      <p:ext uri="{BB962C8B-B14F-4D97-AF65-F5344CB8AC3E}">
+        <p14:creationId xmlns:p14="http://schemas.microsoft.com/office/powerpoint/2010/main" val="2356425478"/>
+      </p:ext>
+    </p:extLst>
+  </p:cSld>
+  <p:clrMapOvr>
+    <a:masterClrMapping/>
+  </p:clrMapOvr>
+</p:sld>
+</file>
+
 <file path=ppt/slides/slide2.xml><?xml version="1.0" encoding="utf-8"?>
 <p:sld xmlns:a="http://schemas.openxmlformats.org/drawingml/2006/main" xmlns:r="http://schemas.openxmlformats.org/officeDocument/2006/relationships" xmlns:p="http://schemas.openxmlformats.org/presentationml/2006/main">
   <p:cSld>
@@ -4036,7 +4122,7 @@
           <p:cNvPr id="2" name="Nadpis 1">
             <a:extLst>
               <a:ext uri="{FF2B5EF4-FFF2-40B4-BE49-F238E27FC236}">
-                <a16:creationId xmlns:a16="http://schemas.microsoft.com/office/drawing/2014/main" id="{5FD5D1E5-E191-4670-9CD4-E0D6B3503A8C}"/>
+                <a16:creationId xmlns:a16="http://schemas.microsoft.com/office/drawing/2014/main" id="{48DDD091-C0DC-41E7-9E9F-836CDE5836DC}"/>
               </a:ext>
             </a:extLst>
           </p:cNvPr>
@@ -4054,90 +4140,50 @@
           <a:p>
             <a:r>
               <a:rPr lang="sk-SK" dirty="0"/>
-              <a:t>Zhodnotenie a úvaha o projekte</a:t>
-            </a:r>
-          </a:p>
-        </p:txBody>
-      </p:sp>
-      <p:sp>
-        <p:nvSpPr>
-          <p:cNvPr id="3" name="Zástupný objekt pre obsah 2">
-            <a:extLst>
-              <a:ext uri="{FF2B5EF4-FFF2-40B4-BE49-F238E27FC236}">
-                <a16:creationId xmlns:a16="http://schemas.microsoft.com/office/drawing/2014/main" id="{50E2F376-A79C-47B4-85D0-6A4870B759F6}"/>
-              </a:ext>
-            </a:extLst>
-          </p:cNvPr>
-          <p:cNvSpPr>
-            <a:spLocks noGrp="1"/>
-          </p:cNvSpPr>
+              <a:t>Výsledky testov</a:t>
+            </a:r>
+          </a:p>
+        </p:txBody>
+      </p:sp>
+      <p:pic>
+        <p:nvPicPr>
+          <p:cNvPr id="5" name="Zástupný objekt pre obsah 4">
+            <a:extLst>
+              <a:ext uri="{FF2B5EF4-FFF2-40B4-BE49-F238E27FC236}">
+                <a16:creationId xmlns:a16="http://schemas.microsoft.com/office/drawing/2014/main" id="{736A727A-AFBE-4050-A073-D81B186E2D13}"/>
+              </a:ext>
+            </a:extLst>
+          </p:cNvPr>
+          <p:cNvPicPr>
+            <a:picLocks noGrp="1" noChangeAspect="1"/>
+          </p:cNvPicPr>
           <p:nvPr>
             <p:ph idx="1"/>
           </p:nvPr>
-        </p:nvSpPr>
-        <p:spPr/>
-        <p:txBody>
-          <a:bodyPr/>
-          <a:lstStyle/>
-          <a:p>
-            <a:r>
-              <a:rPr lang="sk-SK" dirty="0"/>
-              <a:t>Porovnanie hypotézy s realitou (DTD)</a:t>
-            </a:r>
-          </a:p>
-          <a:p>
-            <a:r>
-              <a:rPr lang="sk-SK" dirty="0"/>
-              <a:t>Meranie </a:t>
-            </a:r>
-            <a:r>
-              <a:rPr lang="sk-SK" dirty="0" err="1"/>
-              <a:t>jitter</a:t>
-            </a:r>
-            <a:r>
-              <a:rPr lang="sk-SK" dirty="0"/>
-              <a:t>-u a straty paketov</a:t>
-            </a:r>
-          </a:p>
-          <a:p>
-            <a:r>
-              <a:rPr lang="sk-SK" dirty="0"/>
-              <a:t>Porovnanie </a:t>
-            </a:r>
-            <a:r>
-              <a:rPr lang="sk-SK" dirty="0" err="1"/>
-              <a:t>jitter</a:t>
-            </a:r>
-            <a:r>
-              <a:rPr lang="sk-SK" dirty="0"/>
-              <a:t>-u a  straty paketov (</a:t>
-            </a:r>
-            <a:r>
-              <a:rPr lang="sk-SK" dirty="0" err="1"/>
-              <a:t>Mininet</a:t>
-            </a:r>
-            <a:r>
-              <a:rPr lang="sk-SK" dirty="0"/>
-              <a:t> </a:t>
-            </a:r>
-            <a:r>
-              <a:rPr lang="sk-SK" dirty="0" err="1"/>
-              <a:t>vs</a:t>
-            </a:r>
-            <a:r>
-              <a:rPr lang="sk-SK" dirty="0"/>
-              <a:t>. Reálne prostredie)</a:t>
-            </a:r>
-          </a:p>
-          <a:p>
-            <a:endParaRPr lang="sk-SK" dirty="0"/>
-          </a:p>
-        </p:txBody>
-      </p:sp>
+        </p:nvPicPr>
+        <p:blipFill>
+          <a:blip r:embed="rId2">
+            <a:extLst>
+              <a:ext uri="{28A0092B-C50C-407E-A947-70E740481C1C}">
+                <a14:useLocalDpi xmlns:a14="http://schemas.microsoft.com/office/drawing/2010/main" val="0"/>
+              </a:ext>
+            </a:extLst>
+          </a:blip>
+          <a:stretch>
+            <a:fillRect/>
+          </a:stretch>
+        </p:blipFill>
+        <p:spPr>
+          <a:xfrm>
+            <a:off x="1509841" y="1690688"/>
+            <a:ext cx="9169767" cy="4708800"/>
+          </a:xfrm>
+        </p:spPr>
+      </p:pic>
     </p:spTree>
     <p:extLst>
       <p:ext uri="{BB962C8B-B14F-4D97-AF65-F5344CB8AC3E}">
-        <p14:creationId xmlns:p14="http://schemas.microsoft.com/office/powerpoint/2010/main" val="2289913574"/>
+        <p14:creationId xmlns:p14="http://schemas.microsoft.com/office/powerpoint/2010/main" val="255143291"/>
       </p:ext>
     </p:extLst>
   </p:cSld>
@@ -4169,7 +4215,7 @@
           <p:cNvPr id="2" name="Nadpis 1">
             <a:extLst>
               <a:ext uri="{FF2B5EF4-FFF2-40B4-BE49-F238E27FC236}">
-                <a16:creationId xmlns:a16="http://schemas.microsoft.com/office/drawing/2014/main" id="{6C0820DF-8058-4514-BE56-0824E1581EEF}"/>
+                <a16:creationId xmlns:a16="http://schemas.microsoft.com/office/drawing/2014/main" id="{6B6690C8-90FA-4254-889C-6324DFA8CAB0}"/>
               </a:ext>
             </a:extLst>
           </p:cNvPr>
@@ -4187,40 +4233,276 @@
           <a:p>
             <a:r>
               <a:rPr lang="sk-SK" dirty="0"/>
-              <a:t>Literatúra</a:t>
-            </a:r>
-          </a:p>
-        </p:txBody>
-      </p:sp>
-      <p:sp>
-        <p:nvSpPr>
-          <p:cNvPr id="3" name="Zástupný objekt pre obsah 2">
-            <a:extLst>
-              <a:ext uri="{FF2B5EF4-FFF2-40B4-BE49-F238E27FC236}">
-                <a16:creationId xmlns:a16="http://schemas.microsoft.com/office/drawing/2014/main" id="{07518473-8188-482E-8ED2-F7DA1A66CFC3}"/>
-              </a:ext>
-            </a:extLst>
-          </p:cNvPr>
-          <p:cNvSpPr>
-            <a:spLocks noGrp="1"/>
-          </p:cNvSpPr>
+              <a:t>Výsledky testov</a:t>
+            </a:r>
+          </a:p>
+        </p:txBody>
+      </p:sp>
+      <p:pic>
+        <p:nvPicPr>
+          <p:cNvPr id="5" name="Zástupný objekt pre obsah 4">
+            <a:extLst>
+              <a:ext uri="{FF2B5EF4-FFF2-40B4-BE49-F238E27FC236}">
+                <a16:creationId xmlns:a16="http://schemas.microsoft.com/office/drawing/2014/main" id="{05A04C10-1292-436D-87DB-1802D881CC28}"/>
+              </a:ext>
+            </a:extLst>
+          </p:cNvPr>
+          <p:cNvPicPr>
+            <a:picLocks noGrp="1" noChangeAspect="1"/>
+          </p:cNvPicPr>
           <p:nvPr>
             <p:ph idx="1"/>
           </p:nvPr>
-        </p:nvSpPr>
-        <p:spPr/>
-        <p:txBody>
-          <a:bodyPr/>
-          <a:lstStyle/>
-          <a:p>
-            <a:endParaRPr lang="sk-SK"/>
-          </a:p>
-        </p:txBody>
-      </p:sp>
+        </p:nvPicPr>
+        <p:blipFill>
+          <a:blip r:embed="rId2">
+            <a:extLst>
+              <a:ext uri="{28A0092B-C50C-407E-A947-70E740481C1C}">
+                <a14:useLocalDpi xmlns:a14="http://schemas.microsoft.com/office/drawing/2010/main" val="0"/>
+              </a:ext>
+            </a:extLst>
+          </a:blip>
+          <a:stretch>
+            <a:fillRect/>
+          </a:stretch>
+        </p:blipFill>
+        <p:spPr>
+          <a:xfrm>
+            <a:off x="1664586" y="1690688"/>
+            <a:ext cx="8862827" cy="4708800"/>
+          </a:xfrm>
+        </p:spPr>
+      </p:pic>
     </p:spTree>
     <p:extLst>
       <p:ext uri="{BB962C8B-B14F-4D97-AF65-F5344CB8AC3E}">
-        <p14:creationId xmlns:p14="http://schemas.microsoft.com/office/powerpoint/2010/main" val="2356425478"/>
+        <p14:creationId xmlns:p14="http://schemas.microsoft.com/office/powerpoint/2010/main" val="1832364410"/>
+      </p:ext>
+    </p:extLst>
+  </p:cSld>
+  <p:clrMapOvr>
+    <a:masterClrMapping/>
+  </p:clrMapOvr>
+</p:sld>
+</file>
+
+<file path=ppt/slides/slide8.xml><?xml version="1.0" encoding="utf-8"?>
+<p:sld xmlns:a="http://schemas.openxmlformats.org/drawingml/2006/main" xmlns:r="http://schemas.openxmlformats.org/officeDocument/2006/relationships" xmlns:p="http://schemas.openxmlformats.org/presentationml/2006/main">
+  <p:cSld>
+    <p:spTree>
+      <p:nvGrpSpPr>
+        <p:cNvPr id="1" name=""/>
+        <p:cNvGrpSpPr/>
+        <p:nvPr/>
+      </p:nvGrpSpPr>
+      <p:grpSpPr>
+        <a:xfrm>
+          <a:off x="0" y="0"/>
+          <a:ext cx="0" cy="0"/>
+          <a:chOff x="0" y="0"/>
+          <a:chExt cx="0" cy="0"/>
+        </a:xfrm>
+      </p:grpSpPr>
+      <p:sp>
+        <p:nvSpPr>
+          <p:cNvPr id="2" name="Nadpis 1">
+            <a:extLst>
+              <a:ext uri="{FF2B5EF4-FFF2-40B4-BE49-F238E27FC236}">
+                <a16:creationId xmlns:a16="http://schemas.microsoft.com/office/drawing/2014/main" id="{96FCBA2A-9840-487E-A43D-AB0017B71489}"/>
+              </a:ext>
+            </a:extLst>
+          </p:cNvPr>
+          <p:cNvSpPr>
+            <a:spLocks noGrp="1"/>
+          </p:cNvSpPr>
+          <p:nvPr>
+            <p:ph type="title"/>
+          </p:nvPr>
+        </p:nvSpPr>
+        <p:spPr/>
+        <p:txBody>
+          <a:bodyPr/>
+          <a:lstStyle/>
+          <a:p>
+            <a:r>
+              <a:rPr lang="sk-SK" dirty="0"/>
+              <a:t>Výsledky testov</a:t>
+            </a:r>
+          </a:p>
+        </p:txBody>
+      </p:sp>
+      <p:pic>
+        <p:nvPicPr>
+          <p:cNvPr id="5" name="Zástupný objekt pre obsah 4">
+            <a:extLst>
+              <a:ext uri="{FF2B5EF4-FFF2-40B4-BE49-F238E27FC236}">
+                <a16:creationId xmlns:a16="http://schemas.microsoft.com/office/drawing/2014/main" id="{F53A65E0-2925-4E45-87AA-65F2A4AE6128}"/>
+              </a:ext>
+            </a:extLst>
+          </p:cNvPr>
+          <p:cNvPicPr>
+            <a:picLocks noGrp="1" noChangeAspect="1"/>
+          </p:cNvPicPr>
+          <p:nvPr>
+            <p:ph idx="1"/>
+          </p:nvPr>
+        </p:nvPicPr>
+        <p:blipFill>
+          <a:blip r:embed="rId2">
+            <a:extLst>
+              <a:ext uri="{28A0092B-C50C-407E-A947-70E740481C1C}">
+                <a14:useLocalDpi xmlns:a14="http://schemas.microsoft.com/office/drawing/2010/main" val="0"/>
+              </a:ext>
+            </a:extLst>
+          </a:blip>
+          <a:stretch>
+            <a:fillRect/>
+          </a:stretch>
+        </p:blipFill>
+        <p:spPr>
+          <a:xfrm>
+            <a:off x="1638971" y="1690688"/>
+            <a:ext cx="8914058" cy="4708800"/>
+          </a:xfrm>
+        </p:spPr>
+      </p:pic>
+    </p:spTree>
+    <p:extLst>
+      <p:ext uri="{BB962C8B-B14F-4D97-AF65-F5344CB8AC3E}">
+        <p14:creationId xmlns:p14="http://schemas.microsoft.com/office/powerpoint/2010/main" val="2844660764"/>
+      </p:ext>
+    </p:extLst>
+  </p:cSld>
+  <p:clrMapOvr>
+    <a:masterClrMapping/>
+  </p:clrMapOvr>
+</p:sld>
+</file>
+
+<file path=ppt/slides/slide9.xml><?xml version="1.0" encoding="utf-8"?>
+<p:sld xmlns:a="http://schemas.openxmlformats.org/drawingml/2006/main" xmlns:r="http://schemas.openxmlformats.org/officeDocument/2006/relationships" xmlns:p="http://schemas.openxmlformats.org/presentationml/2006/main">
+  <p:cSld>
+    <p:spTree>
+      <p:nvGrpSpPr>
+        <p:cNvPr id="1" name=""/>
+        <p:cNvGrpSpPr/>
+        <p:nvPr/>
+      </p:nvGrpSpPr>
+      <p:grpSpPr>
+        <a:xfrm>
+          <a:off x="0" y="0"/>
+          <a:ext cx="0" cy="0"/>
+          <a:chOff x="0" y="0"/>
+          <a:chExt cx="0" cy="0"/>
+        </a:xfrm>
+      </p:grpSpPr>
+      <p:sp>
+        <p:nvSpPr>
+          <p:cNvPr id="2" name="Nadpis 1">
+            <a:extLst>
+              <a:ext uri="{FF2B5EF4-FFF2-40B4-BE49-F238E27FC236}">
+                <a16:creationId xmlns:a16="http://schemas.microsoft.com/office/drawing/2014/main" id="{5FD5D1E5-E191-4670-9CD4-E0D6B3503A8C}"/>
+              </a:ext>
+            </a:extLst>
+          </p:cNvPr>
+          <p:cNvSpPr>
+            <a:spLocks noGrp="1"/>
+          </p:cNvSpPr>
+          <p:nvPr>
+            <p:ph type="title"/>
+          </p:nvPr>
+        </p:nvSpPr>
+        <p:spPr/>
+        <p:txBody>
+          <a:bodyPr/>
+          <a:lstStyle/>
+          <a:p>
+            <a:r>
+              <a:rPr lang="sk-SK" dirty="0"/>
+              <a:t>Zhodnotenie a úvaha o projekte</a:t>
+            </a:r>
+          </a:p>
+        </p:txBody>
+      </p:sp>
+      <p:sp>
+        <p:nvSpPr>
+          <p:cNvPr id="3" name="Zástupný objekt pre obsah 2">
+            <a:extLst>
+              <a:ext uri="{FF2B5EF4-FFF2-40B4-BE49-F238E27FC236}">
+                <a16:creationId xmlns:a16="http://schemas.microsoft.com/office/drawing/2014/main" id="{50E2F376-A79C-47B4-85D0-6A4870B759F6}"/>
+              </a:ext>
+            </a:extLst>
+          </p:cNvPr>
+          <p:cNvSpPr>
+            <a:spLocks noGrp="1"/>
+          </p:cNvSpPr>
+          <p:nvPr>
+            <p:ph idx="1"/>
+          </p:nvPr>
+        </p:nvSpPr>
+        <p:spPr/>
+        <p:txBody>
+          <a:bodyPr/>
+          <a:lstStyle/>
+          <a:p>
+            <a:r>
+              <a:rPr lang="sk-SK" dirty="0"/>
+              <a:t>Porovnanie hypotézy s realitou (DTD)</a:t>
+            </a:r>
+          </a:p>
+          <a:p>
+            <a:r>
+              <a:rPr lang="sk-SK" dirty="0"/>
+              <a:t>Meranie </a:t>
+            </a:r>
+            <a:r>
+              <a:rPr lang="sk-SK" dirty="0" err="1"/>
+              <a:t>jitter</a:t>
+            </a:r>
+            <a:r>
+              <a:rPr lang="sk-SK" dirty="0"/>
+              <a:t>-u a straty paketov</a:t>
+            </a:r>
+          </a:p>
+          <a:p>
+            <a:r>
+              <a:rPr lang="sk-SK" dirty="0"/>
+              <a:t>Porovnanie </a:t>
+            </a:r>
+            <a:r>
+              <a:rPr lang="sk-SK" dirty="0" err="1"/>
+              <a:t>jitter</a:t>
+            </a:r>
+            <a:r>
+              <a:rPr lang="sk-SK" dirty="0"/>
+              <a:t>-u a  straty paketov (</a:t>
+            </a:r>
+            <a:r>
+              <a:rPr lang="sk-SK" dirty="0" err="1"/>
+              <a:t>Mininet</a:t>
+            </a:r>
+            <a:r>
+              <a:rPr lang="sk-SK" dirty="0"/>
+              <a:t> </a:t>
+            </a:r>
+            <a:r>
+              <a:rPr lang="sk-SK" dirty="0" err="1"/>
+              <a:t>vs</a:t>
+            </a:r>
+            <a:r>
+              <a:rPr lang="sk-SK" dirty="0"/>
+              <a:t>. Reálne prostredie)</a:t>
+            </a:r>
+          </a:p>
+          <a:p>
+            <a:endParaRPr lang="sk-SK" dirty="0"/>
+          </a:p>
+        </p:txBody>
+      </p:sp>
+    </p:spTree>
+    <p:extLst>
+      <p:ext uri="{BB962C8B-B14F-4D97-AF65-F5344CB8AC3E}">
+        <p14:creationId xmlns:p14="http://schemas.microsoft.com/office/powerpoint/2010/main" val="2289913574"/>
       </p:ext>
     </p:extLst>
   </p:cSld>

</xml_diff>

<commit_message>
Add names and theme to prezentacia.pptx
</commit_message>
<xml_diff>
--- a/docs/prezentacia.pptx
+++ b/docs/prezentacia.pptx
@@ -2,8 +2,11 @@
 <file path=ppt/presentation.xml><?xml version="1.0" encoding="utf-8"?>
 <p:presentation xmlns:a="http://schemas.openxmlformats.org/drawingml/2006/main" xmlns:r="http://schemas.openxmlformats.org/officeDocument/2006/relationships" xmlns:p="http://schemas.openxmlformats.org/presentationml/2006/main" saveSubsetFonts="1">
   <p:sldMasterIdLst>
-    <p:sldMasterId id="2147483648" r:id="rId1"/>
+    <p:sldMasterId id="2147483672" r:id="rId1"/>
   </p:sldMasterIdLst>
+  <p:notesMasterIdLst>
+    <p:notesMasterId r:id="rId12"/>
+  </p:notesMasterIdLst>
   <p:sldIdLst>
     <p:sldId id="256" r:id="rId2"/>
     <p:sldId id="257" r:id="rId3"/>
@@ -20,9 +23,9 @@
   <p:notesSz cx="6858000" cy="9144000"/>
   <p:defaultTextStyle>
     <a:defPPr>
-      <a:defRPr lang="sk-SK"/>
+      <a:defRPr lang="en-US"/>
     </a:defPPr>
-    <a:lvl1pPr marL="0" algn="l" defTabSz="914400" rtl="0" eaLnBrk="1" latinLnBrk="0" hangingPunct="1">
+    <a:lvl1pPr marL="0" algn="l" defTabSz="457200" rtl="0" eaLnBrk="1" latinLnBrk="0" hangingPunct="1">
       <a:defRPr sz="1800" kern="1200">
         <a:solidFill>
           <a:schemeClr val="tx1"/>
@@ -32,7 +35,7 @@
         <a:cs typeface="+mn-cs"/>
       </a:defRPr>
     </a:lvl1pPr>
-    <a:lvl2pPr marL="457200" algn="l" defTabSz="914400" rtl="0" eaLnBrk="1" latinLnBrk="0" hangingPunct="1">
+    <a:lvl2pPr marL="457200" algn="l" defTabSz="457200" rtl="0" eaLnBrk="1" latinLnBrk="0" hangingPunct="1">
       <a:defRPr sz="1800" kern="1200">
         <a:solidFill>
           <a:schemeClr val="tx1"/>
@@ -42,7 +45,7 @@
         <a:cs typeface="+mn-cs"/>
       </a:defRPr>
     </a:lvl2pPr>
-    <a:lvl3pPr marL="914400" algn="l" defTabSz="914400" rtl="0" eaLnBrk="1" latinLnBrk="0" hangingPunct="1">
+    <a:lvl3pPr marL="914400" algn="l" defTabSz="457200" rtl="0" eaLnBrk="1" latinLnBrk="0" hangingPunct="1">
       <a:defRPr sz="1800" kern="1200">
         <a:solidFill>
           <a:schemeClr val="tx1"/>
@@ -52,7 +55,7 @@
         <a:cs typeface="+mn-cs"/>
       </a:defRPr>
     </a:lvl3pPr>
-    <a:lvl4pPr marL="1371600" algn="l" defTabSz="914400" rtl="0" eaLnBrk="1" latinLnBrk="0" hangingPunct="1">
+    <a:lvl4pPr marL="1371600" algn="l" defTabSz="457200" rtl="0" eaLnBrk="1" latinLnBrk="0" hangingPunct="1">
       <a:defRPr sz="1800" kern="1200">
         <a:solidFill>
           <a:schemeClr val="tx1"/>
@@ -62,7 +65,7 @@
         <a:cs typeface="+mn-cs"/>
       </a:defRPr>
     </a:lvl4pPr>
-    <a:lvl5pPr marL="1828800" algn="l" defTabSz="914400" rtl="0" eaLnBrk="1" latinLnBrk="0" hangingPunct="1">
+    <a:lvl5pPr marL="1828800" algn="l" defTabSz="457200" rtl="0" eaLnBrk="1" latinLnBrk="0" hangingPunct="1">
       <a:defRPr sz="1800" kern="1200">
         <a:solidFill>
           <a:schemeClr val="tx1"/>
@@ -72,7 +75,7 @@
         <a:cs typeface="+mn-cs"/>
       </a:defRPr>
     </a:lvl5pPr>
-    <a:lvl6pPr marL="2286000" algn="l" defTabSz="914400" rtl="0" eaLnBrk="1" latinLnBrk="0" hangingPunct="1">
+    <a:lvl6pPr marL="2286000" algn="l" defTabSz="457200" rtl="0" eaLnBrk="1" latinLnBrk="0" hangingPunct="1">
       <a:defRPr sz="1800" kern="1200">
         <a:solidFill>
           <a:schemeClr val="tx1"/>
@@ -82,7 +85,7 @@
         <a:cs typeface="+mn-cs"/>
       </a:defRPr>
     </a:lvl6pPr>
-    <a:lvl7pPr marL="2743200" algn="l" defTabSz="914400" rtl="0" eaLnBrk="1" latinLnBrk="0" hangingPunct="1">
+    <a:lvl7pPr marL="2743200" algn="l" defTabSz="457200" rtl="0" eaLnBrk="1" latinLnBrk="0" hangingPunct="1">
       <a:defRPr sz="1800" kern="1200">
         <a:solidFill>
           <a:schemeClr val="tx1"/>
@@ -92,7 +95,7 @@
         <a:cs typeface="+mn-cs"/>
       </a:defRPr>
     </a:lvl7pPr>
-    <a:lvl8pPr marL="3200400" algn="l" defTabSz="914400" rtl="0" eaLnBrk="1" latinLnBrk="0" hangingPunct="1">
+    <a:lvl8pPr marL="3200400" algn="l" defTabSz="457200" rtl="0" eaLnBrk="1" latinLnBrk="0" hangingPunct="1">
       <a:defRPr sz="1800" kern="1200">
         <a:solidFill>
           <a:schemeClr val="tx1"/>
@@ -102,7 +105,7 @@
         <a:cs typeface="+mn-cs"/>
       </a:defRPr>
     </a:lvl8pPr>
-    <a:lvl9pPr marL="3657600" algn="l" defTabSz="914400" rtl="0" eaLnBrk="1" latinLnBrk="0" hangingPunct="1">
+    <a:lvl9pPr marL="3657600" algn="l" defTabSz="457200" rtl="0" eaLnBrk="1" latinLnBrk="0" hangingPunct="1">
       <a:defRPr sz="1800" kern="1200">
         <a:solidFill>
           <a:schemeClr val="tx1"/>
@@ -125,6 +128,355 @@
 <p1510:revInfo xmlns:a="http://schemas.openxmlformats.org/drawingml/2006/main" xmlns:r="http://schemas.openxmlformats.org/officeDocument/2006/relationships" xmlns:p1510="http://schemas.microsoft.com/office/powerpoint/2015/10/main"/>
 </file>
 
+<file path=ppt/notesMasters/notesMaster1.xml><?xml version="1.0" encoding="utf-8"?>
+<p:notesMaster xmlns:a="http://schemas.openxmlformats.org/drawingml/2006/main" xmlns:r="http://schemas.openxmlformats.org/officeDocument/2006/relationships" xmlns:p="http://schemas.openxmlformats.org/presentationml/2006/main">
+  <p:cSld>
+    <p:bg>
+      <p:bgRef idx="1001">
+        <a:schemeClr val="bg1"/>
+      </p:bgRef>
+    </p:bg>
+    <p:spTree>
+      <p:nvGrpSpPr>
+        <p:cNvPr id="1" name=""/>
+        <p:cNvGrpSpPr/>
+        <p:nvPr/>
+      </p:nvGrpSpPr>
+      <p:grpSpPr>
+        <a:xfrm>
+          <a:off x="0" y="0"/>
+          <a:ext cx="0" cy="0"/>
+          <a:chOff x="0" y="0"/>
+          <a:chExt cx="0" cy="0"/>
+        </a:xfrm>
+      </p:grpSpPr>
+      <p:sp>
+        <p:nvSpPr>
+          <p:cNvPr id="2" name="Zástupný objekt pre hlavičku 1"/>
+          <p:cNvSpPr>
+            <a:spLocks noGrp="1"/>
+          </p:cNvSpPr>
+          <p:nvPr>
+            <p:ph type="hdr" sz="quarter"/>
+          </p:nvPr>
+        </p:nvSpPr>
+        <p:spPr>
+          <a:xfrm>
+            <a:off x="0" y="0"/>
+            <a:ext cx="2971800" cy="458788"/>
+          </a:xfrm>
+          <a:prstGeom prst="rect">
+            <a:avLst/>
+          </a:prstGeom>
+        </p:spPr>
+        <p:txBody>
+          <a:bodyPr vert="horz" lIns="91440" tIns="45720" rIns="91440" bIns="45720" rtlCol="0"/>
+          <a:lstStyle>
+            <a:lvl1pPr algn="l">
+              <a:defRPr sz="1200"/>
+            </a:lvl1pPr>
+          </a:lstStyle>
+          <a:p>
+            <a:endParaRPr lang="sk-SK"/>
+          </a:p>
+        </p:txBody>
+      </p:sp>
+      <p:sp>
+        <p:nvSpPr>
+          <p:cNvPr id="3" name="Zástupný objekt pre dátum 2"/>
+          <p:cNvSpPr>
+            <a:spLocks noGrp="1"/>
+          </p:cNvSpPr>
+          <p:nvPr>
+            <p:ph type="dt" idx="1"/>
+          </p:nvPr>
+        </p:nvSpPr>
+        <p:spPr>
+          <a:xfrm>
+            <a:off x="3884613" y="0"/>
+            <a:ext cx="2971800" cy="458788"/>
+          </a:xfrm>
+          <a:prstGeom prst="rect">
+            <a:avLst/>
+          </a:prstGeom>
+        </p:spPr>
+        <p:txBody>
+          <a:bodyPr vert="horz" lIns="91440" tIns="45720" rIns="91440" bIns="45720" rtlCol="0"/>
+          <a:lstStyle>
+            <a:lvl1pPr algn="r">
+              <a:defRPr sz="1200"/>
+            </a:lvl1pPr>
+          </a:lstStyle>
+          <a:p>
+            <a:fld id="{9854AB16-C5E4-456E-B5D0-E5E5B3CCC106}" type="datetimeFigureOut">
+              <a:rPr lang="sk-SK" smtClean="0"/>
+              <a:t>25. 10. 2017</a:t>
+            </a:fld>
+            <a:endParaRPr lang="sk-SK"/>
+          </a:p>
+        </p:txBody>
+      </p:sp>
+      <p:sp>
+        <p:nvSpPr>
+          <p:cNvPr id="4" name="Zástupný objekt pre obrázok snímky 3"/>
+          <p:cNvSpPr>
+            <a:spLocks noGrp="1" noRot="1" noChangeAspect="1"/>
+          </p:cNvSpPr>
+          <p:nvPr>
+            <p:ph type="sldImg" idx="2"/>
+          </p:nvPr>
+        </p:nvSpPr>
+        <p:spPr>
+          <a:xfrm>
+            <a:off x="685800" y="1143000"/>
+            <a:ext cx="5486400" cy="3086100"/>
+          </a:xfrm>
+          <a:prstGeom prst="rect">
+            <a:avLst/>
+          </a:prstGeom>
+          <a:noFill/>
+          <a:ln w="12700">
+            <a:solidFill>
+              <a:prstClr val="black"/>
+            </a:solidFill>
+          </a:ln>
+        </p:spPr>
+        <p:txBody>
+          <a:bodyPr vert="horz" lIns="91440" tIns="45720" rIns="91440" bIns="45720" rtlCol="0" anchor="ctr"/>
+          <a:lstStyle/>
+          <a:p>
+            <a:endParaRPr lang="sk-SK"/>
+          </a:p>
+        </p:txBody>
+      </p:sp>
+      <p:sp>
+        <p:nvSpPr>
+          <p:cNvPr id="5" name="Zástupný objekt pre poznámky 4"/>
+          <p:cNvSpPr>
+            <a:spLocks noGrp="1"/>
+          </p:cNvSpPr>
+          <p:nvPr>
+            <p:ph type="body" sz="quarter" idx="3"/>
+          </p:nvPr>
+        </p:nvSpPr>
+        <p:spPr>
+          <a:xfrm>
+            <a:off x="685800" y="4400550"/>
+            <a:ext cx="5486400" cy="3600450"/>
+          </a:xfrm>
+          <a:prstGeom prst="rect">
+            <a:avLst/>
+          </a:prstGeom>
+        </p:spPr>
+        <p:txBody>
+          <a:bodyPr vert="horz" lIns="91440" tIns="45720" rIns="91440" bIns="45720" rtlCol="0"/>
+          <a:lstStyle/>
+          <a:p>
+            <a:pPr lvl="0"/>
+            <a:r>
+              <a:rPr lang="sk-SK"/>
+              <a:t>Upraviť štýly predlohy textu</a:t>
+            </a:r>
+          </a:p>
+          <a:p>
+            <a:pPr lvl="1"/>
+            <a:r>
+              <a:rPr lang="sk-SK"/>
+              <a:t>Druhá úroveň</a:t>
+            </a:r>
+          </a:p>
+          <a:p>
+            <a:pPr lvl="2"/>
+            <a:r>
+              <a:rPr lang="sk-SK"/>
+              <a:t>Tretia úroveň</a:t>
+            </a:r>
+          </a:p>
+          <a:p>
+            <a:pPr lvl="3"/>
+            <a:r>
+              <a:rPr lang="sk-SK"/>
+              <a:t>Štvrtá úroveň</a:t>
+            </a:r>
+          </a:p>
+          <a:p>
+            <a:pPr lvl="4"/>
+            <a:r>
+              <a:rPr lang="sk-SK"/>
+              <a:t>Piata úroveň</a:t>
+            </a:r>
+          </a:p>
+        </p:txBody>
+      </p:sp>
+      <p:sp>
+        <p:nvSpPr>
+          <p:cNvPr id="6" name="Zástupný objekt pre pätu 5"/>
+          <p:cNvSpPr>
+            <a:spLocks noGrp="1"/>
+          </p:cNvSpPr>
+          <p:nvPr>
+            <p:ph type="ftr" sz="quarter" idx="4"/>
+          </p:nvPr>
+        </p:nvSpPr>
+        <p:spPr>
+          <a:xfrm>
+            <a:off x="0" y="8685213"/>
+            <a:ext cx="2971800" cy="458787"/>
+          </a:xfrm>
+          <a:prstGeom prst="rect">
+            <a:avLst/>
+          </a:prstGeom>
+        </p:spPr>
+        <p:txBody>
+          <a:bodyPr vert="horz" lIns="91440" tIns="45720" rIns="91440" bIns="45720" rtlCol="0" anchor="b"/>
+          <a:lstStyle>
+            <a:lvl1pPr algn="l">
+              <a:defRPr sz="1200"/>
+            </a:lvl1pPr>
+          </a:lstStyle>
+          <a:p>
+            <a:endParaRPr lang="sk-SK"/>
+          </a:p>
+        </p:txBody>
+      </p:sp>
+      <p:sp>
+        <p:nvSpPr>
+          <p:cNvPr id="7" name="Zástupný objekt pre číslo snímky 6"/>
+          <p:cNvSpPr>
+            <a:spLocks noGrp="1"/>
+          </p:cNvSpPr>
+          <p:nvPr>
+            <p:ph type="sldNum" sz="quarter" idx="5"/>
+          </p:nvPr>
+        </p:nvSpPr>
+        <p:spPr>
+          <a:xfrm>
+            <a:off x="3884613" y="8685213"/>
+            <a:ext cx="2971800" cy="458787"/>
+          </a:xfrm>
+          <a:prstGeom prst="rect">
+            <a:avLst/>
+          </a:prstGeom>
+        </p:spPr>
+        <p:txBody>
+          <a:bodyPr vert="horz" lIns="91440" tIns="45720" rIns="91440" bIns="45720" rtlCol="0" anchor="b"/>
+          <a:lstStyle>
+            <a:lvl1pPr algn="r">
+              <a:defRPr sz="1200"/>
+            </a:lvl1pPr>
+          </a:lstStyle>
+          <a:p>
+            <a:fld id="{49C1DA84-8AA8-4851-93CA-F35C6CAA60DF}" type="slidenum">
+              <a:rPr lang="sk-SK" smtClean="0"/>
+              <a:t>‹#›</a:t>
+            </a:fld>
+            <a:endParaRPr lang="sk-SK"/>
+          </a:p>
+        </p:txBody>
+      </p:sp>
+    </p:spTree>
+    <p:extLst>
+      <p:ext uri="{BB962C8B-B14F-4D97-AF65-F5344CB8AC3E}">
+        <p14:creationId xmlns:p14="http://schemas.microsoft.com/office/powerpoint/2010/main" val="443042807"/>
+      </p:ext>
+    </p:extLst>
+  </p:cSld>
+  <p:clrMap bg1="lt1" tx1="dk1" bg2="lt2" tx2="dk2" accent1="accent1" accent2="accent2" accent3="accent3" accent4="accent4" accent5="accent5" accent6="accent6" hlink="hlink" folHlink="folHlink"/>
+  <p:notesStyle>
+    <a:lvl1pPr marL="0" algn="l" defTabSz="914400" rtl="0" eaLnBrk="1" latinLnBrk="0" hangingPunct="1">
+      <a:defRPr sz="1200" kern="1200">
+        <a:solidFill>
+          <a:schemeClr val="tx1"/>
+        </a:solidFill>
+        <a:latin typeface="+mn-lt"/>
+        <a:ea typeface="+mn-ea"/>
+        <a:cs typeface="+mn-cs"/>
+      </a:defRPr>
+    </a:lvl1pPr>
+    <a:lvl2pPr marL="457200" algn="l" defTabSz="914400" rtl="0" eaLnBrk="1" latinLnBrk="0" hangingPunct="1">
+      <a:defRPr sz="1200" kern="1200">
+        <a:solidFill>
+          <a:schemeClr val="tx1"/>
+        </a:solidFill>
+        <a:latin typeface="+mn-lt"/>
+        <a:ea typeface="+mn-ea"/>
+        <a:cs typeface="+mn-cs"/>
+      </a:defRPr>
+    </a:lvl2pPr>
+    <a:lvl3pPr marL="914400" algn="l" defTabSz="914400" rtl="0" eaLnBrk="1" latinLnBrk="0" hangingPunct="1">
+      <a:defRPr sz="1200" kern="1200">
+        <a:solidFill>
+          <a:schemeClr val="tx1"/>
+        </a:solidFill>
+        <a:latin typeface="+mn-lt"/>
+        <a:ea typeface="+mn-ea"/>
+        <a:cs typeface="+mn-cs"/>
+      </a:defRPr>
+    </a:lvl3pPr>
+    <a:lvl4pPr marL="1371600" algn="l" defTabSz="914400" rtl="0" eaLnBrk="1" latinLnBrk="0" hangingPunct="1">
+      <a:defRPr sz="1200" kern="1200">
+        <a:solidFill>
+          <a:schemeClr val="tx1"/>
+        </a:solidFill>
+        <a:latin typeface="+mn-lt"/>
+        <a:ea typeface="+mn-ea"/>
+        <a:cs typeface="+mn-cs"/>
+      </a:defRPr>
+    </a:lvl4pPr>
+    <a:lvl5pPr marL="1828800" algn="l" defTabSz="914400" rtl="0" eaLnBrk="1" latinLnBrk="0" hangingPunct="1">
+      <a:defRPr sz="1200" kern="1200">
+        <a:solidFill>
+          <a:schemeClr val="tx1"/>
+        </a:solidFill>
+        <a:latin typeface="+mn-lt"/>
+        <a:ea typeface="+mn-ea"/>
+        <a:cs typeface="+mn-cs"/>
+      </a:defRPr>
+    </a:lvl5pPr>
+    <a:lvl6pPr marL="2286000" algn="l" defTabSz="914400" rtl="0" eaLnBrk="1" latinLnBrk="0" hangingPunct="1">
+      <a:defRPr sz="1200" kern="1200">
+        <a:solidFill>
+          <a:schemeClr val="tx1"/>
+        </a:solidFill>
+        <a:latin typeface="+mn-lt"/>
+        <a:ea typeface="+mn-ea"/>
+        <a:cs typeface="+mn-cs"/>
+      </a:defRPr>
+    </a:lvl6pPr>
+    <a:lvl7pPr marL="2743200" algn="l" defTabSz="914400" rtl="0" eaLnBrk="1" latinLnBrk="0" hangingPunct="1">
+      <a:defRPr sz="1200" kern="1200">
+        <a:solidFill>
+          <a:schemeClr val="tx1"/>
+        </a:solidFill>
+        <a:latin typeface="+mn-lt"/>
+        <a:ea typeface="+mn-ea"/>
+        <a:cs typeface="+mn-cs"/>
+      </a:defRPr>
+    </a:lvl7pPr>
+    <a:lvl8pPr marL="3200400" algn="l" defTabSz="914400" rtl="0" eaLnBrk="1" latinLnBrk="0" hangingPunct="1">
+      <a:defRPr sz="1200" kern="1200">
+        <a:solidFill>
+          <a:schemeClr val="tx1"/>
+        </a:solidFill>
+        <a:latin typeface="+mn-lt"/>
+        <a:ea typeface="+mn-ea"/>
+        <a:cs typeface="+mn-cs"/>
+      </a:defRPr>
+    </a:lvl8pPr>
+    <a:lvl9pPr marL="3657600" algn="l" defTabSz="914400" rtl="0" eaLnBrk="1" latinLnBrk="0" hangingPunct="1">
+      <a:defRPr sz="1200" kern="1200">
+        <a:solidFill>
+          <a:schemeClr val="tx1"/>
+        </a:solidFill>
+        <a:latin typeface="+mn-lt"/>
+        <a:ea typeface="+mn-ea"/>
+        <a:cs typeface="+mn-cs"/>
+      </a:defRPr>
+    </a:lvl9pPr>
+  </p:notesStyle>
+</p:notesMaster>
+</file>
+
 <file path=ppt/slideLayouts/slideLayout1.xml><?xml version="1.0" encoding="utf-8"?>
 <p:sldLayout xmlns:a="http://schemas.openxmlformats.org/drawingml/2006/main" xmlns:r="http://schemas.openxmlformats.org/officeDocument/2006/relationships" xmlns:p="http://schemas.openxmlformats.org/presentationml/2006/main" type="title" preserve="1">
   <p:cSld name="Úvodná snímka">
@@ -144,50 +496,90 @@
       </p:grpSpPr>
       <p:sp>
         <p:nvSpPr>
-          <p:cNvPr id="2" name="Nadpis 1">
-            <a:extLst>
-              <a:ext uri="{FF2B5EF4-FFF2-40B4-BE49-F238E27FC236}">
-                <a16:creationId xmlns:a16="http://schemas.microsoft.com/office/drawing/2014/main" id="{D713138A-322A-4996-819B-66C54E373886}"/>
-              </a:ext>
-            </a:extLst>
-          </p:cNvPr>
-          <p:cNvSpPr>
-            <a:spLocks noGrp="1"/>
-          </p:cNvSpPr>
-          <p:nvPr>
-            <p:ph type="ctrTitle"/>
-          </p:nvPr>
+          <p:cNvPr id="7" name="Rectangle 6"/>
+          <p:cNvSpPr>
+            <a:spLocks noChangeAspect="1"/>
+          </p:cNvSpPr>
+          <p:nvPr/>
         </p:nvSpPr>
         <p:spPr>
           <a:xfrm>
-            <a:off x="1524000" y="1122363"/>
-            <a:ext cx="9144000" cy="2387600"/>
+            <a:off x="231140" y="243840"/>
+            <a:ext cx="11724640" cy="6377939"/>
+          </a:xfrm>
+          <a:prstGeom prst="rect">
+            <a:avLst/>
+          </a:prstGeom>
+          <a:solidFill>
+            <a:schemeClr val="accent1"/>
+          </a:solidFill>
+          <a:ln w="12700">
+            <a:solidFill>
+              <a:srgbClr val="FFFFFF"/>
+            </a:solidFill>
+          </a:ln>
+        </p:spPr>
+        <p:style>
+          <a:lnRef idx="2">
+            <a:schemeClr val="accent1">
+              <a:shade val="50000"/>
+            </a:schemeClr>
+          </a:lnRef>
+          <a:fillRef idx="1">
+            <a:schemeClr val="accent1"/>
+          </a:fillRef>
+          <a:effectRef idx="0">
+            <a:schemeClr val="accent1"/>
+          </a:effectRef>
+          <a:fontRef idx="minor">
+            <a:schemeClr val="lt1"/>
+          </a:fontRef>
+        </p:style>
+      </p:sp>
+      <p:sp>
+        <p:nvSpPr>
+          <p:cNvPr id="2" name="Title 1"/>
+          <p:cNvSpPr>
+            <a:spLocks noGrp="1"/>
+          </p:cNvSpPr>
+          <p:nvPr>
+            <p:ph type="ctrTitle"/>
+          </p:nvPr>
+        </p:nvSpPr>
+        <p:spPr>
+          <a:xfrm>
+            <a:off x="1109980" y="882376"/>
+            <a:ext cx="9966960" cy="2926080"/>
           </a:xfrm>
         </p:spPr>
         <p:txBody>
-          <a:bodyPr anchor="b"/>
+          <a:bodyPr anchor="b">
+            <a:normAutofit/>
+          </a:bodyPr>
           <a:lstStyle>
             <a:lvl1pPr algn="ctr">
-              <a:defRPr sz="6000"/>
+              <a:lnSpc>
+                <a:spcPct val="85000"/>
+              </a:lnSpc>
+              <a:defRPr sz="7200" b="1" cap="all" baseline="0">
+                <a:solidFill>
+                  <a:srgbClr val="FFFFFF"/>
+                </a:solidFill>
+              </a:defRPr>
             </a:lvl1pPr>
           </a:lstStyle>
           <a:p>
             <a:r>
               <a:rPr lang="sk-SK"/>
-              <a:t>Upravte štýly predlohy textu</a:t>
-            </a:r>
-          </a:p>
-        </p:txBody>
-      </p:sp>
-      <p:sp>
-        <p:nvSpPr>
-          <p:cNvPr id="3" name="Podnadpis 2">
-            <a:extLst>
-              <a:ext uri="{FF2B5EF4-FFF2-40B4-BE49-F238E27FC236}">
-                <a16:creationId xmlns:a16="http://schemas.microsoft.com/office/drawing/2014/main" id="{CCC6ACAD-3258-4395-9A1F-6CF394A231C3}"/>
-              </a:ext>
-            </a:extLst>
-          </p:cNvPr>
+              <a:t>Kliknutím upravte štýl predlohy nadpisu</a:t>
+            </a:r>
+            <a:endParaRPr lang="en-US" dirty="0"/>
+          </a:p>
+        </p:txBody>
+      </p:sp>
+      <p:sp>
+        <p:nvSpPr>
+          <p:cNvPr id="3" name="Subtitle 2"/>
           <p:cNvSpPr>
             <a:spLocks noGrp="1"/>
           </p:cNvSpPr>
@@ -197,67 +589,68 @@
         </p:nvSpPr>
         <p:spPr>
           <a:xfrm>
-            <a:off x="1524000" y="3602038"/>
-            <a:ext cx="9144000" cy="1655762"/>
+            <a:off x="1709530" y="3869634"/>
+            <a:ext cx="8767860" cy="1388165"/>
           </a:xfrm>
         </p:spPr>
         <p:txBody>
-          <a:bodyPr/>
+          <a:bodyPr>
+            <a:normAutofit/>
+          </a:bodyPr>
           <a:lstStyle>
             <a:lvl1pPr marL="0" indent="0" algn="ctr">
               <a:buNone/>
-              <a:defRPr sz="2400"/>
+              <a:defRPr sz="2200">
+                <a:solidFill>
+                  <a:srgbClr val="FFFFFF"/>
+                </a:solidFill>
+              </a:defRPr>
             </a:lvl1pPr>
             <a:lvl2pPr marL="457200" indent="0" algn="ctr">
               <a:buNone/>
-              <a:defRPr sz="2000"/>
+              <a:defRPr sz="2200"/>
             </a:lvl2pPr>
             <a:lvl3pPr marL="914400" indent="0" algn="ctr">
               <a:buNone/>
-              <a:defRPr sz="1800"/>
+              <a:defRPr sz="2200"/>
             </a:lvl3pPr>
             <a:lvl4pPr marL="1371600" indent="0" algn="ctr">
               <a:buNone/>
-              <a:defRPr sz="1600"/>
+              <a:defRPr sz="2000"/>
             </a:lvl4pPr>
             <a:lvl5pPr marL="1828800" indent="0" algn="ctr">
               <a:buNone/>
-              <a:defRPr sz="1600"/>
+              <a:defRPr sz="2000"/>
             </a:lvl5pPr>
             <a:lvl6pPr marL="2286000" indent="0" algn="ctr">
               <a:buNone/>
-              <a:defRPr sz="1600"/>
+              <a:defRPr sz="2000"/>
             </a:lvl6pPr>
             <a:lvl7pPr marL="2743200" indent="0" algn="ctr">
               <a:buNone/>
-              <a:defRPr sz="1600"/>
+              <a:defRPr sz="2000"/>
             </a:lvl7pPr>
             <a:lvl8pPr marL="3200400" indent="0" algn="ctr">
               <a:buNone/>
-              <a:defRPr sz="1600"/>
+              <a:defRPr sz="2000"/>
             </a:lvl8pPr>
             <a:lvl9pPr marL="3657600" indent="0" algn="ctr">
               <a:buNone/>
-              <a:defRPr sz="1600"/>
+              <a:defRPr sz="2000"/>
             </a:lvl9pPr>
           </a:lstStyle>
           <a:p>
             <a:r>
               <a:rPr lang="sk-SK"/>
-              <a:t>Kliknutím upravte štýl predlohy podnadpisov</a:t>
-            </a:r>
-          </a:p>
-        </p:txBody>
-      </p:sp>
-      <p:sp>
-        <p:nvSpPr>
-          <p:cNvPr id="4" name="Zástupný objekt pre dátum 3">
-            <a:extLst>
-              <a:ext uri="{FF2B5EF4-FFF2-40B4-BE49-F238E27FC236}">
-                <a16:creationId xmlns:a16="http://schemas.microsoft.com/office/drawing/2014/main" id="{3E16285D-7924-4F47-89C9-8CF4E5E3F36A}"/>
-              </a:ext>
-            </a:extLst>
-          </p:cNvPr>
+              <a:t>Kliknutím upravte štýl predlohy podnadpisu</a:t>
+            </a:r>
+            <a:endParaRPr lang="en-US" dirty="0"/>
+          </a:p>
+        </p:txBody>
+      </p:sp>
+      <p:sp>
+        <p:nvSpPr>
+          <p:cNvPr id="4" name="Date Placeholder 3"/>
           <p:cNvSpPr>
             <a:spLocks noGrp="1"/>
           </p:cNvSpPr>
@@ -268,11 +661,19 @@
         <p:spPr/>
         <p:txBody>
           <a:bodyPr/>
-          <a:lstStyle/>
-          <a:p>
-            <a:fld id="{907F850C-ACB2-47B0-B08E-A47B5F65801F}" type="datetimeFigureOut">
+          <a:lstStyle>
+            <a:lvl1pPr>
+              <a:defRPr>
+                <a:solidFill>
+                  <a:srgbClr val="FFFFFF"/>
+                </a:solidFill>
+              </a:defRPr>
+            </a:lvl1pPr>
+          </a:lstStyle>
+          <a:p>
+            <a:fld id="{A125ABA5-F5F6-4A48-B05D-B74E22A2A9BD}" type="datetime1">
               <a:rPr lang="sk-SK" smtClean="0"/>
-              <a:t>24. 10. 2017</a:t>
+              <a:t>25. 10. 2017</a:t>
             </a:fld>
             <a:endParaRPr lang="sk-SK"/>
           </a:p>
@@ -280,13 +681,7 @@
       </p:sp>
       <p:sp>
         <p:nvSpPr>
-          <p:cNvPr id="5" name="Zástupný objekt pre pätu 4">
-            <a:extLst>
-              <a:ext uri="{FF2B5EF4-FFF2-40B4-BE49-F238E27FC236}">
-                <a16:creationId xmlns:a16="http://schemas.microsoft.com/office/drawing/2014/main" id="{0BB5EA61-CA90-4C6F-B9B9-36CBADAD803F}"/>
-              </a:ext>
-            </a:extLst>
-          </p:cNvPr>
+          <p:cNvPr id="5" name="Footer Placeholder 4"/>
           <p:cNvSpPr>
             <a:spLocks noGrp="1"/>
           </p:cNvSpPr>
@@ -297,7 +692,15 @@
         <p:spPr/>
         <p:txBody>
           <a:bodyPr/>
-          <a:lstStyle/>
+          <a:lstStyle>
+            <a:lvl1pPr>
+              <a:defRPr>
+                <a:solidFill>
+                  <a:srgbClr val="FFFFFF"/>
+                </a:solidFill>
+              </a:defRPr>
+            </a:lvl1pPr>
+          </a:lstStyle>
           <a:p>
             <a:endParaRPr lang="sk-SK"/>
           </a:p>
@@ -305,13 +708,7 @@
       </p:sp>
       <p:sp>
         <p:nvSpPr>
-          <p:cNvPr id="6" name="Zástupný objekt pre číslo snímky 5">
-            <a:extLst>
-              <a:ext uri="{FF2B5EF4-FFF2-40B4-BE49-F238E27FC236}">
-                <a16:creationId xmlns:a16="http://schemas.microsoft.com/office/drawing/2014/main" id="{11E3838B-FD80-4548-BDAA-8C16F68EFA5B}"/>
-              </a:ext>
-            </a:extLst>
-          </p:cNvPr>
+          <p:cNvPr id="6" name="Slide Number Placeholder 5"/>
           <p:cNvSpPr>
             <a:spLocks noGrp="1"/>
           </p:cNvSpPr>
@@ -322,7 +719,15 @@
         <p:spPr/>
         <p:txBody>
           <a:bodyPr/>
-          <a:lstStyle/>
+          <a:lstStyle>
+            <a:lvl1pPr>
+              <a:defRPr>
+                <a:solidFill>
+                  <a:srgbClr val="FFFFFF"/>
+                </a:solidFill>
+              </a:defRPr>
+            </a:lvl1pPr>
+          </a:lstStyle>
           <a:p>
             <a:fld id="{AB1275C2-6900-4440-AD3A-3D0AE666D652}" type="slidenum">
               <a:rPr lang="sk-SK" smtClean="0"/>
@@ -332,10 +737,45 @@
           </a:p>
         </p:txBody>
       </p:sp>
+      <p:cxnSp>
+        <p:nvCxnSpPr>
+          <p:cNvPr id="8" name="Straight Connector 7"/>
+          <p:cNvCxnSpPr/>
+          <p:nvPr/>
+        </p:nvCxnSpPr>
+        <p:spPr>
+          <a:xfrm>
+            <a:off x="1978660" y="3733800"/>
+            <a:ext cx="8229601" cy="0"/>
+          </a:xfrm>
+          <a:prstGeom prst="line">
+            <a:avLst/>
+          </a:prstGeom>
+          <a:ln>
+            <a:solidFill>
+              <a:srgbClr val="FFFFFF"/>
+            </a:solidFill>
+          </a:ln>
+        </p:spPr>
+        <p:style>
+          <a:lnRef idx="1">
+            <a:schemeClr val="accent1"/>
+          </a:lnRef>
+          <a:fillRef idx="0">
+            <a:schemeClr val="accent1"/>
+          </a:fillRef>
+          <a:effectRef idx="0">
+            <a:schemeClr val="accent1"/>
+          </a:effectRef>
+          <a:fontRef idx="minor">
+            <a:schemeClr val="tx1"/>
+          </a:fontRef>
+        </p:style>
+      </p:cxnSp>
     </p:spTree>
     <p:extLst>
       <p:ext uri="{BB962C8B-B14F-4D97-AF65-F5344CB8AC3E}">
-        <p14:creationId xmlns:p14="http://schemas.microsoft.com/office/powerpoint/2010/main" val="1077625772"/>
+        <p14:creationId xmlns:p14="http://schemas.microsoft.com/office/powerpoint/2010/main" val="2060011223"/>
       </p:ext>
     </p:extLst>
   </p:cSld>
@@ -364,13 +804,7 @@
       </p:grpSpPr>
       <p:sp>
         <p:nvSpPr>
-          <p:cNvPr id="2" name="Nadpis 1">
-            <a:extLst>
-              <a:ext uri="{FF2B5EF4-FFF2-40B4-BE49-F238E27FC236}">
-                <a16:creationId xmlns:a16="http://schemas.microsoft.com/office/drawing/2014/main" id="{4FD862C3-5A28-4900-9197-1D765C35F81A}"/>
-              </a:ext>
-            </a:extLst>
-          </p:cNvPr>
+          <p:cNvPr id="2" name="Title 1"/>
           <p:cNvSpPr>
             <a:spLocks noGrp="1"/>
           </p:cNvSpPr>
@@ -385,20 +819,15 @@
           <a:p>
             <a:r>
               <a:rPr lang="sk-SK"/>
-              <a:t>Upravte štýly predlohy textu</a:t>
-            </a:r>
-          </a:p>
-        </p:txBody>
-      </p:sp>
-      <p:sp>
-        <p:nvSpPr>
-          <p:cNvPr id="3" name="Zástupný objekt pre zvislý text 2">
-            <a:extLst>
-              <a:ext uri="{FF2B5EF4-FFF2-40B4-BE49-F238E27FC236}">
-                <a16:creationId xmlns:a16="http://schemas.microsoft.com/office/drawing/2014/main" id="{220186EB-002A-475F-AB05-5B64D7FE23DA}"/>
-              </a:ext>
-            </a:extLst>
-          </p:cNvPr>
+              <a:t>Kliknutím upravte štýl predlohy nadpisu</a:t>
+            </a:r>
+            <a:endParaRPr lang="en-US" dirty="0"/>
+          </a:p>
+        </p:txBody>
+      </p:sp>
+      <p:sp>
+        <p:nvSpPr>
+          <p:cNvPr id="3" name="Vertical Text Placeholder 2"/>
           <p:cNvSpPr>
             <a:spLocks noGrp="1"/>
           </p:cNvSpPr>
@@ -444,18 +873,13 @@
               <a:rPr lang="sk-SK"/>
               <a:t>Piata úroveň</a:t>
             </a:r>
-          </a:p>
-        </p:txBody>
-      </p:sp>
-      <p:sp>
-        <p:nvSpPr>
-          <p:cNvPr id="4" name="Zástupný objekt pre dátum 3">
-            <a:extLst>
-              <a:ext uri="{FF2B5EF4-FFF2-40B4-BE49-F238E27FC236}">
-                <a16:creationId xmlns:a16="http://schemas.microsoft.com/office/drawing/2014/main" id="{54B6279C-FA8E-4486-B65E-EC250BBFCACA}"/>
-              </a:ext>
-            </a:extLst>
-          </p:cNvPr>
+            <a:endParaRPr lang="en-US" dirty="0"/>
+          </a:p>
+        </p:txBody>
+      </p:sp>
+      <p:sp>
+        <p:nvSpPr>
+          <p:cNvPr id="4" name="Date Placeholder 3"/>
           <p:cNvSpPr>
             <a:spLocks noGrp="1"/>
           </p:cNvSpPr>
@@ -468,9 +892,9 @@
           <a:bodyPr/>
           <a:lstStyle/>
           <a:p>
-            <a:fld id="{907F850C-ACB2-47B0-B08E-A47B5F65801F}" type="datetimeFigureOut">
+            <a:fld id="{043052D1-74FA-4EBB-AE53-CAA0A147CABE}" type="datetime1">
               <a:rPr lang="sk-SK" smtClean="0"/>
-              <a:t>24. 10. 2017</a:t>
+              <a:t>25. 10. 2017</a:t>
             </a:fld>
             <a:endParaRPr lang="sk-SK"/>
           </a:p>
@@ -478,13 +902,7 @@
       </p:sp>
       <p:sp>
         <p:nvSpPr>
-          <p:cNvPr id="5" name="Zástupný objekt pre pätu 4">
-            <a:extLst>
-              <a:ext uri="{FF2B5EF4-FFF2-40B4-BE49-F238E27FC236}">
-                <a16:creationId xmlns:a16="http://schemas.microsoft.com/office/drawing/2014/main" id="{0D92B32A-477F-4A3F-BC16-1276C3C96FBF}"/>
-              </a:ext>
-            </a:extLst>
-          </p:cNvPr>
+          <p:cNvPr id="5" name="Footer Placeholder 4"/>
           <p:cNvSpPr>
             <a:spLocks noGrp="1"/>
           </p:cNvSpPr>
@@ -503,13 +921,7 @@
       </p:sp>
       <p:sp>
         <p:nvSpPr>
-          <p:cNvPr id="6" name="Zástupný objekt pre číslo snímky 5">
-            <a:extLst>
-              <a:ext uri="{FF2B5EF4-FFF2-40B4-BE49-F238E27FC236}">
-                <a16:creationId xmlns:a16="http://schemas.microsoft.com/office/drawing/2014/main" id="{9FC94B88-ABE7-4F96-BD26-393F7DF8E62C}"/>
-              </a:ext>
-            </a:extLst>
-          </p:cNvPr>
+          <p:cNvPr id="6" name="Slide Number Placeholder 5"/>
           <p:cNvSpPr>
             <a:spLocks noGrp="1"/>
           </p:cNvSpPr>
@@ -533,7 +945,7 @@
     </p:spTree>
     <p:extLst>
       <p:ext uri="{BB962C8B-B14F-4D97-AF65-F5344CB8AC3E}">
-        <p14:creationId xmlns:p14="http://schemas.microsoft.com/office/powerpoint/2010/main" val="3729188295"/>
+        <p14:creationId xmlns:p14="http://schemas.microsoft.com/office/powerpoint/2010/main" val="2553981826"/>
       </p:ext>
     </p:extLst>
   </p:cSld>
@@ -562,13 +974,7 @@
       </p:grpSpPr>
       <p:sp>
         <p:nvSpPr>
-          <p:cNvPr id="2" name="Zvislý nadpis 1">
-            <a:extLst>
-              <a:ext uri="{FF2B5EF4-FFF2-40B4-BE49-F238E27FC236}">
-                <a16:creationId xmlns:a16="http://schemas.microsoft.com/office/drawing/2014/main" id="{10A3D9DE-D995-4597-841D-A199A418FD47}"/>
-              </a:ext>
-            </a:extLst>
-          </p:cNvPr>
+          <p:cNvPr id="2" name="Vertical Title 1"/>
           <p:cNvSpPr>
             <a:spLocks noGrp="1"/>
           </p:cNvSpPr>
@@ -578,8 +984,8 @@
         </p:nvSpPr>
         <p:spPr>
           <a:xfrm>
-            <a:off x="8724900" y="365125"/>
-            <a:ext cx="2628900" cy="5811838"/>
+            <a:off x="8724900" y="762000"/>
+            <a:ext cx="2324100" cy="5410200"/>
           </a:xfrm>
         </p:spPr>
         <p:txBody>
@@ -588,20 +994,15 @@
           <a:p>
             <a:r>
               <a:rPr lang="sk-SK"/>
-              <a:t>Upravte štýly predlohy textu</a:t>
-            </a:r>
-          </a:p>
-        </p:txBody>
-      </p:sp>
-      <p:sp>
-        <p:nvSpPr>
-          <p:cNvPr id="3" name="Zástupný objekt pre zvislý text 2">
-            <a:extLst>
-              <a:ext uri="{FF2B5EF4-FFF2-40B4-BE49-F238E27FC236}">
-                <a16:creationId xmlns:a16="http://schemas.microsoft.com/office/drawing/2014/main" id="{BAFD5176-616D-469C-9BCC-D330BFEC0570}"/>
-              </a:ext>
-            </a:extLst>
-          </p:cNvPr>
+              <a:t>Kliknutím upravte štýl predlohy nadpisu</a:t>
+            </a:r>
+            <a:endParaRPr lang="en-US" dirty="0"/>
+          </a:p>
+        </p:txBody>
+      </p:sp>
+      <p:sp>
+        <p:nvSpPr>
+          <p:cNvPr id="3" name="Vertical Text Placeholder 2"/>
           <p:cNvSpPr>
             <a:spLocks noGrp="1"/>
           </p:cNvSpPr>
@@ -611,8 +1012,8 @@
         </p:nvSpPr>
         <p:spPr>
           <a:xfrm>
-            <a:off x="838200" y="365125"/>
-            <a:ext cx="7734300" cy="5811838"/>
+            <a:off x="1143000" y="762000"/>
+            <a:ext cx="7429500" cy="5410200"/>
           </a:xfrm>
         </p:spPr>
         <p:txBody>
@@ -652,18 +1053,13 @@
               <a:rPr lang="sk-SK"/>
               <a:t>Piata úroveň</a:t>
             </a:r>
-          </a:p>
-        </p:txBody>
-      </p:sp>
-      <p:sp>
-        <p:nvSpPr>
-          <p:cNvPr id="4" name="Zástupný objekt pre dátum 3">
-            <a:extLst>
-              <a:ext uri="{FF2B5EF4-FFF2-40B4-BE49-F238E27FC236}">
-                <a16:creationId xmlns:a16="http://schemas.microsoft.com/office/drawing/2014/main" id="{40F661C1-1766-481E-A156-EB439EB5CDF3}"/>
-              </a:ext>
-            </a:extLst>
-          </p:cNvPr>
+            <a:endParaRPr lang="en-US" dirty="0"/>
+          </a:p>
+        </p:txBody>
+      </p:sp>
+      <p:sp>
+        <p:nvSpPr>
+          <p:cNvPr id="4" name="Date Placeholder 3"/>
           <p:cNvSpPr>
             <a:spLocks noGrp="1"/>
           </p:cNvSpPr>
@@ -676,9 +1072,9 @@
           <a:bodyPr/>
           <a:lstStyle/>
           <a:p>
-            <a:fld id="{907F850C-ACB2-47B0-B08E-A47B5F65801F}" type="datetimeFigureOut">
+            <a:fld id="{F11258C5-8FC7-4E6A-A624-7D9BBC19B299}" type="datetime1">
               <a:rPr lang="sk-SK" smtClean="0"/>
-              <a:t>24. 10. 2017</a:t>
+              <a:t>25. 10. 2017</a:t>
             </a:fld>
             <a:endParaRPr lang="sk-SK"/>
           </a:p>
@@ -686,13 +1082,7 @@
       </p:sp>
       <p:sp>
         <p:nvSpPr>
-          <p:cNvPr id="5" name="Zástupný objekt pre pätu 4">
-            <a:extLst>
-              <a:ext uri="{FF2B5EF4-FFF2-40B4-BE49-F238E27FC236}">
-                <a16:creationId xmlns:a16="http://schemas.microsoft.com/office/drawing/2014/main" id="{05924128-E8AC-4695-910A-3D81B02655BB}"/>
-              </a:ext>
-            </a:extLst>
-          </p:cNvPr>
+          <p:cNvPr id="5" name="Footer Placeholder 4"/>
           <p:cNvSpPr>
             <a:spLocks noGrp="1"/>
           </p:cNvSpPr>
@@ -711,13 +1101,7 @@
       </p:sp>
       <p:sp>
         <p:nvSpPr>
-          <p:cNvPr id="6" name="Zástupný objekt pre číslo snímky 5">
-            <a:extLst>
-              <a:ext uri="{FF2B5EF4-FFF2-40B4-BE49-F238E27FC236}">
-                <a16:creationId xmlns:a16="http://schemas.microsoft.com/office/drawing/2014/main" id="{01566971-94D4-44E6-935A-CFB219CD0BFB}"/>
-              </a:ext>
-            </a:extLst>
-          </p:cNvPr>
+          <p:cNvPr id="6" name="Slide Number Placeholder 5"/>
           <p:cNvSpPr>
             <a:spLocks noGrp="1"/>
           </p:cNvSpPr>
@@ -741,7 +1125,7 @@
     </p:spTree>
     <p:extLst>
       <p:ext uri="{BB962C8B-B14F-4D97-AF65-F5344CB8AC3E}">
-        <p14:creationId xmlns:p14="http://schemas.microsoft.com/office/powerpoint/2010/main" val="1863619466"/>
+        <p14:creationId xmlns:p14="http://schemas.microsoft.com/office/powerpoint/2010/main" val="475134851"/>
       </p:ext>
     </p:extLst>
   </p:cSld>
@@ -753,7 +1137,7 @@
 
 <file path=ppt/slideLayouts/slideLayout2.xml><?xml version="1.0" encoding="utf-8"?>
 <p:sldLayout xmlns:a="http://schemas.openxmlformats.org/drawingml/2006/main" xmlns:r="http://schemas.openxmlformats.org/officeDocument/2006/relationships" xmlns:p="http://schemas.openxmlformats.org/presentationml/2006/main" type="obj" preserve="1">
-  <p:cSld name="Nadpis a obsah">
+  <p:cSld name="Title and Content">
     <p:spTree>
       <p:nvGrpSpPr>
         <p:cNvPr id="1" name=""/>
@@ -770,13 +1154,7 @@
       </p:grpSpPr>
       <p:sp>
         <p:nvSpPr>
-          <p:cNvPr id="2" name="Nadpis 1">
-            <a:extLst>
-              <a:ext uri="{FF2B5EF4-FFF2-40B4-BE49-F238E27FC236}">
-                <a16:creationId xmlns:a16="http://schemas.microsoft.com/office/drawing/2014/main" id="{982BA4DE-281E-4EEB-82DD-EB23267987E3}"/>
-              </a:ext>
-            </a:extLst>
-          </p:cNvPr>
+          <p:cNvPr id="2" name="Title 1"/>
           <p:cNvSpPr>
             <a:spLocks noGrp="1"/>
           </p:cNvSpPr>
@@ -791,20 +1169,15 @@
           <a:p>
             <a:r>
               <a:rPr lang="sk-SK"/>
-              <a:t>Upravte štýly predlohy textu</a:t>
-            </a:r>
-          </a:p>
-        </p:txBody>
-      </p:sp>
-      <p:sp>
-        <p:nvSpPr>
-          <p:cNvPr id="3" name="Zástupný objekt pre obsah 2">
-            <a:extLst>
-              <a:ext uri="{FF2B5EF4-FFF2-40B4-BE49-F238E27FC236}">
-                <a16:creationId xmlns:a16="http://schemas.microsoft.com/office/drawing/2014/main" id="{999E20E5-2C4B-4132-8701-2A7DA16A60C4}"/>
-              </a:ext>
-            </a:extLst>
-          </p:cNvPr>
+              <a:t>Kliknutím upravte štýl predlohy nadpisu</a:t>
+            </a:r>
+            <a:endParaRPr lang="en-US" dirty="0"/>
+          </a:p>
+        </p:txBody>
+      </p:sp>
+      <p:sp>
+        <p:nvSpPr>
+          <p:cNvPr id="3" name="Content Placeholder 2"/>
           <p:cNvSpPr>
             <a:spLocks noGrp="1"/>
           </p:cNvSpPr>
@@ -850,18 +1223,13 @@
               <a:rPr lang="sk-SK"/>
               <a:t>Piata úroveň</a:t>
             </a:r>
-          </a:p>
-        </p:txBody>
-      </p:sp>
-      <p:sp>
-        <p:nvSpPr>
-          <p:cNvPr id="4" name="Zástupný objekt pre dátum 3">
-            <a:extLst>
-              <a:ext uri="{FF2B5EF4-FFF2-40B4-BE49-F238E27FC236}">
-                <a16:creationId xmlns:a16="http://schemas.microsoft.com/office/drawing/2014/main" id="{6698D837-2B6E-476D-AFD5-D9591BC35984}"/>
-              </a:ext>
-            </a:extLst>
-          </p:cNvPr>
+            <a:endParaRPr lang="en-US" dirty="0"/>
+          </a:p>
+        </p:txBody>
+      </p:sp>
+      <p:sp>
+        <p:nvSpPr>
+          <p:cNvPr id="4" name="Date Placeholder 3"/>
           <p:cNvSpPr>
             <a:spLocks noGrp="1"/>
           </p:cNvSpPr>
@@ -874,9 +1242,9 @@
           <a:bodyPr/>
           <a:lstStyle/>
           <a:p>
-            <a:fld id="{907F850C-ACB2-47B0-B08E-A47B5F65801F}" type="datetimeFigureOut">
+            <a:fld id="{F66BAF30-D307-4D92-B0A8-31B4DD75D02E}" type="datetime1">
               <a:rPr lang="sk-SK" smtClean="0"/>
-              <a:t>24. 10. 2017</a:t>
+              <a:t>25. 10. 2017</a:t>
             </a:fld>
             <a:endParaRPr lang="sk-SK"/>
           </a:p>
@@ -884,13 +1252,7 @@
       </p:sp>
       <p:sp>
         <p:nvSpPr>
-          <p:cNvPr id="5" name="Zástupný objekt pre pätu 4">
-            <a:extLst>
-              <a:ext uri="{FF2B5EF4-FFF2-40B4-BE49-F238E27FC236}">
-                <a16:creationId xmlns:a16="http://schemas.microsoft.com/office/drawing/2014/main" id="{369F2BED-B457-42A5-BC49-717193B6095D}"/>
-              </a:ext>
-            </a:extLst>
-          </p:cNvPr>
+          <p:cNvPr id="5" name="Footer Placeholder 4"/>
           <p:cNvSpPr>
             <a:spLocks noGrp="1"/>
           </p:cNvSpPr>
@@ -909,13 +1271,7 @@
       </p:sp>
       <p:sp>
         <p:nvSpPr>
-          <p:cNvPr id="6" name="Zástupný objekt pre číslo snímky 5">
-            <a:extLst>
-              <a:ext uri="{FF2B5EF4-FFF2-40B4-BE49-F238E27FC236}">
-                <a16:creationId xmlns:a16="http://schemas.microsoft.com/office/drawing/2014/main" id="{702E72BE-FC6D-4462-A7B4-2D0D7E442C7A}"/>
-              </a:ext>
-            </a:extLst>
-          </p:cNvPr>
+          <p:cNvPr id="6" name="Slide Number Placeholder 5"/>
           <p:cNvSpPr>
             <a:spLocks noGrp="1"/>
           </p:cNvSpPr>
@@ -939,7 +1295,7 @@
     </p:spTree>
     <p:extLst>
       <p:ext uri="{BB962C8B-B14F-4D97-AF65-F5344CB8AC3E}">
-        <p14:creationId xmlns:p14="http://schemas.microsoft.com/office/powerpoint/2010/main" val="2164477173"/>
+        <p14:creationId xmlns:p14="http://schemas.microsoft.com/office/powerpoint/2010/main" val="3374181821"/>
       </p:ext>
     </p:extLst>
   </p:cSld>
@@ -968,13 +1324,7 @@
       </p:grpSpPr>
       <p:sp>
         <p:nvSpPr>
-          <p:cNvPr id="2" name="Nadpis 1">
-            <a:extLst>
-              <a:ext uri="{FF2B5EF4-FFF2-40B4-BE49-F238E27FC236}">
-                <a16:creationId xmlns:a16="http://schemas.microsoft.com/office/drawing/2014/main" id="{8AFC093C-7688-4D09-AB62-00B85C4262A7}"/>
-              </a:ext>
-            </a:extLst>
-          </p:cNvPr>
+          <p:cNvPr id="2" name="Title 1"/>
           <p:cNvSpPr>
             <a:spLocks noGrp="1"/>
           </p:cNvSpPr>
@@ -984,34 +1334,34 @@
         </p:nvSpPr>
         <p:spPr>
           <a:xfrm>
-            <a:off x="831850" y="1709738"/>
-            <a:ext cx="10515600" cy="2852737"/>
+            <a:off x="1106424" y="1173575"/>
+            <a:ext cx="9966960" cy="2926080"/>
           </a:xfrm>
         </p:spPr>
         <p:txBody>
-          <a:bodyPr anchor="b"/>
+          <a:bodyPr anchor="b">
+            <a:noAutofit/>
+          </a:bodyPr>
           <a:lstStyle>
-            <a:lvl1pPr>
-              <a:defRPr sz="6000"/>
+            <a:lvl1pPr algn="ctr">
+              <a:lnSpc>
+                <a:spcPct val="85000"/>
+              </a:lnSpc>
+              <a:defRPr sz="7200" b="0" cap="all" baseline="0"/>
             </a:lvl1pPr>
           </a:lstStyle>
           <a:p>
             <a:r>
               <a:rPr lang="sk-SK"/>
-              <a:t>Upravte štýly predlohy textu</a:t>
-            </a:r>
-          </a:p>
-        </p:txBody>
-      </p:sp>
-      <p:sp>
-        <p:nvSpPr>
-          <p:cNvPr id="3" name="Zástupný objekt pre text 2">
-            <a:extLst>
-              <a:ext uri="{FF2B5EF4-FFF2-40B4-BE49-F238E27FC236}">
-                <a16:creationId xmlns:a16="http://schemas.microsoft.com/office/drawing/2014/main" id="{4B920A01-9579-4DA1-90E1-18EA310B0D3A}"/>
-              </a:ext>
-            </a:extLst>
-          </p:cNvPr>
+              <a:t>Kliknutím upravte štýl predlohy nadpisu</a:t>
+            </a:r>
+            <a:endParaRPr lang="en-US" dirty="0"/>
+          </a:p>
+        </p:txBody>
+      </p:sp>
+      <p:sp>
+        <p:nvSpPr>
+          <p:cNvPr id="3" name="Text Placeholder 2"/>
           <p:cNvSpPr>
             <a:spLocks noGrp="1"/>
           </p:cNvSpPr>
@@ -1021,26 +1371,26 @@
         </p:nvSpPr>
         <p:spPr>
           <a:xfrm>
-            <a:off x="831850" y="4589463"/>
-            <a:ext cx="10515600" cy="1500187"/>
+            <a:off x="1709928" y="4154520"/>
+            <a:ext cx="8769096" cy="1363806"/>
           </a:xfrm>
         </p:spPr>
         <p:txBody>
-          <a:bodyPr/>
+          <a:bodyPr anchor="t">
+            <a:normAutofit/>
+          </a:bodyPr>
           <a:lstStyle>
-            <a:lvl1pPr marL="0" indent="0">
-              <a:buNone/>
-              <a:defRPr sz="2400">
+            <a:lvl1pPr marL="0" indent="0" algn="ctr">
+              <a:buNone/>
+              <a:defRPr sz="2200">
                 <a:solidFill>
-                  <a:schemeClr val="tx1">
-                    <a:tint val="75000"/>
-                  </a:schemeClr>
+                  <a:schemeClr val="accent1"/>
                 </a:solidFill>
               </a:defRPr>
             </a:lvl1pPr>
             <a:lvl2pPr marL="457200" indent="0">
               <a:buNone/>
-              <a:defRPr sz="2000">
+              <a:defRPr sz="1800">
                 <a:solidFill>
                   <a:schemeClr val="tx1">
                     <a:tint val="75000"/>
@@ -1050,7 +1400,7 @@
             </a:lvl2pPr>
             <a:lvl3pPr marL="914400" indent="0">
               <a:buNone/>
-              <a:defRPr sz="1800">
+              <a:defRPr sz="1600">
                 <a:solidFill>
                   <a:schemeClr val="tx1">
                     <a:tint val="75000"/>
@@ -1060,7 +1410,7 @@
             </a:lvl3pPr>
             <a:lvl4pPr marL="1371600" indent="0">
               <a:buNone/>
-              <a:defRPr sz="1600">
+              <a:defRPr sz="1400">
                 <a:solidFill>
                   <a:schemeClr val="tx1">
                     <a:tint val="75000"/>
@@ -1070,7 +1420,7 @@
             </a:lvl4pPr>
             <a:lvl5pPr marL="1828800" indent="0">
               <a:buNone/>
-              <a:defRPr sz="1600">
+              <a:defRPr sz="1400">
                 <a:solidFill>
                   <a:schemeClr val="tx1">
                     <a:tint val="75000"/>
@@ -1080,7 +1430,7 @@
             </a:lvl5pPr>
             <a:lvl6pPr marL="2286000" indent="0">
               <a:buNone/>
-              <a:defRPr sz="1600">
+              <a:defRPr sz="1400">
                 <a:solidFill>
                   <a:schemeClr val="tx1">
                     <a:tint val="75000"/>
@@ -1090,7 +1440,7 @@
             </a:lvl6pPr>
             <a:lvl7pPr marL="2743200" indent="0">
               <a:buNone/>
-              <a:defRPr sz="1600">
+              <a:defRPr sz="1400">
                 <a:solidFill>
                   <a:schemeClr val="tx1">
                     <a:tint val="75000"/>
@@ -1100,7 +1450,7 @@
             </a:lvl7pPr>
             <a:lvl8pPr marL="3200400" indent="0">
               <a:buNone/>
-              <a:defRPr sz="1600">
+              <a:defRPr sz="1400">
                 <a:solidFill>
                   <a:schemeClr val="tx1">
                     <a:tint val="75000"/>
@@ -1110,7 +1460,7 @@
             </a:lvl8pPr>
             <a:lvl9pPr marL="3657600" indent="0">
               <a:buNone/>
-              <a:defRPr sz="1600">
+              <a:defRPr sz="1400">
                 <a:solidFill>
                   <a:schemeClr val="tx1">
                     <a:tint val="75000"/>
@@ -1130,13 +1480,7 @@
       </p:sp>
       <p:sp>
         <p:nvSpPr>
-          <p:cNvPr id="4" name="Zástupný objekt pre dátum 3">
-            <a:extLst>
-              <a:ext uri="{FF2B5EF4-FFF2-40B4-BE49-F238E27FC236}">
-                <a16:creationId xmlns:a16="http://schemas.microsoft.com/office/drawing/2014/main" id="{6A35AA92-CB8E-4AC7-94A9-9560926D8A38}"/>
-              </a:ext>
-            </a:extLst>
-          </p:cNvPr>
+          <p:cNvPr id="4" name="Date Placeholder 3"/>
           <p:cNvSpPr>
             <a:spLocks noGrp="1"/>
           </p:cNvSpPr>
@@ -1149,9 +1493,9 @@
           <a:bodyPr/>
           <a:lstStyle/>
           <a:p>
-            <a:fld id="{907F850C-ACB2-47B0-B08E-A47B5F65801F}" type="datetimeFigureOut">
+            <a:fld id="{68F8CCEA-900F-41D1-9ACE-62131DBE372F}" type="datetime1">
               <a:rPr lang="sk-SK" smtClean="0"/>
-              <a:t>24. 10. 2017</a:t>
+              <a:t>25. 10. 2017</a:t>
             </a:fld>
             <a:endParaRPr lang="sk-SK"/>
           </a:p>
@@ -1159,13 +1503,7 @@
       </p:sp>
       <p:sp>
         <p:nvSpPr>
-          <p:cNvPr id="5" name="Zástupný objekt pre pätu 4">
-            <a:extLst>
-              <a:ext uri="{FF2B5EF4-FFF2-40B4-BE49-F238E27FC236}">
-                <a16:creationId xmlns:a16="http://schemas.microsoft.com/office/drawing/2014/main" id="{55788726-4997-4FAE-8DC8-8A08BAE0810B}"/>
-              </a:ext>
-            </a:extLst>
-          </p:cNvPr>
+          <p:cNvPr id="5" name="Footer Placeholder 4"/>
           <p:cNvSpPr>
             <a:spLocks noGrp="1"/>
           </p:cNvSpPr>
@@ -1184,13 +1522,7 @@
       </p:sp>
       <p:sp>
         <p:nvSpPr>
-          <p:cNvPr id="6" name="Zástupný objekt pre číslo snímky 5">
-            <a:extLst>
-              <a:ext uri="{FF2B5EF4-FFF2-40B4-BE49-F238E27FC236}">
-                <a16:creationId xmlns:a16="http://schemas.microsoft.com/office/drawing/2014/main" id="{A27D0287-62CC-401E-B85A-8E9C395A2AA3}"/>
-              </a:ext>
-            </a:extLst>
-          </p:cNvPr>
+          <p:cNvPr id="6" name="Slide Number Placeholder 5"/>
           <p:cNvSpPr>
             <a:spLocks noGrp="1"/>
           </p:cNvSpPr>
@@ -1211,10 +1543,45 @@
           </a:p>
         </p:txBody>
       </p:sp>
+      <p:cxnSp>
+        <p:nvCxnSpPr>
+          <p:cNvPr id="7" name="Straight Connector 6"/>
+          <p:cNvCxnSpPr/>
+          <p:nvPr/>
+        </p:nvCxnSpPr>
+        <p:spPr>
+          <a:xfrm>
+            <a:off x="1981200" y="4020408"/>
+            <a:ext cx="8229601" cy="0"/>
+          </a:xfrm>
+          <a:prstGeom prst="line">
+            <a:avLst/>
+          </a:prstGeom>
+          <a:ln>
+            <a:solidFill>
+              <a:schemeClr val="accent1"/>
+            </a:solidFill>
+          </a:ln>
+        </p:spPr>
+        <p:style>
+          <a:lnRef idx="1">
+            <a:schemeClr val="accent1"/>
+          </a:lnRef>
+          <a:fillRef idx="0">
+            <a:schemeClr val="accent1"/>
+          </a:fillRef>
+          <a:effectRef idx="0">
+            <a:schemeClr val="accent1"/>
+          </a:effectRef>
+          <a:fontRef idx="minor">
+            <a:schemeClr val="tx1"/>
+          </a:fontRef>
+        </p:style>
+      </p:cxnSp>
     </p:spTree>
     <p:extLst>
       <p:ext uri="{BB962C8B-B14F-4D97-AF65-F5344CB8AC3E}">
-        <p14:creationId xmlns:p14="http://schemas.microsoft.com/office/powerpoint/2010/main" val="3852315071"/>
+        <p14:creationId xmlns:p14="http://schemas.microsoft.com/office/powerpoint/2010/main" val="46322091"/>
       </p:ext>
     </p:extLst>
   </p:cSld>
@@ -1243,13 +1610,7 @@
       </p:grpSpPr>
       <p:sp>
         <p:nvSpPr>
-          <p:cNvPr id="2" name="Nadpis 1">
-            <a:extLst>
-              <a:ext uri="{FF2B5EF4-FFF2-40B4-BE49-F238E27FC236}">
-                <a16:creationId xmlns:a16="http://schemas.microsoft.com/office/drawing/2014/main" id="{11148492-6FBD-4A42-B792-D1FA2557DA64}"/>
-              </a:ext>
-            </a:extLst>
-          </p:cNvPr>
+          <p:cNvPr id="8" name="Title 7"/>
           <p:cNvSpPr>
             <a:spLocks noGrp="1"/>
           </p:cNvSpPr>
@@ -1264,20 +1625,15 @@
           <a:p>
             <a:r>
               <a:rPr lang="sk-SK"/>
-              <a:t>Upravte štýly predlohy textu</a:t>
-            </a:r>
-          </a:p>
-        </p:txBody>
-      </p:sp>
-      <p:sp>
-        <p:nvSpPr>
-          <p:cNvPr id="3" name="Zástupný objekt pre obsah 2">
-            <a:extLst>
-              <a:ext uri="{FF2B5EF4-FFF2-40B4-BE49-F238E27FC236}">
-                <a16:creationId xmlns:a16="http://schemas.microsoft.com/office/drawing/2014/main" id="{E2AB2DBA-A888-49F1-8BFC-A74EA3ACD388}"/>
-              </a:ext>
-            </a:extLst>
-          </p:cNvPr>
+              <a:t>Kliknutím upravte štýl predlohy nadpisu</a:t>
+            </a:r>
+            <a:endParaRPr lang="en-US" dirty="0"/>
+          </a:p>
+        </p:txBody>
+      </p:sp>
+      <p:sp>
+        <p:nvSpPr>
+          <p:cNvPr id="3" name="Content Placeholder 2"/>
           <p:cNvSpPr>
             <a:spLocks noGrp="1"/>
           </p:cNvSpPr>
@@ -1287,13 +1643,41 @@
         </p:nvSpPr>
         <p:spPr>
           <a:xfrm>
-            <a:off x="838200" y="1825625"/>
-            <a:ext cx="5181600" cy="4351338"/>
+            <a:off x="1143000" y="2057399"/>
+            <a:ext cx="4754880" cy="4023360"/>
           </a:xfrm>
         </p:spPr>
         <p:txBody>
           <a:bodyPr/>
-          <a:lstStyle/>
+          <a:lstStyle>
+            <a:lvl1pPr>
+              <a:defRPr sz="2200"/>
+            </a:lvl1pPr>
+            <a:lvl2pPr>
+              <a:defRPr sz="2000"/>
+            </a:lvl2pPr>
+            <a:lvl3pPr>
+              <a:defRPr sz="1800"/>
+            </a:lvl3pPr>
+            <a:lvl4pPr>
+              <a:defRPr sz="1600"/>
+            </a:lvl4pPr>
+            <a:lvl5pPr>
+              <a:defRPr sz="1600"/>
+            </a:lvl5pPr>
+            <a:lvl6pPr>
+              <a:defRPr sz="1600"/>
+            </a:lvl6pPr>
+            <a:lvl7pPr>
+              <a:defRPr sz="1600"/>
+            </a:lvl7pPr>
+            <a:lvl8pPr>
+              <a:defRPr sz="1600"/>
+            </a:lvl8pPr>
+            <a:lvl9pPr>
+              <a:defRPr sz="1600"/>
+            </a:lvl9pPr>
+          </a:lstStyle>
           <a:p>
             <a:pPr lvl="0"/>
             <a:r>
@@ -1328,18 +1712,13 @@
               <a:rPr lang="sk-SK"/>
               <a:t>Piata úroveň</a:t>
             </a:r>
-          </a:p>
-        </p:txBody>
-      </p:sp>
-      <p:sp>
-        <p:nvSpPr>
-          <p:cNvPr id="4" name="Zástupný objekt pre obsah 3">
-            <a:extLst>
-              <a:ext uri="{FF2B5EF4-FFF2-40B4-BE49-F238E27FC236}">
-                <a16:creationId xmlns:a16="http://schemas.microsoft.com/office/drawing/2014/main" id="{9CBF94D3-B6E1-4AAA-87BB-9612B56A03B1}"/>
-              </a:ext>
-            </a:extLst>
-          </p:cNvPr>
+            <a:endParaRPr lang="en-US" dirty="0"/>
+          </a:p>
+        </p:txBody>
+      </p:sp>
+      <p:sp>
+        <p:nvSpPr>
+          <p:cNvPr id="4" name="Content Placeholder 3"/>
           <p:cNvSpPr>
             <a:spLocks noGrp="1"/>
           </p:cNvSpPr>
@@ -1349,13 +1728,41 @@
         </p:nvSpPr>
         <p:spPr>
           <a:xfrm>
-            <a:off x="6172200" y="1825625"/>
-            <a:ext cx="5181600" cy="4351338"/>
+            <a:off x="6267612" y="2057400"/>
+            <a:ext cx="4754880" cy="4023360"/>
           </a:xfrm>
         </p:spPr>
         <p:txBody>
           <a:bodyPr/>
-          <a:lstStyle/>
+          <a:lstStyle>
+            <a:lvl1pPr>
+              <a:defRPr sz="2200"/>
+            </a:lvl1pPr>
+            <a:lvl2pPr>
+              <a:defRPr sz="2000"/>
+            </a:lvl2pPr>
+            <a:lvl3pPr>
+              <a:defRPr sz="1800"/>
+            </a:lvl3pPr>
+            <a:lvl4pPr>
+              <a:defRPr sz="1600"/>
+            </a:lvl4pPr>
+            <a:lvl5pPr>
+              <a:defRPr sz="1600"/>
+            </a:lvl5pPr>
+            <a:lvl6pPr>
+              <a:defRPr sz="1600"/>
+            </a:lvl6pPr>
+            <a:lvl7pPr>
+              <a:defRPr sz="1600"/>
+            </a:lvl7pPr>
+            <a:lvl8pPr>
+              <a:defRPr sz="1600"/>
+            </a:lvl8pPr>
+            <a:lvl9pPr>
+              <a:defRPr sz="1600"/>
+            </a:lvl9pPr>
+          </a:lstStyle>
           <a:p>
             <a:pPr lvl="0"/>
             <a:r>
@@ -1390,18 +1797,13 @@
               <a:rPr lang="sk-SK"/>
               <a:t>Piata úroveň</a:t>
             </a:r>
-          </a:p>
-        </p:txBody>
-      </p:sp>
-      <p:sp>
-        <p:nvSpPr>
-          <p:cNvPr id="5" name="Zástupný objekt pre dátum 4">
-            <a:extLst>
-              <a:ext uri="{FF2B5EF4-FFF2-40B4-BE49-F238E27FC236}">
-                <a16:creationId xmlns:a16="http://schemas.microsoft.com/office/drawing/2014/main" id="{0512B3CF-5448-4DF2-82A3-61446C1A939C}"/>
-              </a:ext>
-            </a:extLst>
-          </p:cNvPr>
+            <a:endParaRPr lang="en-US" dirty="0"/>
+          </a:p>
+        </p:txBody>
+      </p:sp>
+      <p:sp>
+        <p:nvSpPr>
+          <p:cNvPr id="5" name="Date Placeholder 4"/>
           <p:cNvSpPr>
             <a:spLocks noGrp="1"/>
           </p:cNvSpPr>
@@ -1414,9 +1816,9 @@
           <a:bodyPr/>
           <a:lstStyle/>
           <a:p>
-            <a:fld id="{907F850C-ACB2-47B0-B08E-A47B5F65801F}" type="datetimeFigureOut">
+            <a:fld id="{00ABBCF6-FDCF-45D8-B91A-273B4B9E1895}" type="datetime1">
               <a:rPr lang="sk-SK" smtClean="0"/>
-              <a:t>24. 10. 2017</a:t>
+              <a:t>25. 10. 2017</a:t>
             </a:fld>
             <a:endParaRPr lang="sk-SK"/>
           </a:p>
@@ -1424,13 +1826,7 @@
       </p:sp>
       <p:sp>
         <p:nvSpPr>
-          <p:cNvPr id="6" name="Zástupný objekt pre pätu 5">
-            <a:extLst>
-              <a:ext uri="{FF2B5EF4-FFF2-40B4-BE49-F238E27FC236}">
-                <a16:creationId xmlns:a16="http://schemas.microsoft.com/office/drawing/2014/main" id="{BEEBA78F-00E4-447C-8361-170FB8517C89}"/>
-              </a:ext>
-            </a:extLst>
-          </p:cNvPr>
+          <p:cNvPr id="6" name="Footer Placeholder 5"/>
           <p:cNvSpPr>
             <a:spLocks noGrp="1"/>
           </p:cNvSpPr>
@@ -1449,13 +1845,7 @@
       </p:sp>
       <p:sp>
         <p:nvSpPr>
-          <p:cNvPr id="7" name="Zástupný objekt pre číslo snímky 6">
-            <a:extLst>
-              <a:ext uri="{FF2B5EF4-FFF2-40B4-BE49-F238E27FC236}">
-                <a16:creationId xmlns:a16="http://schemas.microsoft.com/office/drawing/2014/main" id="{CCBCB2E8-9C6C-47B8-A4F5-0C38FAEFC2D1}"/>
-              </a:ext>
-            </a:extLst>
-          </p:cNvPr>
+          <p:cNvPr id="7" name="Slide Number Placeholder 6"/>
           <p:cNvSpPr>
             <a:spLocks noGrp="1"/>
           </p:cNvSpPr>
@@ -1479,7 +1869,7 @@
     </p:spTree>
     <p:extLst>
       <p:ext uri="{BB962C8B-B14F-4D97-AF65-F5344CB8AC3E}">
-        <p14:creationId xmlns:p14="http://schemas.microsoft.com/office/powerpoint/2010/main" val="2163746428"/>
+        <p14:creationId xmlns:p14="http://schemas.microsoft.com/office/powerpoint/2010/main" val="3867059129"/>
       </p:ext>
     </p:extLst>
   </p:cSld>
@@ -1508,63 +1898,50 @@
       </p:grpSpPr>
       <p:sp>
         <p:nvSpPr>
-          <p:cNvPr id="2" name="Nadpis 1">
-            <a:extLst>
-              <a:ext uri="{FF2B5EF4-FFF2-40B4-BE49-F238E27FC236}">
-                <a16:creationId xmlns:a16="http://schemas.microsoft.com/office/drawing/2014/main" id="{F7E5F271-4E58-43E1-9B18-553805EEE312}"/>
-              </a:ext>
-            </a:extLst>
-          </p:cNvPr>
+          <p:cNvPr id="10" name="Title 9"/>
           <p:cNvSpPr>
             <a:spLocks noGrp="1"/>
           </p:cNvSpPr>
           <p:nvPr>
             <p:ph type="title"/>
+          </p:nvPr>
+        </p:nvSpPr>
+        <p:spPr/>
+        <p:txBody>
+          <a:bodyPr/>
+          <a:lstStyle/>
+          <a:p>
+            <a:r>
+              <a:rPr lang="sk-SK"/>
+              <a:t>Kliknutím upravte štýl predlohy nadpisu</a:t>
+            </a:r>
+            <a:endParaRPr lang="en-US" dirty="0"/>
+          </a:p>
+        </p:txBody>
+      </p:sp>
+      <p:sp>
+        <p:nvSpPr>
+          <p:cNvPr id="3" name="Text Placeholder 2"/>
+          <p:cNvSpPr>
+            <a:spLocks noGrp="1"/>
+          </p:cNvSpPr>
+          <p:nvPr>
+            <p:ph type="body" idx="1"/>
           </p:nvPr>
         </p:nvSpPr>
         <p:spPr>
           <a:xfrm>
-            <a:off x="839788" y="365125"/>
-            <a:ext cx="10515600" cy="1325563"/>
+            <a:off x="1143000" y="2001511"/>
+            <a:ext cx="4754880" cy="777240"/>
           </a:xfrm>
         </p:spPr>
         <p:txBody>
-          <a:bodyPr/>
-          <a:lstStyle/>
-          <a:p>
-            <a:r>
-              <a:rPr lang="sk-SK"/>
-              <a:t>Upravte štýly predlohy textu</a:t>
-            </a:r>
-          </a:p>
-        </p:txBody>
-      </p:sp>
-      <p:sp>
-        <p:nvSpPr>
-          <p:cNvPr id="3" name="Zástupný objekt pre text 2">
-            <a:extLst>
-              <a:ext uri="{FF2B5EF4-FFF2-40B4-BE49-F238E27FC236}">
-                <a16:creationId xmlns:a16="http://schemas.microsoft.com/office/drawing/2014/main" id="{2ED5F1BD-9CBD-4E16-901D-3524BDFED899}"/>
-              </a:ext>
-            </a:extLst>
-          </p:cNvPr>
-          <p:cNvSpPr>
-            <a:spLocks noGrp="1"/>
-          </p:cNvSpPr>
-          <p:nvPr>
-            <p:ph type="body" idx="1"/>
-          </p:nvPr>
-        </p:nvSpPr>
-        <p:spPr>
-          <a:xfrm>
-            <a:off x="839788" y="1681163"/>
-            <a:ext cx="5157787" cy="823912"/>
-          </a:xfrm>
-        </p:spPr>
-        <p:txBody>
-          <a:bodyPr anchor="b"/>
+          <a:bodyPr anchor="ctr"/>
           <a:lstStyle>
             <a:lvl1pPr marL="0" indent="0">
+              <a:spcBef>
+                <a:spcPts val="0"/>
+              </a:spcBef>
               <a:buNone/>
               <a:defRPr sz="2400" b="1"/>
             </a:lvl1pPr>
@@ -1612,13 +1989,7 @@
       </p:sp>
       <p:sp>
         <p:nvSpPr>
-          <p:cNvPr id="4" name="Zástupný objekt pre obsah 3">
-            <a:extLst>
-              <a:ext uri="{FF2B5EF4-FFF2-40B4-BE49-F238E27FC236}">
-                <a16:creationId xmlns:a16="http://schemas.microsoft.com/office/drawing/2014/main" id="{DAC4BC81-C5D6-42F6-B53D-B633FBC87AAA}"/>
-              </a:ext>
-            </a:extLst>
-          </p:cNvPr>
+          <p:cNvPr id="4" name="Content Placeholder 3"/>
           <p:cNvSpPr>
             <a:spLocks noGrp="1"/>
           </p:cNvSpPr>
@@ -1628,13 +1999,41 @@
         </p:nvSpPr>
         <p:spPr>
           <a:xfrm>
-            <a:off x="839788" y="2505075"/>
-            <a:ext cx="5157787" cy="3684588"/>
+            <a:off x="1143000" y="2721483"/>
+            <a:ext cx="4754880" cy="3383280"/>
           </a:xfrm>
         </p:spPr>
         <p:txBody>
           <a:bodyPr/>
-          <a:lstStyle/>
+          <a:lstStyle>
+            <a:lvl1pPr>
+              <a:defRPr sz="2200"/>
+            </a:lvl1pPr>
+            <a:lvl2pPr>
+              <a:defRPr sz="2000"/>
+            </a:lvl2pPr>
+            <a:lvl3pPr>
+              <a:defRPr sz="1800"/>
+            </a:lvl3pPr>
+            <a:lvl4pPr>
+              <a:defRPr sz="1600"/>
+            </a:lvl4pPr>
+            <a:lvl5pPr>
+              <a:defRPr sz="1600"/>
+            </a:lvl5pPr>
+            <a:lvl6pPr>
+              <a:defRPr sz="1600"/>
+            </a:lvl6pPr>
+            <a:lvl7pPr>
+              <a:defRPr sz="1600"/>
+            </a:lvl7pPr>
+            <a:lvl8pPr>
+              <a:defRPr sz="1600"/>
+            </a:lvl8pPr>
+            <a:lvl9pPr>
+              <a:defRPr sz="1600"/>
+            </a:lvl9pPr>
+          </a:lstStyle>
           <a:p>
             <a:pPr lvl="0"/>
             <a:r>
@@ -1669,18 +2068,13 @@
               <a:rPr lang="sk-SK"/>
               <a:t>Piata úroveň</a:t>
             </a:r>
-          </a:p>
-        </p:txBody>
-      </p:sp>
-      <p:sp>
-        <p:nvSpPr>
-          <p:cNvPr id="5" name="Zástupný objekt pre text 4">
-            <a:extLst>
-              <a:ext uri="{FF2B5EF4-FFF2-40B4-BE49-F238E27FC236}">
-                <a16:creationId xmlns:a16="http://schemas.microsoft.com/office/drawing/2014/main" id="{FE0AB772-A704-4CC8-AE0E-090D0A9C4315}"/>
-              </a:ext>
-            </a:extLst>
-          </p:cNvPr>
+            <a:endParaRPr lang="en-US" dirty="0"/>
+          </a:p>
+        </p:txBody>
+      </p:sp>
+      <p:sp>
+        <p:nvSpPr>
+          <p:cNvPr id="5" name="Text Placeholder 4"/>
           <p:cNvSpPr>
             <a:spLocks noGrp="1"/>
           </p:cNvSpPr>
@@ -1690,14 +2084,17 @@
         </p:nvSpPr>
         <p:spPr>
           <a:xfrm>
-            <a:off x="6172200" y="1681163"/>
-            <a:ext cx="5183188" cy="823912"/>
+            <a:off x="6269173" y="1999032"/>
+            <a:ext cx="4754880" cy="777240"/>
           </a:xfrm>
         </p:spPr>
         <p:txBody>
-          <a:bodyPr anchor="b"/>
+          <a:bodyPr anchor="ctr"/>
           <a:lstStyle>
             <a:lvl1pPr marL="0" indent="0">
+              <a:spcBef>
+                <a:spcPts val="0"/>
+              </a:spcBef>
               <a:buNone/>
               <a:defRPr sz="2400" b="1"/>
             </a:lvl1pPr>
@@ -1745,13 +2142,7 @@
       </p:sp>
       <p:sp>
         <p:nvSpPr>
-          <p:cNvPr id="6" name="Zástupný objekt pre obsah 5">
-            <a:extLst>
-              <a:ext uri="{FF2B5EF4-FFF2-40B4-BE49-F238E27FC236}">
-                <a16:creationId xmlns:a16="http://schemas.microsoft.com/office/drawing/2014/main" id="{D76C8329-DE5F-4C2C-9124-50A54014DE91}"/>
-              </a:ext>
-            </a:extLst>
-          </p:cNvPr>
+          <p:cNvPr id="6" name="Content Placeholder 5"/>
           <p:cNvSpPr>
             <a:spLocks noGrp="1"/>
           </p:cNvSpPr>
@@ -1761,13 +2152,41 @@
         </p:nvSpPr>
         <p:spPr>
           <a:xfrm>
-            <a:off x="6172200" y="2505075"/>
-            <a:ext cx="5183188" cy="3684588"/>
+            <a:off x="6269173" y="2719322"/>
+            <a:ext cx="4754880" cy="3383280"/>
           </a:xfrm>
         </p:spPr>
         <p:txBody>
           <a:bodyPr/>
-          <a:lstStyle/>
+          <a:lstStyle>
+            <a:lvl1pPr>
+              <a:defRPr sz="2200"/>
+            </a:lvl1pPr>
+            <a:lvl2pPr>
+              <a:defRPr sz="2000"/>
+            </a:lvl2pPr>
+            <a:lvl3pPr>
+              <a:defRPr sz="1800"/>
+            </a:lvl3pPr>
+            <a:lvl4pPr>
+              <a:defRPr sz="1600"/>
+            </a:lvl4pPr>
+            <a:lvl5pPr>
+              <a:defRPr sz="1600"/>
+            </a:lvl5pPr>
+            <a:lvl6pPr>
+              <a:defRPr sz="1600"/>
+            </a:lvl6pPr>
+            <a:lvl7pPr>
+              <a:defRPr sz="1600"/>
+            </a:lvl7pPr>
+            <a:lvl8pPr>
+              <a:defRPr sz="1600"/>
+            </a:lvl8pPr>
+            <a:lvl9pPr>
+              <a:defRPr sz="1600"/>
+            </a:lvl9pPr>
+          </a:lstStyle>
           <a:p>
             <a:pPr lvl="0"/>
             <a:r>
@@ -1802,18 +2221,13 @@
               <a:rPr lang="sk-SK"/>
               <a:t>Piata úroveň</a:t>
             </a:r>
-          </a:p>
-        </p:txBody>
-      </p:sp>
-      <p:sp>
-        <p:nvSpPr>
-          <p:cNvPr id="7" name="Zástupný objekt pre dátum 6">
-            <a:extLst>
-              <a:ext uri="{FF2B5EF4-FFF2-40B4-BE49-F238E27FC236}">
-                <a16:creationId xmlns:a16="http://schemas.microsoft.com/office/drawing/2014/main" id="{E770A259-E91A-4AFC-B80B-CF4DDD1B1E57}"/>
-              </a:ext>
-            </a:extLst>
-          </p:cNvPr>
+            <a:endParaRPr lang="en-US" dirty="0"/>
+          </a:p>
+        </p:txBody>
+      </p:sp>
+      <p:sp>
+        <p:nvSpPr>
+          <p:cNvPr id="7" name="Date Placeholder 6"/>
           <p:cNvSpPr>
             <a:spLocks noGrp="1"/>
           </p:cNvSpPr>
@@ -1826,9 +2240,9 @@
           <a:bodyPr/>
           <a:lstStyle/>
           <a:p>
-            <a:fld id="{907F850C-ACB2-47B0-B08E-A47B5F65801F}" type="datetimeFigureOut">
+            <a:fld id="{5B927CB4-600B-439E-9C64-7E7FDF0AFFF2}" type="datetime1">
               <a:rPr lang="sk-SK" smtClean="0"/>
-              <a:t>24. 10. 2017</a:t>
+              <a:t>25. 10. 2017</a:t>
             </a:fld>
             <a:endParaRPr lang="sk-SK"/>
           </a:p>
@@ -1836,13 +2250,7 @@
       </p:sp>
       <p:sp>
         <p:nvSpPr>
-          <p:cNvPr id="8" name="Zástupný objekt pre pätu 7">
-            <a:extLst>
-              <a:ext uri="{FF2B5EF4-FFF2-40B4-BE49-F238E27FC236}">
-                <a16:creationId xmlns:a16="http://schemas.microsoft.com/office/drawing/2014/main" id="{18B0E0BE-0A2C-4021-9DD9-C77F449A7B58}"/>
-              </a:ext>
-            </a:extLst>
-          </p:cNvPr>
+          <p:cNvPr id="8" name="Footer Placeholder 7"/>
           <p:cNvSpPr>
             <a:spLocks noGrp="1"/>
           </p:cNvSpPr>
@@ -1861,13 +2269,7 @@
       </p:sp>
       <p:sp>
         <p:nvSpPr>
-          <p:cNvPr id="9" name="Zástupný objekt pre číslo snímky 8">
-            <a:extLst>
-              <a:ext uri="{FF2B5EF4-FFF2-40B4-BE49-F238E27FC236}">
-                <a16:creationId xmlns:a16="http://schemas.microsoft.com/office/drawing/2014/main" id="{09D46D71-2128-47E3-81E0-3338D3F6F223}"/>
-              </a:ext>
-            </a:extLst>
-          </p:cNvPr>
+          <p:cNvPr id="9" name="Slide Number Placeholder 8"/>
           <p:cNvSpPr>
             <a:spLocks noGrp="1"/>
           </p:cNvSpPr>
@@ -1891,7 +2293,7 @@
     </p:spTree>
     <p:extLst>
       <p:ext uri="{BB962C8B-B14F-4D97-AF65-F5344CB8AC3E}">
-        <p14:creationId xmlns:p14="http://schemas.microsoft.com/office/powerpoint/2010/main" val="4090296050"/>
+        <p14:creationId xmlns:p14="http://schemas.microsoft.com/office/powerpoint/2010/main" val="3335309203"/>
       </p:ext>
     </p:extLst>
   </p:cSld>
@@ -1920,13 +2322,7 @@
       </p:grpSpPr>
       <p:sp>
         <p:nvSpPr>
-          <p:cNvPr id="2" name="Nadpis 1">
-            <a:extLst>
-              <a:ext uri="{FF2B5EF4-FFF2-40B4-BE49-F238E27FC236}">
-                <a16:creationId xmlns:a16="http://schemas.microsoft.com/office/drawing/2014/main" id="{EE1ED957-5099-4F4B-B81C-A6F080C2BDF6}"/>
-              </a:ext>
-            </a:extLst>
-          </p:cNvPr>
+          <p:cNvPr id="2" name="Title 1"/>
           <p:cNvSpPr>
             <a:spLocks noGrp="1"/>
           </p:cNvSpPr>
@@ -1941,20 +2337,15 @@
           <a:p>
             <a:r>
               <a:rPr lang="sk-SK"/>
-              <a:t>Upravte štýly predlohy textu</a:t>
-            </a:r>
-          </a:p>
-        </p:txBody>
-      </p:sp>
-      <p:sp>
-        <p:nvSpPr>
-          <p:cNvPr id="3" name="Zástupný objekt pre dátum 2">
-            <a:extLst>
-              <a:ext uri="{FF2B5EF4-FFF2-40B4-BE49-F238E27FC236}">
-                <a16:creationId xmlns:a16="http://schemas.microsoft.com/office/drawing/2014/main" id="{8766005A-8DF3-4AC5-8FD0-7F4F23D058A9}"/>
-              </a:ext>
-            </a:extLst>
-          </p:cNvPr>
+              <a:t>Kliknutím upravte štýl predlohy nadpisu</a:t>
+            </a:r>
+            <a:endParaRPr lang="en-US" dirty="0"/>
+          </a:p>
+        </p:txBody>
+      </p:sp>
+      <p:sp>
+        <p:nvSpPr>
+          <p:cNvPr id="3" name="Date Placeholder 2"/>
           <p:cNvSpPr>
             <a:spLocks noGrp="1"/>
           </p:cNvSpPr>
@@ -1967,9 +2358,9 @@
           <a:bodyPr/>
           <a:lstStyle/>
           <a:p>
-            <a:fld id="{907F850C-ACB2-47B0-B08E-A47B5F65801F}" type="datetimeFigureOut">
+            <a:fld id="{C3E1FFA7-B1DD-4978-B911-1308933E0F7E}" type="datetime1">
               <a:rPr lang="sk-SK" smtClean="0"/>
-              <a:t>24. 10. 2017</a:t>
+              <a:t>25. 10. 2017</a:t>
             </a:fld>
             <a:endParaRPr lang="sk-SK"/>
           </a:p>
@@ -1977,13 +2368,7 @@
       </p:sp>
       <p:sp>
         <p:nvSpPr>
-          <p:cNvPr id="4" name="Zástupný objekt pre pätu 3">
-            <a:extLst>
-              <a:ext uri="{FF2B5EF4-FFF2-40B4-BE49-F238E27FC236}">
-                <a16:creationId xmlns:a16="http://schemas.microsoft.com/office/drawing/2014/main" id="{A32E28BD-0491-48DA-9917-F7108DB6BAB0}"/>
-              </a:ext>
-            </a:extLst>
-          </p:cNvPr>
+          <p:cNvPr id="4" name="Footer Placeholder 3"/>
           <p:cNvSpPr>
             <a:spLocks noGrp="1"/>
           </p:cNvSpPr>
@@ -2002,13 +2387,7 @@
       </p:sp>
       <p:sp>
         <p:nvSpPr>
-          <p:cNvPr id="5" name="Zástupný objekt pre číslo snímky 4">
-            <a:extLst>
-              <a:ext uri="{FF2B5EF4-FFF2-40B4-BE49-F238E27FC236}">
-                <a16:creationId xmlns:a16="http://schemas.microsoft.com/office/drawing/2014/main" id="{0C1B1324-CFBE-4333-AF18-69E313FF944E}"/>
-              </a:ext>
-            </a:extLst>
-          </p:cNvPr>
+          <p:cNvPr id="5" name="Slide Number Placeholder 4"/>
           <p:cNvSpPr>
             <a:spLocks noGrp="1"/>
           </p:cNvSpPr>
@@ -2032,7 +2411,7 @@
     </p:spTree>
     <p:extLst>
       <p:ext uri="{BB962C8B-B14F-4D97-AF65-F5344CB8AC3E}">
-        <p14:creationId xmlns:p14="http://schemas.microsoft.com/office/powerpoint/2010/main" val="3720197386"/>
+        <p14:creationId xmlns:p14="http://schemas.microsoft.com/office/powerpoint/2010/main" val="3797819037"/>
       </p:ext>
     </p:extLst>
   </p:cSld>
@@ -2061,13 +2440,7 @@
       </p:grpSpPr>
       <p:sp>
         <p:nvSpPr>
-          <p:cNvPr id="2" name="Zástupný objekt pre dátum 1">
-            <a:extLst>
-              <a:ext uri="{FF2B5EF4-FFF2-40B4-BE49-F238E27FC236}">
-                <a16:creationId xmlns:a16="http://schemas.microsoft.com/office/drawing/2014/main" id="{73B48D8B-6282-4470-81E4-6CA047151D06}"/>
-              </a:ext>
-            </a:extLst>
-          </p:cNvPr>
+          <p:cNvPr id="2" name="Date Placeholder 1"/>
           <p:cNvSpPr>
             <a:spLocks noGrp="1"/>
           </p:cNvSpPr>
@@ -2080,9 +2453,9 @@
           <a:bodyPr/>
           <a:lstStyle/>
           <a:p>
-            <a:fld id="{907F850C-ACB2-47B0-B08E-A47B5F65801F}" type="datetimeFigureOut">
+            <a:fld id="{4E476F48-DE2E-4190-9DE3-AAE48EE81165}" type="datetime1">
               <a:rPr lang="sk-SK" smtClean="0"/>
-              <a:t>24. 10. 2017</a:t>
+              <a:t>25. 10. 2017</a:t>
             </a:fld>
             <a:endParaRPr lang="sk-SK"/>
           </a:p>
@@ -2090,13 +2463,7 @@
       </p:sp>
       <p:sp>
         <p:nvSpPr>
-          <p:cNvPr id="3" name="Zástupný objekt pre pätu 2">
-            <a:extLst>
-              <a:ext uri="{FF2B5EF4-FFF2-40B4-BE49-F238E27FC236}">
-                <a16:creationId xmlns:a16="http://schemas.microsoft.com/office/drawing/2014/main" id="{A2319FD6-2625-4508-B299-9381F51656CB}"/>
-              </a:ext>
-            </a:extLst>
-          </p:cNvPr>
+          <p:cNvPr id="3" name="Footer Placeholder 2"/>
           <p:cNvSpPr>
             <a:spLocks noGrp="1"/>
           </p:cNvSpPr>
@@ -2115,13 +2482,7 @@
       </p:sp>
       <p:sp>
         <p:nvSpPr>
-          <p:cNvPr id="4" name="Zástupný objekt pre číslo snímky 3">
-            <a:extLst>
-              <a:ext uri="{FF2B5EF4-FFF2-40B4-BE49-F238E27FC236}">
-                <a16:creationId xmlns:a16="http://schemas.microsoft.com/office/drawing/2014/main" id="{F245DC3B-AA5D-487F-84A7-45E30C34E9EF}"/>
-              </a:ext>
-            </a:extLst>
-          </p:cNvPr>
+          <p:cNvPr id="4" name="Slide Number Placeholder 3"/>
           <p:cNvSpPr>
             <a:spLocks noGrp="1"/>
           </p:cNvSpPr>
@@ -2145,7 +2506,7 @@
     </p:spTree>
     <p:extLst>
       <p:ext uri="{BB962C8B-B14F-4D97-AF65-F5344CB8AC3E}">
-        <p14:creationId xmlns:p14="http://schemas.microsoft.com/office/powerpoint/2010/main" val="1929151926"/>
+        <p14:creationId xmlns:p14="http://schemas.microsoft.com/office/powerpoint/2010/main" val="388363089"/>
       </p:ext>
     </p:extLst>
   </p:cSld>
@@ -2174,13 +2535,7 @@
       </p:grpSpPr>
       <p:sp>
         <p:nvSpPr>
-          <p:cNvPr id="2" name="Nadpis 1">
-            <a:extLst>
-              <a:ext uri="{FF2B5EF4-FFF2-40B4-BE49-F238E27FC236}">
-                <a16:creationId xmlns:a16="http://schemas.microsoft.com/office/drawing/2014/main" id="{D9B38A5B-509E-4EA6-8C26-118E05CB650D}"/>
-              </a:ext>
-            </a:extLst>
-          </p:cNvPr>
+          <p:cNvPr id="2" name="Title 1"/>
           <p:cNvSpPr>
             <a:spLocks noGrp="1"/>
           </p:cNvSpPr>
@@ -2190,34 +2545,34 @@
         </p:nvSpPr>
         <p:spPr>
           <a:xfrm>
-            <a:off x="839788" y="457200"/>
-            <a:ext cx="3932237" cy="1600200"/>
+            <a:off x="1143000" y="1097280"/>
+            <a:ext cx="3931920" cy="1737360"/>
           </a:xfrm>
         </p:spPr>
         <p:txBody>
-          <a:bodyPr anchor="b"/>
+          <a:bodyPr anchor="b">
+            <a:noAutofit/>
+          </a:bodyPr>
           <a:lstStyle>
             <a:lvl1pPr>
-              <a:defRPr sz="3200"/>
+              <a:lnSpc>
+                <a:spcPct val="90000"/>
+              </a:lnSpc>
+              <a:defRPr sz="4000" b="0"/>
             </a:lvl1pPr>
           </a:lstStyle>
           <a:p>
             <a:r>
               <a:rPr lang="sk-SK"/>
-              <a:t>Upravte štýly predlohy textu</a:t>
-            </a:r>
-          </a:p>
-        </p:txBody>
-      </p:sp>
-      <p:sp>
-        <p:nvSpPr>
-          <p:cNvPr id="3" name="Zástupný objekt pre obsah 2">
-            <a:extLst>
-              <a:ext uri="{FF2B5EF4-FFF2-40B4-BE49-F238E27FC236}">
-                <a16:creationId xmlns:a16="http://schemas.microsoft.com/office/drawing/2014/main" id="{A6FC57FE-27C7-41EB-B7F0-44945BB84458}"/>
-              </a:ext>
-            </a:extLst>
-          </p:cNvPr>
+              <a:t>Kliknutím upravte štýl predlohy nadpisu</a:t>
+            </a:r>
+            <a:endParaRPr lang="en-US" dirty="0"/>
+          </a:p>
+        </p:txBody>
+      </p:sp>
+      <p:sp>
+        <p:nvSpPr>
+          <p:cNvPr id="3" name="Content Placeholder 2"/>
           <p:cNvSpPr>
             <a:spLocks noGrp="1"/>
           </p:cNvSpPr>
@@ -2227,8 +2582,8 @@
         </p:nvSpPr>
         <p:spPr>
           <a:xfrm>
-            <a:off x="5183188" y="987425"/>
-            <a:ext cx="6172200" cy="4873625"/>
+            <a:off x="5852159" y="1097280"/>
+            <a:ext cx="5212080" cy="4663440"/>
           </a:xfrm>
         </p:spPr>
         <p:txBody>
@@ -2296,18 +2651,13 @@
               <a:rPr lang="sk-SK"/>
               <a:t>Piata úroveň</a:t>
             </a:r>
-          </a:p>
-        </p:txBody>
-      </p:sp>
-      <p:sp>
-        <p:nvSpPr>
-          <p:cNvPr id="4" name="Zástupný objekt pre text 3">
-            <a:extLst>
-              <a:ext uri="{FF2B5EF4-FFF2-40B4-BE49-F238E27FC236}">
-                <a16:creationId xmlns:a16="http://schemas.microsoft.com/office/drawing/2014/main" id="{2BA9EF0C-1E61-41CD-B746-510F2C430C18}"/>
-              </a:ext>
-            </a:extLst>
-          </p:cNvPr>
+            <a:endParaRPr lang="en-US" dirty="0"/>
+          </a:p>
+        </p:txBody>
+      </p:sp>
+      <p:sp>
+        <p:nvSpPr>
+          <p:cNvPr id="4" name="Text Placeholder 3"/>
           <p:cNvSpPr>
             <a:spLocks noGrp="1"/>
           </p:cNvSpPr>
@@ -2317,48 +2667,56 @@
         </p:nvSpPr>
         <p:spPr>
           <a:xfrm>
-            <a:off x="839788" y="2057400"/>
-            <a:ext cx="3932237" cy="3811588"/>
+            <a:off x="1143000" y="2834640"/>
+            <a:ext cx="3931920" cy="3017520"/>
           </a:xfrm>
         </p:spPr>
         <p:txBody>
-          <a:bodyPr/>
+          <a:bodyPr>
+            <a:normAutofit/>
+          </a:bodyPr>
           <a:lstStyle>
             <a:lvl1pPr marL="0" indent="0">
-              <a:buNone/>
-              <a:defRPr sz="1600"/>
+              <a:lnSpc>
+                <a:spcPct val="100000"/>
+              </a:lnSpc>
+              <a:spcBef>
+                <a:spcPts val="1000"/>
+              </a:spcBef>
+              <a:buNone/>
+              <a:defRPr sz="1700"/>
             </a:lvl1pPr>
             <a:lvl2pPr marL="457200" indent="0">
               <a:buNone/>
-              <a:defRPr sz="1400"/>
+              <a:defRPr sz="1200"/>
             </a:lvl2pPr>
             <a:lvl3pPr marL="914400" indent="0">
               <a:buNone/>
-              <a:defRPr sz="1200"/>
+              <a:defRPr sz="1000"/>
             </a:lvl3pPr>
             <a:lvl4pPr marL="1371600" indent="0">
               <a:buNone/>
-              <a:defRPr sz="1000"/>
+              <a:defRPr sz="900"/>
             </a:lvl4pPr>
             <a:lvl5pPr marL="1828800" indent="0">
               <a:buNone/>
-              <a:defRPr sz="1000"/>
+              <a:defRPr sz="900"/>
             </a:lvl5pPr>
             <a:lvl6pPr marL="2286000" indent="0">
               <a:buNone/>
-              <a:defRPr sz="1000"/>
+              <a:defRPr sz="900"/>
             </a:lvl6pPr>
             <a:lvl7pPr marL="2743200" indent="0">
               <a:buNone/>
-              <a:defRPr sz="1000"/>
+              <a:defRPr sz="900"/>
             </a:lvl7pPr>
             <a:lvl8pPr marL="3200400" indent="0">
               <a:buNone/>
-              <a:defRPr sz="1000"/>
+              <a:defRPr sz="900"/>
             </a:lvl8pPr>
             <a:lvl9pPr marL="3657600" indent="0">
               <a:buNone/>
-              <a:defRPr sz="1000"/>
+              <a:defRPr sz="900"/>
             </a:lvl9pPr>
           </a:lstStyle>
           <a:p>
@@ -2372,13 +2730,7 @@
       </p:sp>
       <p:sp>
         <p:nvSpPr>
-          <p:cNvPr id="5" name="Zástupný objekt pre dátum 4">
-            <a:extLst>
-              <a:ext uri="{FF2B5EF4-FFF2-40B4-BE49-F238E27FC236}">
-                <a16:creationId xmlns:a16="http://schemas.microsoft.com/office/drawing/2014/main" id="{DEFFC775-C1B2-4B8C-AC44-C67C92FC7D29}"/>
-              </a:ext>
-            </a:extLst>
-          </p:cNvPr>
+          <p:cNvPr id="5" name="Date Placeholder 4"/>
           <p:cNvSpPr>
             <a:spLocks noGrp="1"/>
           </p:cNvSpPr>
@@ -2391,9 +2743,9 @@
           <a:bodyPr/>
           <a:lstStyle/>
           <a:p>
-            <a:fld id="{907F850C-ACB2-47B0-B08E-A47B5F65801F}" type="datetimeFigureOut">
+            <a:fld id="{12D7D6E7-3F0A-4676-866C-AB01EBAD90F6}" type="datetime1">
               <a:rPr lang="sk-SK" smtClean="0"/>
-              <a:t>24. 10. 2017</a:t>
+              <a:t>25. 10. 2017</a:t>
             </a:fld>
             <a:endParaRPr lang="sk-SK"/>
           </a:p>
@@ -2401,13 +2753,7 @@
       </p:sp>
       <p:sp>
         <p:nvSpPr>
-          <p:cNvPr id="6" name="Zástupný objekt pre pätu 5">
-            <a:extLst>
-              <a:ext uri="{FF2B5EF4-FFF2-40B4-BE49-F238E27FC236}">
-                <a16:creationId xmlns:a16="http://schemas.microsoft.com/office/drawing/2014/main" id="{3EA4F376-0476-44D9-826E-489E16B19BFC}"/>
-              </a:ext>
-            </a:extLst>
-          </p:cNvPr>
+          <p:cNvPr id="6" name="Footer Placeholder 5"/>
           <p:cNvSpPr>
             <a:spLocks noGrp="1"/>
           </p:cNvSpPr>
@@ -2426,13 +2772,7 @@
       </p:sp>
       <p:sp>
         <p:nvSpPr>
-          <p:cNvPr id="7" name="Zástupný objekt pre číslo snímky 6">
-            <a:extLst>
-              <a:ext uri="{FF2B5EF4-FFF2-40B4-BE49-F238E27FC236}">
-                <a16:creationId xmlns:a16="http://schemas.microsoft.com/office/drawing/2014/main" id="{5FDCB6B9-F007-4590-9845-798BA1755D97}"/>
-              </a:ext>
-            </a:extLst>
-          </p:cNvPr>
+          <p:cNvPr id="7" name="Slide Number Placeholder 6"/>
           <p:cNvSpPr>
             <a:spLocks noGrp="1"/>
           </p:cNvSpPr>
@@ -2456,7 +2796,7 @@
     </p:spTree>
     <p:extLst>
       <p:ext uri="{BB962C8B-B14F-4D97-AF65-F5344CB8AC3E}">
-        <p14:creationId xmlns:p14="http://schemas.microsoft.com/office/powerpoint/2010/main" val="2745520668"/>
+        <p14:creationId xmlns:p14="http://schemas.microsoft.com/office/powerpoint/2010/main" val="3340587594"/>
       </p:ext>
     </p:extLst>
   </p:cSld>
@@ -2485,13 +2825,7 @@
       </p:grpSpPr>
       <p:sp>
         <p:nvSpPr>
-          <p:cNvPr id="2" name="Nadpis 1">
-            <a:extLst>
-              <a:ext uri="{FF2B5EF4-FFF2-40B4-BE49-F238E27FC236}">
-                <a16:creationId xmlns:a16="http://schemas.microsoft.com/office/drawing/2014/main" id="{099A24F6-E9CD-4B5F-BD68-D0B7509D2392}"/>
-              </a:ext>
-            </a:extLst>
-          </p:cNvPr>
+          <p:cNvPr id="2" name="Title 1"/>
           <p:cNvSpPr>
             <a:spLocks noGrp="1"/>
           </p:cNvSpPr>
@@ -2501,36 +2835,36 @@
         </p:nvSpPr>
         <p:spPr>
           <a:xfrm>
-            <a:off x="839788" y="457200"/>
-            <a:ext cx="3932237" cy="1600200"/>
+            <a:off x="1143000" y="1097280"/>
+            <a:ext cx="3931920" cy="1737360"/>
           </a:xfrm>
         </p:spPr>
         <p:txBody>
-          <a:bodyPr anchor="b"/>
+          <a:bodyPr anchor="b">
+            <a:noAutofit/>
+          </a:bodyPr>
           <a:lstStyle>
             <a:lvl1pPr>
-              <a:defRPr sz="3200"/>
+              <a:lnSpc>
+                <a:spcPct val="90000"/>
+              </a:lnSpc>
+              <a:defRPr sz="4000" b="0"/>
             </a:lvl1pPr>
           </a:lstStyle>
           <a:p>
             <a:r>
               <a:rPr lang="sk-SK"/>
-              <a:t>Upravte štýly predlohy textu</a:t>
-            </a:r>
-          </a:p>
-        </p:txBody>
-      </p:sp>
-      <p:sp>
-        <p:nvSpPr>
-          <p:cNvPr id="3" name="Zástupný objekt pre obrázok 2">
-            <a:extLst>
-              <a:ext uri="{FF2B5EF4-FFF2-40B4-BE49-F238E27FC236}">
-                <a16:creationId xmlns:a16="http://schemas.microsoft.com/office/drawing/2014/main" id="{2886C513-6DB2-4AEB-90C6-4E2C43FEC489}"/>
-              </a:ext>
-            </a:extLst>
-          </p:cNvPr>
-          <p:cNvSpPr>
-            <a:spLocks noGrp="1"/>
+              <a:t>Kliknutím upravte štýl predlohy nadpisu</a:t>
+            </a:r>
+            <a:endParaRPr lang="en-US" dirty="0"/>
+          </a:p>
+        </p:txBody>
+      </p:sp>
+      <p:sp>
+        <p:nvSpPr>
+          <p:cNvPr id="3" name="Picture Placeholder 2"/>
+          <p:cNvSpPr>
+            <a:spLocks noGrp="1" noChangeAspect="1"/>
           </p:cNvSpPr>
           <p:nvPr>
             <p:ph type="pic" idx="1"/>
@@ -2538,16 +2872,18 @@
         </p:nvSpPr>
         <p:spPr>
           <a:xfrm>
-            <a:off x="5183188" y="987425"/>
-            <a:ext cx="6172200" cy="4873625"/>
+            <a:off x="5413248" y="1069847"/>
+            <a:ext cx="6099048" cy="4800600"/>
           </a:xfrm>
         </p:spPr>
         <p:txBody>
-          <a:bodyPr/>
+          <a:bodyPr lIns="274320" tIns="182880" anchor="t">
+            <a:normAutofit/>
+          </a:bodyPr>
           <a:lstStyle>
             <a:lvl1pPr marL="0" indent="0">
               <a:buNone/>
-              <a:defRPr sz="3200"/>
+              <a:defRPr sz="2800"/>
             </a:lvl1pPr>
             <a:lvl2pPr marL="457200" indent="0">
               <a:buNone/>
@@ -2583,19 +2919,17 @@
             </a:lvl9pPr>
           </a:lstStyle>
           <a:p>
-            <a:endParaRPr lang="sk-SK"/>
-          </a:p>
-        </p:txBody>
-      </p:sp>
-      <p:sp>
-        <p:nvSpPr>
-          <p:cNvPr id="4" name="Zástupný objekt pre text 3">
-            <a:extLst>
-              <a:ext uri="{FF2B5EF4-FFF2-40B4-BE49-F238E27FC236}">
-                <a16:creationId xmlns:a16="http://schemas.microsoft.com/office/drawing/2014/main" id="{98CF46EC-4281-4540-AC1E-2C99988ECF50}"/>
-              </a:ext>
-            </a:extLst>
-          </p:cNvPr>
+            <a:r>
+              <a:rPr lang="sk-SK"/>
+              <a:t>Kliknutím na ikonu pridáte obrázok</a:t>
+            </a:r>
+            <a:endParaRPr lang="en-US" dirty="0"/>
+          </a:p>
+        </p:txBody>
+      </p:sp>
+      <p:sp>
+        <p:nvSpPr>
+          <p:cNvPr id="4" name="Text Placeholder 3"/>
           <p:cNvSpPr>
             <a:spLocks noGrp="1"/>
           </p:cNvSpPr>
@@ -2605,48 +2939,56 @@
         </p:nvSpPr>
         <p:spPr>
           <a:xfrm>
-            <a:off x="839788" y="2057400"/>
-            <a:ext cx="3932237" cy="3811588"/>
+            <a:off x="1143000" y="2834640"/>
+            <a:ext cx="3931920" cy="2880360"/>
           </a:xfrm>
         </p:spPr>
         <p:txBody>
-          <a:bodyPr/>
+          <a:bodyPr>
+            <a:normAutofit/>
+          </a:bodyPr>
           <a:lstStyle>
             <a:lvl1pPr marL="0" indent="0">
-              <a:buNone/>
-              <a:defRPr sz="1600"/>
+              <a:lnSpc>
+                <a:spcPct val="100000"/>
+              </a:lnSpc>
+              <a:spcBef>
+                <a:spcPts val="1000"/>
+              </a:spcBef>
+              <a:buNone/>
+              <a:defRPr sz="1700"/>
             </a:lvl1pPr>
             <a:lvl2pPr marL="457200" indent="0">
               <a:buNone/>
-              <a:defRPr sz="1400"/>
+              <a:defRPr sz="1200"/>
             </a:lvl2pPr>
             <a:lvl3pPr marL="914400" indent="0">
               <a:buNone/>
-              <a:defRPr sz="1200"/>
+              <a:defRPr sz="1000"/>
             </a:lvl3pPr>
             <a:lvl4pPr marL="1371600" indent="0">
               <a:buNone/>
-              <a:defRPr sz="1000"/>
+              <a:defRPr sz="900"/>
             </a:lvl4pPr>
             <a:lvl5pPr marL="1828800" indent="0">
               <a:buNone/>
-              <a:defRPr sz="1000"/>
+              <a:defRPr sz="900"/>
             </a:lvl5pPr>
             <a:lvl6pPr marL="2286000" indent="0">
               <a:buNone/>
-              <a:defRPr sz="1000"/>
+              <a:defRPr sz="900"/>
             </a:lvl6pPr>
             <a:lvl7pPr marL="2743200" indent="0">
               <a:buNone/>
-              <a:defRPr sz="1000"/>
+              <a:defRPr sz="900"/>
             </a:lvl7pPr>
             <a:lvl8pPr marL="3200400" indent="0">
               <a:buNone/>
-              <a:defRPr sz="1000"/>
+              <a:defRPr sz="900"/>
             </a:lvl8pPr>
             <a:lvl9pPr marL="3657600" indent="0">
               <a:buNone/>
-              <a:defRPr sz="1000"/>
+              <a:defRPr sz="900"/>
             </a:lvl9pPr>
           </a:lstStyle>
           <a:p>
@@ -2660,13 +3002,7 @@
       </p:sp>
       <p:sp>
         <p:nvSpPr>
-          <p:cNvPr id="5" name="Zástupný objekt pre dátum 4">
-            <a:extLst>
-              <a:ext uri="{FF2B5EF4-FFF2-40B4-BE49-F238E27FC236}">
-                <a16:creationId xmlns:a16="http://schemas.microsoft.com/office/drawing/2014/main" id="{24476760-BB11-4798-AFA0-EEE53831707C}"/>
-              </a:ext>
-            </a:extLst>
-          </p:cNvPr>
+          <p:cNvPr id="5" name="Date Placeholder 4"/>
           <p:cNvSpPr>
             <a:spLocks noGrp="1"/>
           </p:cNvSpPr>
@@ -2679,9 +3015,9 @@
           <a:bodyPr/>
           <a:lstStyle/>
           <a:p>
-            <a:fld id="{907F850C-ACB2-47B0-B08E-A47B5F65801F}" type="datetimeFigureOut">
+            <a:fld id="{9A92E965-1CE2-47D9-8DA9-42BD580B108B}" type="datetime1">
               <a:rPr lang="sk-SK" smtClean="0"/>
-              <a:t>24. 10. 2017</a:t>
+              <a:t>25. 10. 2017</a:t>
             </a:fld>
             <a:endParaRPr lang="sk-SK"/>
           </a:p>
@@ -2689,13 +3025,7 @@
       </p:sp>
       <p:sp>
         <p:nvSpPr>
-          <p:cNvPr id="6" name="Zástupný objekt pre pätu 5">
-            <a:extLst>
-              <a:ext uri="{FF2B5EF4-FFF2-40B4-BE49-F238E27FC236}">
-                <a16:creationId xmlns:a16="http://schemas.microsoft.com/office/drawing/2014/main" id="{1897BEAE-4783-4D15-9913-413BF0F3BDD7}"/>
-              </a:ext>
-            </a:extLst>
-          </p:cNvPr>
+          <p:cNvPr id="6" name="Footer Placeholder 5"/>
           <p:cNvSpPr>
             <a:spLocks noGrp="1"/>
           </p:cNvSpPr>
@@ -2714,13 +3044,7 @@
       </p:sp>
       <p:sp>
         <p:nvSpPr>
-          <p:cNvPr id="7" name="Zástupný objekt pre číslo snímky 6">
-            <a:extLst>
-              <a:ext uri="{FF2B5EF4-FFF2-40B4-BE49-F238E27FC236}">
-                <a16:creationId xmlns:a16="http://schemas.microsoft.com/office/drawing/2014/main" id="{0C846B0F-1A5B-4957-AA6E-5625F470676C}"/>
-              </a:ext>
-            </a:extLst>
-          </p:cNvPr>
+          <p:cNvPr id="7" name="Slide Number Placeholder 6"/>
           <p:cNvSpPr>
             <a:spLocks noGrp="1"/>
           </p:cNvSpPr>
@@ -2744,7 +3068,7 @@
     </p:spTree>
     <p:extLst>
       <p:ext uri="{BB962C8B-B14F-4D97-AF65-F5344CB8AC3E}">
-        <p14:creationId xmlns:p14="http://schemas.microsoft.com/office/powerpoint/2010/main" val="1686565682"/>
+        <p14:creationId xmlns:p14="http://schemas.microsoft.com/office/powerpoint/2010/main" val="773032365"/>
       </p:ext>
     </p:extLst>
   </p:cSld>
@@ -2758,9 +3082,12 @@
 <p:sldMaster xmlns:a="http://schemas.openxmlformats.org/drawingml/2006/main" xmlns:r="http://schemas.openxmlformats.org/officeDocument/2006/relationships" xmlns:p="http://schemas.openxmlformats.org/presentationml/2006/main">
   <p:cSld>
     <p:bg>
-      <p:bgRef idx="1001">
-        <a:schemeClr val="bg1"/>
-      </p:bgRef>
+      <p:bgPr>
+        <a:solidFill>
+          <a:schemeClr val="accent1"/>
+        </a:solidFill>
+        <a:effectLst/>
+      </p:bgPr>
     </p:bg>
     <p:spTree>
       <p:nvGrpSpPr>
@@ -2778,24 +3105,58 @@
       </p:grpSpPr>
       <p:sp>
         <p:nvSpPr>
-          <p:cNvPr id="2" name="Zástupný objekt pre nadpis 1">
-            <a:extLst>
-              <a:ext uri="{FF2B5EF4-FFF2-40B4-BE49-F238E27FC236}">
-                <a16:creationId xmlns:a16="http://schemas.microsoft.com/office/drawing/2014/main" id="{D691757C-8B6F-4B13-AB29-679DA4AD25B0}"/>
-              </a:ext>
-            </a:extLst>
-          </p:cNvPr>
-          <p:cNvSpPr>
-            <a:spLocks noGrp="1"/>
-          </p:cNvSpPr>
-          <p:nvPr>
-            <p:ph type="title"/>
-          </p:nvPr>
+          <p:cNvPr id="7" name="Rectangle 6"/>
+          <p:cNvSpPr>
+            <a:spLocks noChangeAspect="1"/>
+          </p:cNvSpPr>
+          <p:nvPr/>
         </p:nvSpPr>
         <p:spPr>
           <a:xfrm>
-            <a:off x="838200" y="365125"/>
-            <a:ext cx="10515600" cy="1325563"/>
+            <a:off x="231140" y="243840"/>
+            <a:ext cx="11724640" cy="6377939"/>
+          </a:xfrm>
+          <a:prstGeom prst="rect">
+            <a:avLst/>
+          </a:prstGeom>
+          <a:solidFill>
+            <a:schemeClr val="bg1"/>
+          </a:solidFill>
+          <a:ln w="12700">
+            <a:noFill/>
+          </a:ln>
+        </p:spPr>
+        <p:style>
+          <a:lnRef idx="2">
+            <a:schemeClr val="accent1">
+              <a:shade val="50000"/>
+            </a:schemeClr>
+          </a:lnRef>
+          <a:fillRef idx="1">
+            <a:schemeClr val="accent1"/>
+          </a:fillRef>
+          <a:effectRef idx="0">
+            <a:schemeClr val="accent1"/>
+          </a:effectRef>
+          <a:fontRef idx="minor">
+            <a:schemeClr val="lt1"/>
+          </a:fontRef>
+        </p:style>
+      </p:sp>
+      <p:sp>
+        <p:nvSpPr>
+          <p:cNvPr id="2" name="Title Placeholder 1"/>
+          <p:cNvSpPr>
+            <a:spLocks noGrp="1"/>
+          </p:cNvSpPr>
+          <p:nvPr>
+            <p:ph type="title"/>
+          </p:nvPr>
+        </p:nvSpPr>
+        <p:spPr>
+          <a:xfrm>
+            <a:off x="1143000" y="609600"/>
+            <a:ext cx="9875520" cy="1356360"/>
           </a:xfrm>
           <a:prstGeom prst="rect">
             <a:avLst/>
@@ -2809,20 +3170,15 @@
           <a:p>
             <a:r>
               <a:rPr lang="sk-SK"/>
-              <a:t>Upravte štýly predlohy textu</a:t>
-            </a:r>
-          </a:p>
-        </p:txBody>
-      </p:sp>
-      <p:sp>
-        <p:nvSpPr>
-          <p:cNvPr id="3" name="Zástupný objekt pre text 2">
-            <a:extLst>
-              <a:ext uri="{FF2B5EF4-FFF2-40B4-BE49-F238E27FC236}">
-                <a16:creationId xmlns:a16="http://schemas.microsoft.com/office/drawing/2014/main" id="{F1BBDE87-2CE1-4A99-BBF4-C6D81834DECD}"/>
-              </a:ext>
-            </a:extLst>
-          </p:cNvPr>
+              <a:t>Kliknutím upravte štýl predlohy nadpisu</a:t>
+            </a:r>
+            <a:endParaRPr lang="en-US" dirty="0"/>
+          </a:p>
+        </p:txBody>
+      </p:sp>
+      <p:sp>
+        <p:nvSpPr>
+          <p:cNvPr id="3" name="Text Placeholder 2"/>
           <p:cNvSpPr>
             <a:spLocks noGrp="1"/>
           </p:cNvSpPr>
@@ -2832,8 +3188,8 @@
         </p:nvSpPr>
         <p:spPr>
           <a:xfrm>
-            <a:off x="838200" y="1825625"/>
-            <a:ext cx="10515600" cy="4351338"/>
+            <a:off x="1143000" y="2057400"/>
+            <a:ext cx="9872871" cy="4038600"/>
           </a:xfrm>
           <a:prstGeom prst="rect">
             <a:avLst/>
@@ -2878,18 +3234,13 @@
               <a:rPr lang="sk-SK"/>
               <a:t>Piata úroveň</a:t>
             </a:r>
-          </a:p>
-        </p:txBody>
-      </p:sp>
-      <p:sp>
-        <p:nvSpPr>
-          <p:cNvPr id="4" name="Zástupný objekt pre dátum 3">
-            <a:extLst>
-              <a:ext uri="{FF2B5EF4-FFF2-40B4-BE49-F238E27FC236}">
-                <a16:creationId xmlns:a16="http://schemas.microsoft.com/office/drawing/2014/main" id="{BE755643-3157-4228-87EF-33C66E9298D8}"/>
-              </a:ext>
-            </a:extLst>
-          </p:cNvPr>
+            <a:endParaRPr lang="en-US" dirty="0"/>
+          </a:p>
+        </p:txBody>
+      </p:sp>
+      <p:sp>
+        <p:nvSpPr>
+          <p:cNvPr id="4" name="Date Placeholder 3"/>
           <p:cNvSpPr>
             <a:spLocks noGrp="1"/>
           </p:cNvSpPr>
@@ -2899,8 +3250,8 @@
         </p:nvSpPr>
         <p:spPr>
           <a:xfrm>
-            <a:off x="838200" y="6356350"/>
-            <a:ext cx="2743200" cy="365125"/>
+            <a:off x="1142996" y="6223828"/>
+            <a:ext cx="2329074" cy="365125"/>
           </a:xfrm>
           <a:prstGeom prst="rect">
             <a:avLst/>
@@ -2912,17 +3263,15 @@
             <a:lvl1pPr algn="l">
               <a:defRPr sz="1200">
                 <a:solidFill>
-                  <a:schemeClr val="tx1">
-                    <a:tint val="75000"/>
-                  </a:schemeClr>
+                  <a:schemeClr val="accent1"/>
                 </a:solidFill>
               </a:defRPr>
             </a:lvl1pPr>
           </a:lstStyle>
           <a:p>
-            <a:fld id="{907F850C-ACB2-47B0-B08E-A47B5F65801F}" type="datetimeFigureOut">
+            <a:fld id="{77CA6AE1-D167-4DDB-A1AE-122B897C8C72}" type="datetime1">
               <a:rPr lang="sk-SK" smtClean="0"/>
-              <a:t>24. 10. 2017</a:t>
+              <a:t>25. 10. 2017</a:t>
             </a:fld>
             <a:endParaRPr lang="sk-SK"/>
           </a:p>
@@ -2930,13 +3279,7 @@
       </p:sp>
       <p:sp>
         <p:nvSpPr>
-          <p:cNvPr id="5" name="Zástupný objekt pre pätu 4">
-            <a:extLst>
-              <a:ext uri="{FF2B5EF4-FFF2-40B4-BE49-F238E27FC236}">
-                <a16:creationId xmlns:a16="http://schemas.microsoft.com/office/drawing/2014/main" id="{D327D686-6A9C-468A-A000-1C6243119449}"/>
-              </a:ext>
-            </a:extLst>
-          </p:cNvPr>
+          <p:cNvPr id="5" name="Footer Placeholder 4"/>
           <p:cNvSpPr>
             <a:spLocks noGrp="1"/>
           </p:cNvSpPr>
@@ -2946,8 +3289,8 @@
         </p:nvSpPr>
         <p:spPr>
           <a:xfrm>
-            <a:off x="4038600" y="6356350"/>
-            <a:ext cx="4114800" cy="365125"/>
+            <a:off x="3949148" y="6223828"/>
+            <a:ext cx="4717774" cy="365125"/>
           </a:xfrm>
           <a:prstGeom prst="rect">
             <a:avLst/>
@@ -2959,9 +3302,7 @@
             <a:lvl1pPr algn="ctr">
               <a:defRPr sz="1200">
                 <a:solidFill>
-                  <a:schemeClr val="tx1">
-                    <a:tint val="75000"/>
-                  </a:schemeClr>
+                  <a:schemeClr val="accent1"/>
                 </a:solidFill>
               </a:defRPr>
             </a:lvl1pPr>
@@ -2973,13 +3314,7 @@
       </p:sp>
       <p:sp>
         <p:nvSpPr>
-          <p:cNvPr id="6" name="Zástupný objekt pre číslo snímky 5">
-            <a:extLst>
-              <a:ext uri="{FF2B5EF4-FFF2-40B4-BE49-F238E27FC236}">
-                <a16:creationId xmlns:a16="http://schemas.microsoft.com/office/drawing/2014/main" id="{164D7177-C4D4-4876-A0AD-1C2B834922EA}"/>
-              </a:ext>
-            </a:extLst>
-          </p:cNvPr>
+          <p:cNvPr id="6" name="Slide Number Placeholder 5"/>
           <p:cNvSpPr>
             <a:spLocks noGrp="1"/>
           </p:cNvSpPr>
@@ -2989,8 +3324,8 @@
         </p:nvSpPr>
         <p:spPr>
           <a:xfrm>
-            <a:off x="8610600" y="6356350"/>
-            <a:ext cx="2743200" cy="365125"/>
+            <a:off x="9329530" y="6223828"/>
+            <a:ext cx="1706217" cy="365125"/>
           </a:xfrm>
           <a:prstGeom prst="rect">
             <a:avLst/>
@@ -3002,9 +3337,7 @@
             <a:lvl1pPr algn="r">
               <a:defRPr sz="1200">
                 <a:solidFill>
-                  <a:schemeClr val="tx1">
-                    <a:tint val="75000"/>
-                  </a:schemeClr>
+                  <a:schemeClr val="accent1"/>
                 </a:solidFill>
               </a:defRPr>
             </a:lvl1pPr>
@@ -3021,24 +3354,25 @@
     </p:spTree>
     <p:extLst>
       <p:ext uri="{BB962C8B-B14F-4D97-AF65-F5344CB8AC3E}">
-        <p14:creationId xmlns:p14="http://schemas.microsoft.com/office/powerpoint/2010/main" val="1143405748"/>
+        <p14:creationId xmlns:p14="http://schemas.microsoft.com/office/powerpoint/2010/main" val="764941001"/>
       </p:ext>
     </p:extLst>
   </p:cSld>
   <p:clrMap bg1="lt1" tx1="dk1" bg2="lt2" tx2="dk2" accent1="accent1" accent2="accent2" accent3="accent3" accent4="accent4" accent5="accent5" accent6="accent6" hlink="hlink" folHlink="folHlink"/>
   <p:sldLayoutIdLst>
-    <p:sldLayoutId id="2147483649" r:id="rId1"/>
-    <p:sldLayoutId id="2147483650" r:id="rId2"/>
-    <p:sldLayoutId id="2147483651" r:id="rId3"/>
-    <p:sldLayoutId id="2147483652" r:id="rId4"/>
-    <p:sldLayoutId id="2147483653" r:id="rId5"/>
-    <p:sldLayoutId id="2147483654" r:id="rId6"/>
-    <p:sldLayoutId id="2147483655" r:id="rId7"/>
-    <p:sldLayoutId id="2147483656" r:id="rId8"/>
-    <p:sldLayoutId id="2147483657" r:id="rId9"/>
-    <p:sldLayoutId id="2147483658" r:id="rId10"/>
-    <p:sldLayoutId id="2147483659" r:id="rId11"/>
+    <p:sldLayoutId id="2147483673" r:id="rId1"/>
+    <p:sldLayoutId id="2147483674" r:id="rId2"/>
+    <p:sldLayoutId id="2147483675" r:id="rId3"/>
+    <p:sldLayoutId id="2147483676" r:id="rId4"/>
+    <p:sldLayoutId id="2147483677" r:id="rId5"/>
+    <p:sldLayoutId id="2147483678" r:id="rId6"/>
+    <p:sldLayoutId id="2147483679" r:id="rId7"/>
+    <p:sldLayoutId id="2147483680" r:id="rId8"/>
+    <p:sldLayoutId id="2147483681" r:id="rId9"/>
+    <p:sldLayoutId id="2147483682" r:id="rId10"/>
+    <p:sldLayoutId id="2147483683" r:id="rId11"/>
   </p:sldLayoutIdLst>
+  <p:hf hdr="0" ftr="0" dt="0"/>
   <p:txStyles>
     <p:titleStyle>
       <a:lvl1pPr algn="l" defTabSz="914400" rtl="0" eaLnBrk="1" latinLnBrk="0" hangingPunct="1">
@@ -3051,7 +3385,7 @@
         <a:buNone/>
         <a:defRPr sz="4400" kern="1200">
           <a:solidFill>
-            <a:schemeClr val="tx1"/>
+            <a:schemeClr val="accent1"/>
           </a:solidFill>
           <a:latin typeface="+mj-lt"/>
           <a:ea typeface="+mj-ea"/>
@@ -3060,162 +3394,222 @@
       </a:lvl1pPr>
     </p:titleStyle>
     <p:bodyStyle>
-      <a:lvl1pPr marL="228600" indent="-228600" algn="l" defTabSz="914400" rtl="0" eaLnBrk="1" latinLnBrk="0" hangingPunct="1">
+      <a:lvl1pPr marL="228600" indent="-182880" algn="l" defTabSz="914400" rtl="0" eaLnBrk="1" latinLnBrk="0" hangingPunct="1">
         <a:lnSpc>
           <a:spcPct val="90000"/>
         </a:lnSpc>
         <a:spcBef>
-          <a:spcPts val="1000"/>
+          <a:spcPts val="1400"/>
         </a:spcBef>
-        <a:buFont typeface="Arial" panose="020B0604020202020204" pitchFamily="34" charset="0"/>
+        <a:buClr>
+          <a:schemeClr val="accent1"/>
+        </a:buClr>
+        <a:buSzPct val="80000"/>
+        <a:buFont typeface="Corbel" pitchFamily="34" charset="0"/>
         <a:buChar char="•"/>
-        <a:defRPr sz="2800" kern="1200">
+        <a:defRPr sz="2200" kern="1200">
           <a:solidFill>
-            <a:schemeClr val="tx1"/>
+            <a:schemeClr val="accent1"/>
           </a:solidFill>
           <a:latin typeface="+mn-lt"/>
           <a:ea typeface="+mn-ea"/>
           <a:cs typeface="+mn-cs"/>
         </a:defRPr>
       </a:lvl1pPr>
-      <a:lvl2pPr marL="685800" indent="-228600" algn="l" defTabSz="914400" rtl="0" eaLnBrk="1" latinLnBrk="0" hangingPunct="1">
+      <a:lvl2pPr marL="457200" indent="-182880" algn="l" defTabSz="914400" rtl="0" eaLnBrk="1" latinLnBrk="0" hangingPunct="1">
         <a:lnSpc>
           <a:spcPct val="90000"/>
         </a:lnSpc>
         <a:spcBef>
-          <a:spcPts val="500"/>
+          <a:spcPts val="200"/>
         </a:spcBef>
-        <a:buFont typeface="Arial" panose="020B0604020202020204" pitchFamily="34" charset="0"/>
+        <a:spcAft>
+          <a:spcPts val="400"/>
+        </a:spcAft>
+        <a:buClr>
+          <a:schemeClr val="accent1"/>
+        </a:buClr>
+        <a:buSzPct val="80000"/>
+        <a:buFont typeface="Corbel" pitchFamily="34" charset="0"/>
         <a:buChar char="•"/>
-        <a:defRPr sz="2400" kern="1200">
+        <a:defRPr sz="2000" kern="1200">
           <a:solidFill>
-            <a:schemeClr val="tx1"/>
+            <a:schemeClr val="accent1"/>
           </a:solidFill>
           <a:latin typeface="+mn-lt"/>
           <a:ea typeface="+mn-ea"/>
           <a:cs typeface="+mn-cs"/>
         </a:defRPr>
       </a:lvl2pPr>
-      <a:lvl3pPr marL="1143000" indent="-228600" algn="l" defTabSz="914400" rtl="0" eaLnBrk="1" latinLnBrk="0" hangingPunct="1">
+      <a:lvl3pPr marL="731520" indent="-182880" algn="l" defTabSz="914400" rtl="0" eaLnBrk="1" latinLnBrk="0" hangingPunct="1">
         <a:lnSpc>
           <a:spcPct val="90000"/>
         </a:lnSpc>
         <a:spcBef>
-          <a:spcPts val="500"/>
+          <a:spcPts val="200"/>
         </a:spcBef>
-        <a:buFont typeface="Arial" panose="020B0604020202020204" pitchFamily="34" charset="0"/>
+        <a:spcAft>
+          <a:spcPts val="400"/>
+        </a:spcAft>
+        <a:buClr>
+          <a:schemeClr val="accent1"/>
+        </a:buClr>
+        <a:buSzPct val="80000"/>
+        <a:buFont typeface="Corbel" pitchFamily="34" charset="0"/>
         <a:buChar char="•"/>
-        <a:defRPr sz="2000" kern="1200">
+        <a:defRPr sz="1800" kern="1200">
           <a:solidFill>
-            <a:schemeClr val="tx1"/>
+            <a:schemeClr val="accent1"/>
           </a:solidFill>
           <a:latin typeface="+mn-lt"/>
           <a:ea typeface="+mn-ea"/>
           <a:cs typeface="+mn-cs"/>
         </a:defRPr>
       </a:lvl3pPr>
-      <a:lvl4pPr marL="1600200" indent="-228600" algn="l" defTabSz="914400" rtl="0" eaLnBrk="1" latinLnBrk="0" hangingPunct="1">
+      <a:lvl4pPr marL="1005840" indent="-182880" algn="l" defTabSz="914400" rtl="0" eaLnBrk="1" latinLnBrk="0" hangingPunct="1">
         <a:lnSpc>
           <a:spcPct val="90000"/>
         </a:lnSpc>
         <a:spcBef>
-          <a:spcPts val="500"/>
+          <a:spcPts val="200"/>
         </a:spcBef>
-        <a:buFont typeface="Arial" panose="020B0604020202020204" pitchFamily="34" charset="0"/>
+        <a:spcAft>
+          <a:spcPts val="400"/>
+        </a:spcAft>
+        <a:buClr>
+          <a:schemeClr val="accent1"/>
+        </a:buClr>
+        <a:buSzPct val="80000"/>
+        <a:buFont typeface="Corbel" pitchFamily="34" charset="0"/>
         <a:buChar char="•"/>
-        <a:defRPr sz="1800" kern="1200">
+        <a:defRPr sz="1600" kern="1200">
           <a:solidFill>
-            <a:schemeClr val="tx1"/>
+            <a:schemeClr val="accent1"/>
           </a:solidFill>
           <a:latin typeface="+mn-lt"/>
           <a:ea typeface="+mn-ea"/>
           <a:cs typeface="+mn-cs"/>
         </a:defRPr>
       </a:lvl4pPr>
-      <a:lvl5pPr marL="2057400" indent="-228600" algn="l" defTabSz="914400" rtl="0" eaLnBrk="1" latinLnBrk="0" hangingPunct="1">
+      <a:lvl5pPr marL="1280160" indent="-182880" algn="l" defTabSz="914400" rtl="0" eaLnBrk="1" latinLnBrk="0" hangingPunct="1">
         <a:lnSpc>
           <a:spcPct val="90000"/>
         </a:lnSpc>
         <a:spcBef>
-          <a:spcPts val="500"/>
+          <a:spcPts val="200"/>
         </a:spcBef>
-        <a:buFont typeface="Arial" panose="020B0604020202020204" pitchFamily="34" charset="0"/>
+        <a:spcAft>
+          <a:spcPts val="400"/>
+        </a:spcAft>
+        <a:buClr>
+          <a:schemeClr val="accent1"/>
+        </a:buClr>
+        <a:buSzPct val="80000"/>
+        <a:buFont typeface="Corbel" pitchFamily="34" charset="0"/>
         <a:buChar char="•"/>
-        <a:defRPr sz="1800" kern="1200">
+        <a:defRPr sz="1600" kern="1200">
           <a:solidFill>
-            <a:schemeClr val="tx1"/>
+            <a:schemeClr val="accent1"/>
           </a:solidFill>
           <a:latin typeface="+mn-lt"/>
           <a:ea typeface="+mn-ea"/>
           <a:cs typeface="+mn-cs"/>
         </a:defRPr>
       </a:lvl5pPr>
-      <a:lvl6pPr marL="2514600" indent="-228600" algn="l" defTabSz="914400" rtl="0" eaLnBrk="1" latinLnBrk="0" hangingPunct="1">
+      <a:lvl6pPr marL="1600000" indent="-228600" algn="l" defTabSz="914400" rtl="0" eaLnBrk="1" latinLnBrk="0" hangingPunct="1">
         <a:lnSpc>
           <a:spcPct val="90000"/>
         </a:lnSpc>
         <a:spcBef>
-          <a:spcPts val="500"/>
+          <a:spcPts val="200"/>
         </a:spcBef>
-        <a:buFont typeface="Arial" panose="020B0604020202020204" pitchFamily="34" charset="0"/>
+        <a:spcAft>
+          <a:spcPts val="400"/>
+        </a:spcAft>
+        <a:buClr>
+          <a:schemeClr val="accent1"/>
+        </a:buClr>
+        <a:buSzPct val="80000"/>
+        <a:buFont typeface="Corbel" pitchFamily="34" charset="0"/>
         <a:buChar char="•"/>
-        <a:defRPr sz="1800" kern="1200">
+        <a:defRPr sz="1600" kern="1200">
           <a:solidFill>
-            <a:schemeClr val="tx1"/>
+            <a:schemeClr val="accent1"/>
           </a:solidFill>
           <a:latin typeface="+mn-lt"/>
           <a:ea typeface="+mn-ea"/>
           <a:cs typeface="+mn-cs"/>
         </a:defRPr>
       </a:lvl6pPr>
-      <a:lvl7pPr marL="2971800" indent="-228600" algn="l" defTabSz="914400" rtl="0" eaLnBrk="1" latinLnBrk="0" hangingPunct="1">
+      <a:lvl7pPr marL="1900000" indent="-228600" algn="l" defTabSz="914400" rtl="0" eaLnBrk="1" latinLnBrk="0" hangingPunct="1">
         <a:lnSpc>
           <a:spcPct val="90000"/>
         </a:lnSpc>
         <a:spcBef>
-          <a:spcPts val="500"/>
+          <a:spcPts val="200"/>
         </a:spcBef>
-        <a:buFont typeface="Arial" panose="020B0604020202020204" pitchFamily="34" charset="0"/>
+        <a:spcAft>
+          <a:spcPts val="400"/>
+        </a:spcAft>
+        <a:buClr>
+          <a:schemeClr val="accent1"/>
+        </a:buClr>
+        <a:buSzPct val="80000"/>
+        <a:buFont typeface="Corbel" pitchFamily="34" charset="0"/>
         <a:buChar char="•"/>
-        <a:defRPr sz="1800" kern="1200">
+        <a:defRPr sz="1600" kern="1200">
           <a:solidFill>
-            <a:schemeClr val="tx1"/>
+            <a:schemeClr val="accent1"/>
           </a:solidFill>
           <a:latin typeface="+mn-lt"/>
           <a:ea typeface="+mn-ea"/>
           <a:cs typeface="+mn-cs"/>
         </a:defRPr>
       </a:lvl7pPr>
-      <a:lvl8pPr marL="3429000" indent="-228600" algn="l" defTabSz="914400" rtl="0" eaLnBrk="1" latinLnBrk="0" hangingPunct="1">
+      <a:lvl8pPr marL="2200000" indent="-228600" algn="l" defTabSz="914400" rtl="0" eaLnBrk="1" latinLnBrk="0" hangingPunct="1">
         <a:lnSpc>
           <a:spcPct val="90000"/>
         </a:lnSpc>
         <a:spcBef>
-          <a:spcPts val="500"/>
+          <a:spcPts val="200"/>
         </a:spcBef>
-        <a:buFont typeface="Arial" panose="020B0604020202020204" pitchFamily="34" charset="0"/>
+        <a:spcAft>
+          <a:spcPts val="400"/>
+        </a:spcAft>
+        <a:buClr>
+          <a:schemeClr val="accent1"/>
+        </a:buClr>
+        <a:buSzPct val="80000"/>
+        <a:buFont typeface="Corbel" pitchFamily="34" charset="0"/>
         <a:buChar char="•"/>
-        <a:defRPr sz="1800" kern="1200">
+        <a:defRPr sz="1600" kern="1200">
           <a:solidFill>
-            <a:schemeClr val="tx1"/>
+            <a:schemeClr val="accent1"/>
           </a:solidFill>
           <a:latin typeface="+mn-lt"/>
           <a:ea typeface="+mn-ea"/>
           <a:cs typeface="+mn-cs"/>
         </a:defRPr>
       </a:lvl8pPr>
-      <a:lvl9pPr marL="3886200" indent="-228600" algn="l" defTabSz="914400" rtl="0" eaLnBrk="1" latinLnBrk="0" hangingPunct="1">
+      <a:lvl9pPr marL="2500000" indent="-228600" algn="l" defTabSz="914400" rtl="0" eaLnBrk="1" latinLnBrk="0" hangingPunct="1">
         <a:lnSpc>
           <a:spcPct val="90000"/>
         </a:lnSpc>
         <a:spcBef>
-          <a:spcPts val="500"/>
+          <a:spcPts val="200"/>
         </a:spcBef>
-        <a:buFont typeface="Arial" panose="020B0604020202020204" pitchFamily="34" charset="0"/>
+        <a:spcAft>
+          <a:spcPts val="400"/>
+        </a:spcAft>
+        <a:buClr>
+          <a:schemeClr val="accent1"/>
+        </a:buClr>
+        <a:buSzPct val="80000"/>
+        <a:buFont typeface="Corbel" pitchFamily="34" charset="0"/>
         <a:buChar char="•"/>
-        <a:defRPr sz="1800" kern="1200">
+        <a:defRPr sz="1600" kern="1200">
           <a:solidFill>
-            <a:schemeClr val="tx1"/>
+            <a:schemeClr val="accent1"/>
           </a:solidFill>
           <a:latin typeface="+mn-lt"/>
           <a:ea typeface="+mn-ea"/>
@@ -3225,7 +3619,7 @@
     </p:bodyStyle>
     <p:otherStyle>
       <a:defPPr>
-        <a:defRPr lang="sk-SK"/>
+        <a:defRPr lang="en-US"/>
       </a:defPPr>
       <a:lvl1pPr marL="0" algn="l" defTabSz="914400" rtl="0" eaLnBrk="1" latinLnBrk="0" hangingPunct="1">
         <a:defRPr sz="1800" kern="1200">
@@ -3408,17 +3802,77 @@
         <p:spPr>
           <a:xfrm>
             <a:off x="1524000" y="3923930"/>
-            <a:ext cx="9144000" cy="1333870"/>
+            <a:ext cx="9144000" cy="2157274"/>
           </a:xfrm>
         </p:spPr>
         <p:txBody>
-          <a:bodyPr/>
+          <a:bodyPr>
+            <a:normAutofit/>
+          </a:bodyPr>
           <a:lstStyle/>
           <a:p>
             <a:r>
               <a:rPr lang="sk-SK" dirty="0"/>
               <a:t>Architektúra komunikačných systémov</a:t>
             </a:r>
+          </a:p>
+          <a:p>
+            <a:endParaRPr lang="sk-SK" dirty="0"/>
+          </a:p>
+          <a:p>
+            <a:endParaRPr lang="sk-SK" dirty="0"/>
+          </a:p>
+          <a:p>
+            <a:pPr algn="r"/>
+            <a:r>
+              <a:rPr lang="sk-SK" dirty="0"/>
+              <a:t>Lukáš </a:t>
+            </a:r>
+            <a:r>
+              <a:rPr lang="sk-SK" dirty="0" err="1"/>
+              <a:t>Mastiľak</a:t>
+            </a:r>
+            <a:r>
+              <a:rPr lang="sk-SK" dirty="0"/>
+              <a:t>, Ján </a:t>
+            </a:r>
+            <a:r>
+              <a:rPr lang="sk-SK" dirty="0" err="1"/>
+              <a:t>Pánis</a:t>
+            </a:r>
+            <a:r>
+              <a:rPr lang="sk-SK" dirty="0"/>
+              <a:t>, Andrej Vaculčiak</a:t>
+            </a:r>
+          </a:p>
+        </p:txBody>
+      </p:sp>
+      <p:sp>
+        <p:nvSpPr>
+          <p:cNvPr id="4" name="Zástupný objekt pre číslo snímky 3">
+            <a:extLst>
+              <a:ext uri="{FF2B5EF4-FFF2-40B4-BE49-F238E27FC236}">
+                <a16:creationId xmlns:a16="http://schemas.microsoft.com/office/drawing/2014/main" id="{418A99EA-ABE2-4AEF-BF30-D1DD9CBF09C1}"/>
+              </a:ext>
+            </a:extLst>
+          </p:cNvPr>
+          <p:cNvSpPr>
+            <a:spLocks noGrp="1"/>
+          </p:cNvSpPr>
+          <p:nvPr>
+            <p:ph type="sldNum" sz="quarter" idx="12"/>
+          </p:nvPr>
+        </p:nvSpPr>
+        <p:spPr/>
+        <p:txBody>
+          <a:bodyPr/>
+          <a:lstStyle/>
+          <a:p>
+            <a:fld id="{AB1275C2-6900-4440-AD3A-3D0AE666D652}" type="slidenum">
+              <a:rPr lang="sk-SK" smtClean="0"/>
+              <a:t>1</a:t>
+            </a:fld>
+            <a:endParaRPr lang="sk-SK"/>
           </a:p>
         </p:txBody>
       </p:sp>
@@ -3505,6 +3959,35 @@
           </a:p>
         </p:txBody>
       </p:sp>
+      <p:sp>
+        <p:nvSpPr>
+          <p:cNvPr id="4" name="Zástupný objekt pre číslo snímky 3">
+            <a:extLst>
+              <a:ext uri="{FF2B5EF4-FFF2-40B4-BE49-F238E27FC236}">
+                <a16:creationId xmlns:a16="http://schemas.microsoft.com/office/drawing/2014/main" id="{DD8092B2-2AFA-47FB-9A82-4F979B22D4BD}"/>
+              </a:ext>
+            </a:extLst>
+          </p:cNvPr>
+          <p:cNvSpPr>
+            <a:spLocks noGrp="1"/>
+          </p:cNvSpPr>
+          <p:nvPr>
+            <p:ph type="sldNum" sz="quarter" idx="12"/>
+          </p:nvPr>
+        </p:nvSpPr>
+        <p:spPr/>
+        <p:txBody>
+          <a:bodyPr/>
+          <a:lstStyle/>
+          <a:p>
+            <a:fld id="{AB1275C2-6900-4440-AD3A-3D0AE666D652}" type="slidenum">
+              <a:rPr lang="sk-SK" smtClean="0"/>
+              <a:t>10</a:t>
+            </a:fld>
+            <a:endParaRPr lang="sk-SK"/>
+          </a:p>
+        </p:txBody>
+      </p:sp>
     </p:spTree>
     <p:extLst>
       <p:ext uri="{BB962C8B-B14F-4D97-AF65-F5344CB8AC3E}">
@@ -3611,6 +4094,35 @@
           </a:p>
         </p:txBody>
       </p:sp>
+      <p:sp>
+        <p:nvSpPr>
+          <p:cNvPr id="4" name="Zástupný objekt pre číslo snímky 3">
+            <a:extLst>
+              <a:ext uri="{FF2B5EF4-FFF2-40B4-BE49-F238E27FC236}">
+                <a16:creationId xmlns:a16="http://schemas.microsoft.com/office/drawing/2014/main" id="{8EF5E076-B25A-4B6E-A2FA-03417D2D7636}"/>
+              </a:ext>
+            </a:extLst>
+          </p:cNvPr>
+          <p:cNvSpPr>
+            <a:spLocks noGrp="1"/>
+          </p:cNvSpPr>
+          <p:nvPr>
+            <p:ph type="sldNum" sz="quarter" idx="12"/>
+          </p:nvPr>
+        </p:nvSpPr>
+        <p:spPr/>
+        <p:txBody>
+          <a:bodyPr/>
+          <a:lstStyle/>
+          <a:p>
+            <a:fld id="{AB1275C2-6900-4440-AD3A-3D0AE666D652}" type="slidenum">
+              <a:rPr lang="sk-SK" smtClean="0"/>
+              <a:t>2</a:t>
+            </a:fld>
+            <a:endParaRPr lang="sk-SK"/>
+          </a:p>
+        </p:txBody>
+      </p:sp>
     </p:spTree>
     <p:extLst>
       <p:ext uri="{BB962C8B-B14F-4D97-AF65-F5344CB8AC3E}">
@@ -3709,6 +4221,35 @@
               <a:rPr lang="sk-SK" dirty="0"/>
               <a:t>Rôzna priorita aplikácií</a:t>
             </a:r>
+          </a:p>
+        </p:txBody>
+      </p:sp>
+      <p:sp>
+        <p:nvSpPr>
+          <p:cNvPr id="4" name="Zástupný objekt pre číslo snímky 3">
+            <a:extLst>
+              <a:ext uri="{FF2B5EF4-FFF2-40B4-BE49-F238E27FC236}">
+                <a16:creationId xmlns:a16="http://schemas.microsoft.com/office/drawing/2014/main" id="{545DE2F4-B269-4C1C-AF08-BB8824193CF2}"/>
+              </a:ext>
+            </a:extLst>
+          </p:cNvPr>
+          <p:cNvSpPr>
+            <a:spLocks noGrp="1"/>
+          </p:cNvSpPr>
+          <p:nvPr>
+            <p:ph type="sldNum" sz="quarter" idx="12"/>
+          </p:nvPr>
+        </p:nvSpPr>
+        <p:spPr/>
+        <p:txBody>
+          <a:bodyPr/>
+          <a:lstStyle/>
+          <a:p>
+            <a:fld id="{AB1275C2-6900-4440-AD3A-3D0AE666D652}" type="slidenum">
+              <a:rPr lang="sk-SK" smtClean="0"/>
+              <a:t>3</a:t>
+            </a:fld>
+            <a:endParaRPr lang="sk-SK"/>
           </a:p>
         </p:txBody>
       </p:sp>
@@ -3874,6 +4415,35 @@
           </a:p>
         </p:txBody>
       </p:sp>
+      <p:sp>
+        <p:nvSpPr>
+          <p:cNvPr id="4" name="Zástupný objekt pre číslo snímky 3">
+            <a:extLst>
+              <a:ext uri="{FF2B5EF4-FFF2-40B4-BE49-F238E27FC236}">
+                <a16:creationId xmlns:a16="http://schemas.microsoft.com/office/drawing/2014/main" id="{65429C0A-8393-44E8-889B-7B2E1DA5AD4D}"/>
+              </a:ext>
+            </a:extLst>
+          </p:cNvPr>
+          <p:cNvSpPr>
+            <a:spLocks noGrp="1"/>
+          </p:cNvSpPr>
+          <p:nvPr>
+            <p:ph type="sldNum" sz="quarter" idx="12"/>
+          </p:nvPr>
+        </p:nvSpPr>
+        <p:spPr/>
+        <p:txBody>
+          <a:bodyPr/>
+          <a:lstStyle/>
+          <a:p>
+            <a:fld id="{AB1275C2-6900-4440-AD3A-3D0AE666D652}" type="slidenum">
+              <a:rPr lang="sk-SK" smtClean="0"/>
+              <a:t>4</a:t>
+            </a:fld>
+            <a:endParaRPr lang="sk-SK"/>
+          </a:p>
+        </p:txBody>
+      </p:sp>
       <p:pic>
         <p:nvPicPr>
           <p:cNvPr id="5" name="Obrázok 4">
@@ -4041,6 +4611,35 @@
           </a:p>
         </p:txBody>
       </p:sp>
+      <p:sp>
+        <p:nvSpPr>
+          <p:cNvPr id="4" name="Zástupný objekt pre číslo snímky 3">
+            <a:extLst>
+              <a:ext uri="{FF2B5EF4-FFF2-40B4-BE49-F238E27FC236}">
+                <a16:creationId xmlns:a16="http://schemas.microsoft.com/office/drawing/2014/main" id="{5D31FA97-303E-4FF7-89CB-BC4595F0AA9C}"/>
+              </a:ext>
+            </a:extLst>
+          </p:cNvPr>
+          <p:cNvSpPr>
+            <a:spLocks noGrp="1"/>
+          </p:cNvSpPr>
+          <p:nvPr>
+            <p:ph type="sldNum" sz="quarter" idx="12"/>
+          </p:nvPr>
+        </p:nvSpPr>
+        <p:spPr/>
+        <p:txBody>
+          <a:bodyPr/>
+          <a:lstStyle/>
+          <a:p>
+            <a:fld id="{AB1275C2-6900-4440-AD3A-3D0AE666D652}" type="slidenum">
+              <a:rPr lang="sk-SK" smtClean="0"/>
+              <a:t>5</a:t>
+            </a:fld>
+            <a:endParaRPr lang="sk-SK"/>
+          </a:p>
+        </p:txBody>
+      </p:sp>
       <p:pic>
         <p:nvPicPr>
           <p:cNvPr id="5" name="Obrázok 4">
@@ -4175,11 +4774,40 @@
         </p:blipFill>
         <p:spPr>
           <a:xfrm>
-            <a:off x="1509841" y="1690688"/>
-            <a:ext cx="9169767" cy="4708800"/>
+            <a:off x="2166788" y="1965960"/>
+            <a:ext cx="7819689" cy="4015517"/>
           </a:xfrm>
         </p:spPr>
       </p:pic>
+      <p:sp>
+        <p:nvSpPr>
+          <p:cNvPr id="3" name="Zástupný objekt pre číslo snímky 2">
+            <a:extLst>
+              <a:ext uri="{FF2B5EF4-FFF2-40B4-BE49-F238E27FC236}">
+                <a16:creationId xmlns:a16="http://schemas.microsoft.com/office/drawing/2014/main" id="{42EEB593-D081-4BC7-AAE3-9D6FE6A4BD89}"/>
+              </a:ext>
+            </a:extLst>
+          </p:cNvPr>
+          <p:cNvSpPr>
+            <a:spLocks noGrp="1"/>
+          </p:cNvSpPr>
+          <p:nvPr>
+            <p:ph type="sldNum" sz="quarter" idx="12"/>
+          </p:nvPr>
+        </p:nvSpPr>
+        <p:spPr/>
+        <p:txBody>
+          <a:bodyPr/>
+          <a:lstStyle/>
+          <a:p>
+            <a:fld id="{AB1275C2-6900-4440-AD3A-3D0AE666D652}" type="slidenum">
+              <a:rPr lang="sk-SK" smtClean="0"/>
+              <a:t>6</a:t>
+            </a:fld>
+            <a:endParaRPr lang="sk-SK"/>
+          </a:p>
+        </p:txBody>
+      </p:sp>
     </p:spTree>
     <p:extLst>
       <p:ext uri="{BB962C8B-B14F-4D97-AF65-F5344CB8AC3E}">
@@ -4268,11 +4896,40 @@
         </p:blipFill>
         <p:spPr>
           <a:xfrm>
-            <a:off x="1664586" y="1690688"/>
-            <a:ext cx="8862827" cy="4708800"/>
+            <a:off x="2171160" y="1965960"/>
+            <a:ext cx="7819200" cy="4154323"/>
           </a:xfrm>
         </p:spPr>
       </p:pic>
+      <p:sp>
+        <p:nvSpPr>
+          <p:cNvPr id="3" name="Zástupný objekt pre číslo snímky 2">
+            <a:extLst>
+              <a:ext uri="{FF2B5EF4-FFF2-40B4-BE49-F238E27FC236}">
+                <a16:creationId xmlns:a16="http://schemas.microsoft.com/office/drawing/2014/main" id="{00617178-24E1-4E56-9521-C0A483429482}"/>
+              </a:ext>
+            </a:extLst>
+          </p:cNvPr>
+          <p:cNvSpPr>
+            <a:spLocks noGrp="1"/>
+          </p:cNvSpPr>
+          <p:nvPr>
+            <p:ph type="sldNum" sz="quarter" idx="12"/>
+          </p:nvPr>
+        </p:nvSpPr>
+        <p:spPr/>
+        <p:txBody>
+          <a:bodyPr/>
+          <a:lstStyle/>
+          <a:p>
+            <a:fld id="{AB1275C2-6900-4440-AD3A-3D0AE666D652}" type="slidenum">
+              <a:rPr lang="sk-SK" smtClean="0"/>
+              <a:t>7</a:t>
+            </a:fld>
+            <a:endParaRPr lang="sk-SK"/>
+          </a:p>
+        </p:txBody>
+      </p:sp>
     </p:spTree>
     <p:extLst>
       <p:ext uri="{BB962C8B-B14F-4D97-AF65-F5344CB8AC3E}">
@@ -4361,11 +5018,40 @@
         </p:blipFill>
         <p:spPr>
           <a:xfrm>
-            <a:off x="1638971" y="1690688"/>
-            <a:ext cx="8914058" cy="4708800"/>
+            <a:off x="2171160" y="1965960"/>
+            <a:ext cx="7819200" cy="4130448"/>
           </a:xfrm>
         </p:spPr>
       </p:pic>
+      <p:sp>
+        <p:nvSpPr>
+          <p:cNvPr id="3" name="Zástupný objekt pre číslo snímky 2">
+            <a:extLst>
+              <a:ext uri="{FF2B5EF4-FFF2-40B4-BE49-F238E27FC236}">
+                <a16:creationId xmlns:a16="http://schemas.microsoft.com/office/drawing/2014/main" id="{9C56C3D8-C7F7-4A57-86B0-7DC45FE26092}"/>
+              </a:ext>
+            </a:extLst>
+          </p:cNvPr>
+          <p:cNvSpPr>
+            <a:spLocks noGrp="1"/>
+          </p:cNvSpPr>
+          <p:nvPr>
+            <p:ph type="sldNum" sz="quarter" idx="12"/>
+          </p:nvPr>
+        </p:nvSpPr>
+        <p:spPr/>
+        <p:txBody>
+          <a:bodyPr/>
+          <a:lstStyle/>
+          <a:p>
+            <a:fld id="{AB1275C2-6900-4440-AD3A-3D0AE666D652}" type="slidenum">
+              <a:rPr lang="sk-SK" smtClean="0"/>
+              <a:t>8</a:t>
+            </a:fld>
+            <a:endParaRPr lang="sk-SK"/>
+          </a:p>
+        </p:txBody>
+      </p:sp>
     </p:spTree>
     <p:extLst>
       <p:ext uri="{BB962C8B-B14F-4D97-AF65-F5344CB8AC3E}">
@@ -4499,6 +5185,35 @@
           </a:p>
         </p:txBody>
       </p:sp>
+      <p:sp>
+        <p:nvSpPr>
+          <p:cNvPr id="4" name="Zástupný objekt pre číslo snímky 3">
+            <a:extLst>
+              <a:ext uri="{FF2B5EF4-FFF2-40B4-BE49-F238E27FC236}">
+                <a16:creationId xmlns:a16="http://schemas.microsoft.com/office/drawing/2014/main" id="{95EBEE19-C94C-4A73-8B82-510006CCE193}"/>
+              </a:ext>
+            </a:extLst>
+          </p:cNvPr>
+          <p:cNvSpPr>
+            <a:spLocks noGrp="1"/>
+          </p:cNvSpPr>
+          <p:nvPr>
+            <p:ph type="sldNum" sz="quarter" idx="12"/>
+          </p:nvPr>
+        </p:nvSpPr>
+        <p:spPr/>
+        <p:txBody>
+          <a:bodyPr/>
+          <a:lstStyle/>
+          <a:p>
+            <a:fld id="{AB1275C2-6900-4440-AD3A-3D0AE666D652}" type="slidenum">
+              <a:rPr lang="sk-SK" smtClean="0"/>
+              <a:t>9</a:t>
+            </a:fld>
+            <a:endParaRPr lang="sk-SK"/>
+          </a:p>
+        </p:txBody>
+      </p:sp>
     </p:spTree>
     <p:extLst>
       <p:ext uri="{BB962C8B-B14F-4D97-AF65-F5344CB8AC3E}">
@@ -4513,6 +5228,243 @@
 </file>
 
 <file path=ppt/theme/theme1.xml><?xml version="1.0" encoding="utf-8"?>
+<a:theme xmlns:a="http://schemas.openxmlformats.org/drawingml/2006/main" name="Základ">
+  <a:themeElements>
+    <a:clrScheme name="Základ">
+      <a:dk1>
+        <a:sysClr val="windowText" lastClr="000000"/>
+      </a:dk1>
+      <a:lt1>
+        <a:sysClr val="window" lastClr="FFFFFF"/>
+      </a:lt1>
+      <a:dk2>
+        <a:srgbClr val="335B74"/>
+      </a:dk2>
+      <a:lt2>
+        <a:srgbClr val="DFE3E5"/>
+      </a:lt2>
+      <a:accent1>
+        <a:srgbClr val="1CADE4"/>
+      </a:accent1>
+      <a:accent2>
+        <a:srgbClr val="2683C6"/>
+      </a:accent2>
+      <a:accent3>
+        <a:srgbClr val="27CED7"/>
+      </a:accent3>
+      <a:accent4>
+        <a:srgbClr val="42BA97"/>
+      </a:accent4>
+      <a:accent5>
+        <a:srgbClr val="3E8853"/>
+      </a:accent5>
+      <a:accent6>
+        <a:srgbClr val="62A39F"/>
+      </a:accent6>
+      <a:hlink>
+        <a:srgbClr val="6EAC1C"/>
+      </a:hlink>
+      <a:folHlink>
+        <a:srgbClr val="B26B02"/>
+      </a:folHlink>
+    </a:clrScheme>
+    <a:fontScheme name="Základ">
+      <a:majorFont>
+        <a:latin typeface="Corbel" panose="020B0503020204020204"/>
+        <a:ea typeface=""/>
+        <a:cs typeface=""/>
+        <a:font script="Jpan" typeface="ＭＳ ゴシック"/>
+        <a:font script="Hang" typeface="맑은 고딕"/>
+        <a:font script="Hans" typeface="宋体"/>
+        <a:font script="Hant" typeface="新細明體"/>
+        <a:font script="Arab" typeface="Tahoma"/>
+        <a:font script="Hebr" typeface="Gisha"/>
+        <a:font script="Thai" typeface="DilleniaUPC"/>
+        <a:font script="Ethi" typeface="Nyala"/>
+        <a:font script="Beng" typeface="Vrinda"/>
+        <a:font script="Gujr" typeface="Shruti"/>
+        <a:font script="Khmr" typeface="DaunPenh"/>
+        <a:font script="Knda" typeface="Tunga"/>
+        <a:font script="Guru" typeface="Raavi"/>
+        <a:font script="Cans" typeface="Euphemia"/>
+        <a:font script="Cher" typeface="Plantagenet Cherokee"/>
+        <a:font script="Yiii" typeface="Microsoft Yi Baiti"/>
+        <a:font script="Tibt" typeface="Microsoft Himalaya"/>
+        <a:font script="Thaa" typeface="MV Boli"/>
+        <a:font script="Deva" typeface="Mangal"/>
+        <a:font script="Telu" typeface="Gautami"/>
+        <a:font script="Taml" typeface="Latha"/>
+        <a:font script="Syrc" typeface="Estrangelo Edessa"/>
+        <a:font script="Orya" typeface="Kalinga"/>
+        <a:font script="Mlym" typeface="Kartika"/>
+        <a:font script="Laoo" typeface="DokChampa"/>
+        <a:font script="Sinh" typeface="Iskoola Pota"/>
+        <a:font script="Mong" typeface="Mongolian Baiti"/>
+        <a:font script="Viet" typeface="Tahoma"/>
+        <a:font script="Uigh" typeface="Microsoft Uighur"/>
+        <a:font script="Geor" typeface="Sylfaen"/>
+      </a:majorFont>
+      <a:minorFont>
+        <a:latin typeface="Corbel" panose="020B0503020204020204"/>
+        <a:ea typeface=""/>
+        <a:cs typeface=""/>
+        <a:font script="Jpan" typeface="ＭＳ ゴシック"/>
+        <a:font script="Hang" typeface="맑은 고딕"/>
+        <a:font script="Hans" typeface="宋体"/>
+        <a:font script="Hant" typeface="新細明體"/>
+        <a:font script="Arab" typeface="Tahoma"/>
+        <a:font script="Hebr" typeface="Gisha"/>
+        <a:font script="Thai" typeface="DilleniaUPC"/>
+        <a:font script="Ethi" typeface="Nyala"/>
+        <a:font script="Beng" typeface="Vrinda"/>
+        <a:font script="Gujr" typeface="Shruti"/>
+        <a:font script="Khmr" typeface="DaunPenh"/>
+        <a:font script="Knda" typeface="Tunga"/>
+        <a:font script="Guru" typeface="Raavi"/>
+        <a:font script="Cans" typeface="Euphemia"/>
+        <a:font script="Cher" typeface="Plantagenet Cherokee"/>
+        <a:font script="Yiii" typeface="Microsoft Yi Baiti"/>
+        <a:font script="Tibt" typeface="Microsoft Himalaya"/>
+        <a:font script="Thaa" typeface="MV Boli"/>
+        <a:font script="Deva" typeface="Mangal"/>
+        <a:font script="Telu" typeface="Gautami"/>
+        <a:font script="Taml" typeface="Latha"/>
+        <a:font script="Syrc" typeface="Estrangelo Edessa"/>
+        <a:font script="Orya" typeface="Kalinga"/>
+        <a:font script="Mlym" typeface="Kartika"/>
+        <a:font script="Laoo" typeface="DokChampa"/>
+        <a:font script="Sinh" typeface="Iskoola Pota"/>
+        <a:font script="Mong" typeface="Mongolian Baiti"/>
+        <a:font script="Viet" typeface="Verdana"/>
+        <a:font script="Uigh" typeface="Microsoft Uighur"/>
+        <a:font script="Geor" typeface="Sylfaen"/>
+      </a:minorFont>
+    </a:fontScheme>
+    <a:fmtScheme name="Základ">
+      <a:fillStyleLst>
+        <a:solidFill>
+          <a:schemeClr val="phClr"/>
+        </a:solidFill>
+        <a:solidFill>
+          <a:schemeClr val="phClr">
+            <a:tint val="55000"/>
+            <a:satMod val="130000"/>
+          </a:schemeClr>
+        </a:solidFill>
+        <a:gradFill rotWithShape="1">
+          <a:gsLst>
+            <a:gs pos="0">
+              <a:schemeClr val="phClr"/>
+            </a:gs>
+            <a:gs pos="90000">
+              <a:schemeClr val="phClr">
+                <a:shade val="100000"/>
+                <a:satMod val="105000"/>
+              </a:schemeClr>
+            </a:gs>
+            <a:gs pos="100000">
+              <a:schemeClr val="phClr">
+                <a:shade val="80000"/>
+                <a:satMod val="120000"/>
+              </a:schemeClr>
+            </a:gs>
+          </a:gsLst>
+          <a:path path="circle">
+            <a:fillToRect l="100000" t="100000" r="100000" b="100000"/>
+          </a:path>
+        </a:gradFill>
+      </a:fillStyleLst>
+      <a:lnStyleLst>
+        <a:ln w="10000" cap="flat" cmpd="sng" algn="ctr">
+          <a:solidFill>
+            <a:schemeClr val="phClr"/>
+          </a:solidFill>
+          <a:prstDash val="solid"/>
+        </a:ln>
+        <a:ln w="19050" cap="flat" cmpd="sng" algn="ctr">
+          <a:solidFill>
+            <a:schemeClr val="phClr"/>
+          </a:solidFill>
+          <a:prstDash val="solid"/>
+        </a:ln>
+        <a:ln w="53975" cap="flat" cmpd="dbl" algn="ctr">
+          <a:solidFill>
+            <a:schemeClr val="phClr"/>
+          </a:solidFill>
+          <a:prstDash val="solid"/>
+        </a:ln>
+      </a:lnStyleLst>
+      <a:effectStyleLst>
+        <a:effectStyle>
+          <a:effectLst/>
+        </a:effectStyle>
+        <a:effectStyle>
+          <a:effectLst>
+            <a:outerShdw blurRad="38100" dist="25400" dir="5400000" rotWithShape="0">
+              <a:srgbClr val="000000">
+                <a:alpha val="45000"/>
+              </a:srgbClr>
+            </a:outerShdw>
+          </a:effectLst>
+        </a:effectStyle>
+        <a:effectStyle>
+          <a:effectLst>
+            <a:outerShdw blurRad="38100" dist="25400" dir="5400000" rotWithShape="0">
+              <a:srgbClr val="000000">
+                <a:alpha val="45000"/>
+              </a:srgbClr>
+            </a:outerShdw>
+          </a:effectLst>
+          <a:scene3d>
+            <a:camera prst="orthographicFront">
+              <a:rot lat="0" lon="0" rev="0"/>
+            </a:camera>
+            <a:lightRig rig="brightRoom" dir="t"/>
+          </a:scene3d>
+          <a:sp3d extrusionH="12700" contourW="25400" prstMaterial="flat">
+            <a:bevelT w="63500" h="152400" prst="angle"/>
+            <a:contourClr>
+              <a:schemeClr val="phClr">
+                <a:shade val="27000"/>
+                <a:satMod val="120000"/>
+              </a:schemeClr>
+            </a:contourClr>
+          </a:sp3d>
+        </a:effectStyle>
+      </a:effectStyleLst>
+      <a:bgFillStyleLst>
+        <a:solidFill>
+          <a:schemeClr val="phClr"/>
+        </a:solidFill>
+        <a:solidFill>
+          <a:schemeClr val="phClr">
+            <a:tint val="95000"/>
+            <a:shade val="95000"/>
+            <a:satMod val="140000"/>
+          </a:schemeClr>
+        </a:solidFill>
+        <a:solidFill>
+          <a:schemeClr val="phClr">
+            <a:tint val="90000"/>
+            <a:shade val="85000"/>
+            <a:satMod val="160000"/>
+            <a:lumMod val="110000"/>
+          </a:schemeClr>
+        </a:solidFill>
+      </a:bgFillStyleLst>
+    </a:fmtScheme>
+  </a:themeElements>
+  <a:objectDefaults/>
+  <a:extraClrSchemeLst/>
+  <a:extLst>
+    <a:ext uri="{05A4C25C-085E-4340-85A3-A5531E510DB2}">
+      <thm15:themeFamily xmlns:thm15="http://schemas.microsoft.com/office/thememl/2012/main" name="Basis" id="{5665723A-49BA-4B57-8411-A56F8F207965}" vid="{D9D01AC2-EE7D-4E49-99EE-8E62E4E7E8A7}"/>
+    </a:ext>
+  </a:extLst>
+</a:theme>
+</file>
+
+<file path=ppt/theme/theme2.xml><?xml version="1.0" encoding="utf-8"?>
 <a:theme xmlns:a="http://schemas.openxmlformats.org/drawingml/2006/main" name="Motív balíka Office">
   <a:themeElements>
     <a:clrScheme name="Office">

</xml_diff>

<commit_message>
Add literatura and change design
</commit_message>
<xml_diff>
--- a/docs/prezentacia.pptx
+++ b/docs/prezentacia.pptx
@@ -210,7 +210,7 @@
           <a:p>
             <a:fld id="{9854AB16-C5E4-456E-B5D0-E5E5B3CCC106}" type="datetimeFigureOut">
               <a:rPr lang="sk-SK" smtClean="0"/>
-              <a:t>25. 10. 2017</a:t>
+              <a:t>25.10.2017</a:t>
             </a:fld>
             <a:endParaRPr lang="sk-SK"/>
           </a:p>
@@ -673,7 +673,7 @@
           <a:p>
             <a:fld id="{A125ABA5-F5F6-4A48-B05D-B74E22A2A9BD}" type="datetime1">
               <a:rPr lang="sk-SK" smtClean="0"/>
-              <a:t>25. 10. 2017</a:t>
+              <a:t>25.10.2017</a:t>
             </a:fld>
             <a:endParaRPr lang="sk-SK"/>
           </a:p>
@@ -894,7 +894,7 @@
           <a:p>
             <a:fld id="{043052D1-74FA-4EBB-AE53-CAA0A147CABE}" type="datetime1">
               <a:rPr lang="sk-SK" smtClean="0"/>
-              <a:t>25. 10. 2017</a:t>
+              <a:t>25.10.2017</a:t>
             </a:fld>
             <a:endParaRPr lang="sk-SK"/>
           </a:p>
@@ -1074,7 +1074,7 @@
           <a:p>
             <a:fld id="{F11258C5-8FC7-4E6A-A624-7D9BBC19B299}" type="datetime1">
               <a:rPr lang="sk-SK" smtClean="0"/>
-              <a:t>25. 10. 2017</a:t>
+              <a:t>25.10.2017</a:t>
             </a:fld>
             <a:endParaRPr lang="sk-SK"/>
           </a:p>
@@ -1244,7 +1244,7 @@
           <a:p>
             <a:fld id="{F66BAF30-D307-4D92-B0A8-31B4DD75D02E}" type="datetime1">
               <a:rPr lang="sk-SK" smtClean="0"/>
-              <a:t>25. 10. 2017</a:t>
+              <a:t>25.10.2017</a:t>
             </a:fld>
             <a:endParaRPr lang="sk-SK"/>
           </a:p>
@@ -1495,7 +1495,7 @@
           <a:p>
             <a:fld id="{68F8CCEA-900F-41D1-9ACE-62131DBE372F}" type="datetime1">
               <a:rPr lang="sk-SK" smtClean="0"/>
-              <a:t>25. 10. 2017</a:t>
+              <a:t>25.10.2017</a:t>
             </a:fld>
             <a:endParaRPr lang="sk-SK"/>
           </a:p>
@@ -1818,7 +1818,7 @@
           <a:p>
             <a:fld id="{00ABBCF6-FDCF-45D8-B91A-273B4B9E1895}" type="datetime1">
               <a:rPr lang="sk-SK" smtClean="0"/>
-              <a:t>25. 10. 2017</a:t>
+              <a:t>25.10.2017</a:t>
             </a:fld>
             <a:endParaRPr lang="sk-SK"/>
           </a:p>
@@ -2242,7 +2242,7 @@
           <a:p>
             <a:fld id="{5B927CB4-600B-439E-9C64-7E7FDF0AFFF2}" type="datetime1">
               <a:rPr lang="sk-SK" smtClean="0"/>
-              <a:t>25. 10. 2017</a:t>
+              <a:t>25.10.2017</a:t>
             </a:fld>
             <a:endParaRPr lang="sk-SK"/>
           </a:p>
@@ -2360,7 +2360,7 @@
           <a:p>
             <a:fld id="{C3E1FFA7-B1DD-4978-B911-1308933E0F7E}" type="datetime1">
               <a:rPr lang="sk-SK" smtClean="0"/>
-              <a:t>25. 10. 2017</a:t>
+              <a:t>25.10.2017</a:t>
             </a:fld>
             <a:endParaRPr lang="sk-SK"/>
           </a:p>
@@ -2455,7 +2455,7 @@
           <a:p>
             <a:fld id="{4E476F48-DE2E-4190-9DE3-AAE48EE81165}" type="datetime1">
               <a:rPr lang="sk-SK" smtClean="0"/>
-              <a:t>25. 10. 2017</a:t>
+              <a:t>25.10.2017</a:t>
             </a:fld>
             <a:endParaRPr lang="sk-SK"/>
           </a:p>
@@ -2745,7 +2745,7 @@
           <a:p>
             <a:fld id="{12D7D6E7-3F0A-4676-866C-AB01EBAD90F6}" type="datetime1">
               <a:rPr lang="sk-SK" smtClean="0"/>
-              <a:t>25. 10. 2017</a:t>
+              <a:t>25.10.2017</a:t>
             </a:fld>
             <a:endParaRPr lang="sk-SK"/>
           </a:p>
@@ -3017,7 +3017,7 @@
           <a:p>
             <a:fld id="{9A92E965-1CE2-47D9-8DA9-42BD580B108B}" type="datetime1">
               <a:rPr lang="sk-SK" smtClean="0"/>
-              <a:t>25. 10. 2017</a:t>
+              <a:t>25.10.2017</a:t>
             </a:fld>
             <a:endParaRPr lang="sk-SK"/>
           </a:p>
@@ -3271,7 +3271,7 @@
           <a:p>
             <a:fld id="{77CA6AE1-D167-4DDB-A1AE-122B897C8C72}" type="datetime1">
               <a:rPr lang="sk-SK" smtClean="0"/>
-              <a:t>25. 10. 2017</a:t>
+              <a:t>25.10.2017</a:t>
             </a:fld>
             <a:endParaRPr lang="sk-SK"/>
           </a:p>
@@ -3955,7 +3955,28 @@
           <a:bodyPr/>
           <a:lstStyle/>
           <a:p>
-            <a:endParaRPr lang="sk-SK"/>
+            <a:r>
+              <a:rPr lang="sk-SK" dirty="0">
+                <a:hlinkClick r:id="rId2"/>
+              </a:rPr>
+              <a:t>https://www.rfc-editor.org/rfc/pdfrfc/rfc7426.txt.pdf</a:t>
+            </a:r>
+            <a:r>
+              <a:rPr lang="sk-SK" dirty="0"/>
+              <a:t> - kapitola SDN</a:t>
+            </a:r>
+          </a:p>
+          <a:p>
+            <a:r>
+              <a:rPr lang="sk-SK" dirty="0">
+                <a:hlinkClick r:id="rId3"/>
+              </a:rPr>
+              <a:t>http://www.enterprisenetworkingplanet.com/netos/article.php/3657236/Measure-Network-Performance-with-iperf.htm</a:t>
+            </a:r>
+            <a:r>
+              <a:rPr lang="sk-SK" dirty="0"/>
+              <a:t> - kapitola Algoritmus DTD</a:t>
+            </a:r>
           </a:p>
         </p:txBody>
       </p:sp>

</xml_diff>